<commit_message>
completed schrempf schiff präsi
</commit_message>
<xml_diff>
--- a/Diplomarbeit/doc/Presentations/DA-Präsentation2025-Verteidigung.pptx
+++ b/Diplomarbeit/doc/Presentations/DA-Präsentation2025-Verteidigung.pptx
@@ -5,10 +5,10 @@
     <p:sldMasterId id="2147483648" r:id="rId4"/>
   </p:sldMasterIdLst>
   <p:notesMasterIdLst>
-    <p:notesMasterId r:id="rId25"/>
+    <p:notesMasterId r:id="rId29"/>
   </p:notesMasterIdLst>
   <p:handoutMasterIdLst>
-    <p:handoutMasterId r:id="rId26"/>
+    <p:handoutMasterId r:id="rId30"/>
   </p:handoutMasterIdLst>
   <p:sldIdLst>
     <p:sldId id="256" r:id="rId5"/>
@@ -23,14 +23,18 @@
     <p:sldId id="2594" r:id="rId14"/>
     <p:sldId id="2609" r:id="rId15"/>
     <p:sldId id="2596" r:id="rId16"/>
-    <p:sldId id="271" r:id="rId17"/>
-    <p:sldId id="257" r:id="rId18"/>
-    <p:sldId id="258" r:id="rId19"/>
-    <p:sldId id="259" r:id="rId20"/>
-    <p:sldId id="260" r:id="rId21"/>
-    <p:sldId id="261" r:id="rId22"/>
-    <p:sldId id="262" r:id="rId23"/>
-    <p:sldId id="2610" r:id="rId24"/>
+    <p:sldId id="2614" r:id="rId17"/>
+    <p:sldId id="271" r:id="rId18"/>
+    <p:sldId id="257" r:id="rId19"/>
+    <p:sldId id="258" r:id="rId20"/>
+    <p:sldId id="259" r:id="rId21"/>
+    <p:sldId id="260" r:id="rId22"/>
+    <p:sldId id="261" r:id="rId23"/>
+    <p:sldId id="262" r:id="rId24"/>
+    <p:sldId id="2613" r:id="rId25"/>
+    <p:sldId id="2611" r:id="rId26"/>
+    <p:sldId id="2610" r:id="rId27"/>
+    <p:sldId id="2612" r:id="rId28"/>
   </p:sldIdLst>
   <p:sldSz cx="12192000" cy="6858000"/>
   <p:notesSz cx="7099300" cy="10234613"/>
@@ -154,6 +158,7 @@
             <p14:sldId id="2594"/>
             <p14:sldId id="2609"/>
             <p14:sldId id="2596"/>
+            <p14:sldId id="2614"/>
           </p14:sldIdLst>
         </p14:section>
         <p14:section name="Gekle" id="{1498EEE0-9AA7-42F6-9085-4B26EBB008AF}">
@@ -169,7 +174,14 @@
             <p14:sldId id="260"/>
             <p14:sldId id="261"/>
             <p14:sldId id="262"/>
+          </p14:sldIdLst>
+        </p14:section>
+        <p14:section name="Quellen" id="{A4F17D96-1AFC-4B41-BE0C-A5A12B24EAC5}">
+          <p14:sldIdLst>
+            <p14:sldId id="2613"/>
+            <p14:sldId id="2611"/>
             <p14:sldId id="2610"/>
+            <p14:sldId id="2612"/>
           </p14:sldIdLst>
         </p14:section>
       </p14:sectionLst>
@@ -3820,7 +3832,7 @@
             </a:extLst>
           </p:cNvPr>
           <p:cNvPicPr>
-            <a:picLocks noChangeAspect="1"/>
+            <a:picLocks noGrp="1" noRot="1" noChangeAspect="1" noMove="1" noResize="1" noEditPoints="1" noAdjustHandles="1" noChangeArrowheads="1" noChangeShapeType="1" noCrop="1"/>
           </p:cNvPicPr>
           <p:nvPr/>
         </p:nvPicPr>
@@ -4003,7 +4015,7 @@
         </p:nvSpPr>
         <p:spPr>
           <a:xfrm>
-            <a:off x="10237785" y="3052271"/>
+            <a:off x="10271650" y="3592572"/>
             <a:ext cx="1512436" cy="523220"/>
           </a:xfrm>
           <a:prstGeom prst="rect">
@@ -4165,127 +4177,6 @@
       </p:transition>
     </mc:Fallback>
   </mc:AlternateContent>
-  <p:timing>
-    <p:tnLst>
-      <p:par>
-        <p:cTn id="1" dur="indefinite" restart="never" nodeType="tmRoot">
-          <p:childTnLst>
-            <p:seq concurrent="1" nextAc="seek">
-              <p:cTn id="2" dur="indefinite" nodeType="mainSeq">
-                <p:childTnLst>
-                  <p:par>
-                    <p:cTn id="3" fill="hold">
-                      <p:stCondLst>
-                        <p:cond delay="indefinite"/>
-                      </p:stCondLst>
-                      <p:childTnLst>
-                        <p:par>
-                          <p:cTn id="4" fill="hold">
-                            <p:stCondLst>
-                              <p:cond delay="0"/>
-                            </p:stCondLst>
-                            <p:childTnLst>
-                              <p:par>
-                                <p:cTn id="5" presetID="2" presetClass="entr" presetSubtype="2" fill="hold" nodeType="clickEffect">
-                                  <p:stCondLst>
-                                    <p:cond delay="0"/>
-                                  </p:stCondLst>
-                                  <p:childTnLst>
-                                    <p:set>
-                                      <p:cBhvr>
-                                        <p:cTn id="6" dur="1" fill="hold">
-                                          <p:stCondLst>
-                                            <p:cond delay="0"/>
-                                          </p:stCondLst>
-                                        </p:cTn>
-                                        <p:tgtEl>
-                                          <p:spTgt spid="21"/>
-                                        </p:tgtEl>
-                                        <p:attrNameLst>
-                                          <p:attrName>style.visibility</p:attrName>
-                                        </p:attrNameLst>
-                                      </p:cBhvr>
-                                      <p:to>
-                                        <p:strVal val="visible"/>
-                                      </p:to>
-                                    </p:set>
-                                    <p:anim calcmode="lin" valueType="num">
-                                      <p:cBhvr additive="base">
-                                        <p:cTn id="7" dur="3000" fill="hold"/>
-                                        <p:tgtEl>
-                                          <p:spTgt spid="21"/>
-                                        </p:tgtEl>
-                                        <p:attrNameLst>
-                                          <p:attrName>ppt_x</p:attrName>
-                                        </p:attrNameLst>
-                                      </p:cBhvr>
-                                      <p:tavLst>
-                                        <p:tav tm="0">
-                                          <p:val>
-                                            <p:strVal val="1+#ppt_w/2"/>
-                                          </p:val>
-                                        </p:tav>
-                                        <p:tav tm="100000">
-                                          <p:val>
-                                            <p:strVal val="#ppt_x"/>
-                                          </p:val>
-                                        </p:tav>
-                                      </p:tavLst>
-                                    </p:anim>
-                                    <p:anim calcmode="lin" valueType="num">
-                                      <p:cBhvr additive="base">
-                                        <p:cTn id="8" dur="3000" fill="hold"/>
-                                        <p:tgtEl>
-                                          <p:spTgt spid="21"/>
-                                        </p:tgtEl>
-                                        <p:attrNameLst>
-                                          <p:attrName>ppt_y</p:attrName>
-                                        </p:attrNameLst>
-                                      </p:cBhvr>
-                                      <p:tavLst>
-                                        <p:tav tm="0">
-                                          <p:val>
-                                            <p:strVal val="#ppt_y"/>
-                                          </p:val>
-                                        </p:tav>
-                                        <p:tav tm="100000">
-                                          <p:val>
-                                            <p:strVal val="#ppt_y"/>
-                                          </p:val>
-                                        </p:tav>
-                                      </p:tavLst>
-                                    </p:anim>
-                                  </p:childTnLst>
-                                </p:cTn>
-                              </p:par>
-                            </p:childTnLst>
-                          </p:cTn>
-                        </p:par>
-                      </p:childTnLst>
-                    </p:cTn>
-                  </p:par>
-                </p:childTnLst>
-              </p:cTn>
-              <p:prevCondLst>
-                <p:cond evt="onPrev" delay="0">
-                  <p:tgtEl>
-                    <p:sldTgt/>
-                  </p:tgtEl>
-                </p:cond>
-              </p:prevCondLst>
-              <p:nextCondLst>
-                <p:cond evt="onNext" delay="0">
-                  <p:tgtEl>
-                    <p:sldTgt/>
-                  </p:tgtEl>
-                </p:cond>
-              </p:nextCondLst>
-            </p:seq>
-          </p:childTnLst>
-        </p:cTn>
-      </p:par>
-    </p:tnLst>
-  </p:timing>
 </p:sld>
 </file>
 
@@ -4429,7 +4320,7 @@
             </a:extLst>
           </p:cNvPr>
           <p:cNvPicPr>
-            <a:picLocks noChangeAspect="1"/>
+            <a:picLocks noGrp="1" noRot="1" noChangeAspect="1" noMove="1" noResize="1" noEditPoints="1" noAdjustHandles="1" noChangeArrowheads="1" noChangeShapeType="1" noCrop="1"/>
           </p:cNvPicPr>
           <p:nvPr/>
         </p:nvPicPr>
@@ -4444,13 +4335,13 @@
               </a:ext>
             </a:extLst>
           </a:blip>
-          <a:srcRect l="38203" t="12999" r="30542" b="-2628"/>
+          <a:srcRect l="38369" t="12999" r="30542" b="-2628"/>
           <a:stretch/>
         </p:blipFill>
         <p:spPr>
           <a:xfrm>
-            <a:off x="-24294" y="162387"/>
-            <a:ext cx="12257238" cy="6215588"/>
+            <a:off x="0" y="140765"/>
+            <a:ext cx="12192000" cy="6215588"/>
           </a:xfrm>
           <a:prstGeom prst="rect">
             <a:avLst/>
@@ -4471,7 +4362,7 @@
         </p:nvSpPr>
         <p:spPr>
           <a:xfrm>
-            <a:off x="5157767" y="4746912"/>
+            <a:off x="5381909" y="4708492"/>
             <a:ext cx="1428181" cy="584775"/>
           </a:xfrm>
           <a:prstGeom prst="rect">
@@ -4496,6 +4387,155 @@
           </a:p>
         </p:txBody>
       </p:sp>
+      <p:sp>
+        <p:nvSpPr>
+          <p:cNvPr id="9" name="Textfeld 8">
+            <a:extLst>
+              <a:ext uri="{FF2B5EF4-FFF2-40B4-BE49-F238E27FC236}">
+                <a16:creationId xmlns:a16="http://schemas.microsoft.com/office/drawing/2014/main" id="{23AA30D8-C09C-6074-6945-762F39EA4768}"/>
+              </a:ext>
+            </a:extLst>
+          </p:cNvPr>
+          <p:cNvSpPr txBox="1"/>
+          <p:nvPr/>
+        </p:nvSpPr>
+        <p:spPr>
+          <a:xfrm>
+            <a:off x="287249" y="2604164"/>
+            <a:ext cx="1251787" cy="523220"/>
+          </a:xfrm>
+          <a:prstGeom prst="rect">
+            <a:avLst/>
+          </a:prstGeom>
+          <a:noFill/>
+        </p:spPr>
+        <p:txBody>
+          <a:bodyPr wrap="square" rtlCol="0">
+            <a:spAutoFit/>
+          </a:bodyPr>
+          <a:lstStyle/>
+          <a:p>
+            <a:r>
+              <a:rPr lang="de-AT" sz="2800" b="1" dirty="0">
+                <a:solidFill>
+                  <a:schemeClr val="bg1"/>
+                </a:solidFill>
+              </a:rPr>
+              <a:t>Docker</a:t>
+            </a:r>
+          </a:p>
+        </p:txBody>
+      </p:sp>
+      <p:sp>
+        <p:nvSpPr>
+          <p:cNvPr id="10" name="Textfeld 9">
+            <a:extLst>
+              <a:ext uri="{FF2B5EF4-FFF2-40B4-BE49-F238E27FC236}">
+                <a16:creationId xmlns:a16="http://schemas.microsoft.com/office/drawing/2014/main" id="{70B9D554-46BE-A81F-8F3E-A1AE3AD4194A}"/>
+              </a:ext>
+            </a:extLst>
+          </p:cNvPr>
+          <p:cNvSpPr txBox="1"/>
+          <p:nvPr/>
+        </p:nvSpPr>
+        <p:spPr>
+          <a:xfrm>
+            <a:off x="10174630" y="3167390"/>
+            <a:ext cx="1251787" cy="523220"/>
+          </a:xfrm>
+          <a:prstGeom prst="rect">
+            <a:avLst/>
+          </a:prstGeom>
+          <a:noFill/>
+        </p:spPr>
+        <p:txBody>
+          <a:bodyPr wrap="square" rtlCol="0">
+            <a:spAutoFit/>
+          </a:bodyPr>
+          <a:lstStyle/>
+          <a:p>
+            <a:r>
+              <a:rPr lang="de-AT" sz="2800" b="1" dirty="0">
+                <a:solidFill>
+                  <a:schemeClr val="bg1"/>
+                </a:solidFill>
+              </a:rPr>
+              <a:t>GitHub</a:t>
+            </a:r>
+          </a:p>
+        </p:txBody>
+      </p:sp>
+      <p:pic>
+        <p:nvPicPr>
+          <p:cNvPr id="14" name="Grafik 13">
+            <a:extLst>
+              <a:ext uri="{FF2B5EF4-FFF2-40B4-BE49-F238E27FC236}">
+                <a16:creationId xmlns:a16="http://schemas.microsoft.com/office/drawing/2014/main" id="{0CC855B5-2AD1-9076-4133-31CBDEF09D1C}"/>
+              </a:ext>
+            </a:extLst>
+          </p:cNvPr>
+          <p:cNvPicPr>
+            <a:picLocks noChangeAspect="1"/>
+          </p:cNvPicPr>
+          <p:nvPr/>
+        </p:nvPicPr>
+        <p:blipFill>
+          <a:blip r:embed="rId6">
+            <a:extLst>
+              <a:ext uri="{96DAC541-7B7A-43D3-8B79-37D633B846F1}">
+                <asvg:svgBlip xmlns:asvg="http://schemas.microsoft.com/office/drawing/2016/SVG/main" r:embed="rId7"/>
+              </a:ext>
+            </a:extLst>
+          </a:blip>
+          <a:srcRect l="12876" r="2675"/>
+          <a:stretch/>
+        </p:blipFill>
+        <p:spPr>
+          <a:xfrm>
+            <a:off x="2378074" y="1563370"/>
+            <a:ext cx="2317751" cy="2744549"/>
+          </a:xfrm>
+          <a:prstGeom prst="rect">
+            <a:avLst/>
+          </a:prstGeom>
+        </p:spPr>
+      </p:pic>
+      <p:pic>
+        <p:nvPicPr>
+          <p:cNvPr id="16" name="Grafik 15">
+            <a:extLst>
+              <a:ext uri="{FF2B5EF4-FFF2-40B4-BE49-F238E27FC236}">
+                <a16:creationId xmlns:a16="http://schemas.microsoft.com/office/drawing/2014/main" id="{DE32713F-636D-C868-B362-47D6F7551D7A}"/>
+              </a:ext>
+            </a:extLst>
+          </p:cNvPr>
+          <p:cNvPicPr>
+            <a:picLocks noChangeAspect="1"/>
+          </p:cNvPicPr>
+          <p:nvPr/>
+        </p:nvPicPr>
+        <p:blipFill>
+          <a:blip r:embed="rId8">
+            <a:extLst>
+              <a:ext uri="{96DAC541-7B7A-43D3-8B79-37D633B846F1}">
+                <asvg:svgBlip xmlns:asvg="http://schemas.microsoft.com/office/drawing/2016/SVG/main" r:embed="rId9"/>
+              </a:ext>
+            </a:extLst>
+          </a:blip>
+          <a:stretch>
+            <a:fillRect/>
+          </a:stretch>
+        </p:blipFill>
+        <p:spPr>
+          <a:xfrm>
+            <a:off x="7797801" y="1683101"/>
+            <a:ext cx="2244991" cy="2244991"/>
+          </a:xfrm>
+          <a:prstGeom prst="rect">
+            <a:avLst/>
+          </a:prstGeom>
+        </p:spPr>
+      </p:pic>
     </p:spTree>
     <p:extLst>
       <p:ext uri="{BB962C8B-B14F-4D97-AF65-F5344CB8AC3E}">
@@ -4606,7 +4646,7 @@
             </a:extLst>
           </p:cNvPr>
           <p:cNvPicPr>
-            <a:picLocks noChangeAspect="1"/>
+            <a:picLocks noGrp="1" noRot="1" noChangeAspect="1" noMove="1" noResize="1" noEditPoints="1" noAdjustHandles="1" noChangeArrowheads="1" noChangeShapeType="1" noCrop="1"/>
           </p:cNvPicPr>
           <p:nvPr/>
         </p:nvPicPr>
@@ -4648,7 +4688,7 @@
         </p:nvSpPr>
         <p:spPr>
           <a:xfrm>
-            <a:off x="5459394" y="4667267"/>
+            <a:off x="5459394" y="4698004"/>
             <a:ext cx="1273209" cy="584775"/>
           </a:xfrm>
           <a:prstGeom prst="rect">
@@ -4673,6 +4713,239 @@
           </a:p>
         </p:txBody>
       </p:sp>
+      <p:sp>
+        <p:nvSpPr>
+          <p:cNvPr id="3" name="Textfeld 2">
+            <a:extLst>
+              <a:ext uri="{FF2B5EF4-FFF2-40B4-BE49-F238E27FC236}">
+                <a16:creationId xmlns:a16="http://schemas.microsoft.com/office/drawing/2014/main" id="{C8686699-6EF5-4576-C79D-7AE4D8446B5F}"/>
+              </a:ext>
+            </a:extLst>
+          </p:cNvPr>
+          <p:cNvSpPr txBox="1"/>
+          <p:nvPr/>
+        </p:nvSpPr>
+        <p:spPr>
+          <a:xfrm>
+            <a:off x="2187729" y="2627215"/>
+            <a:ext cx="903776" cy="523220"/>
+          </a:xfrm>
+          <a:prstGeom prst="rect">
+            <a:avLst/>
+          </a:prstGeom>
+          <a:noFill/>
+        </p:spPr>
+        <p:txBody>
+          <a:bodyPr wrap="square" rtlCol="0">
+            <a:spAutoFit/>
+          </a:bodyPr>
+          <a:lstStyle/>
+          <a:p>
+            <a:r>
+              <a:rPr lang="de-AT" sz="2800" b="1" dirty="0">
+                <a:solidFill>
+                  <a:schemeClr val="bg1"/>
+                </a:solidFill>
+              </a:rPr>
+              <a:t>REST</a:t>
+            </a:r>
+          </a:p>
+        </p:txBody>
+      </p:sp>
+      <p:sp>
+        <p:nvSpPr>
+          <p:cNvPr id="9" name="Textfeld 8">
+            <a:extLst>
+              <a:ext uri="{FF2B5EF4-FFF2-40B4-BE49-F238E27FC236}">
+                <a16:creationId xmlns:a16="http://schemas.microsoft.com/office/drawing/2014/main" id="{88229502-697E-E096-ACE2-8EF8929D9A40}"/>
+              </a:ext>
+            </a:extLst>
+          </p:cNvPr>
+          <p:cNvSpPr txBox="1"/>
+          <p:nvPr/>
+        </p:nvSpPr>
+        <p:spPr>
+          <a:xfrm>
+            <a:off x="9320531" y="2154796"/>
+            <a:ext cx="1678938" cy="523220"/>
+          </a:xfrm>
+          <a:prstGeom prst="rect">
+            <a:avLst/>
+          </a:prstGeom>
+          <a:noFill/>
+        </p:spPr>
+        <p:txBody>
+          <a:bodyPr wrap="square" rtlCol="0">
+            <a:spAutoFit/>
+          </a:bodyPr>
+          <a:lstStyle/>
+          <a:p>
+            <a:r>
+              <a:rPr lang="de-AT" sz="2800" b="1" dirty="0">
+                <a:solidFill>
+                  <a:schemeClr val="bg1"/>
+                </a:solidFill>
+              </a:rPr>
+              <a:t>JavaScript</a:t>
+            </a:r>
+          </a:p>
+        </p:txBody>
+      </p:sp>
+      <p:sp>
+        <p:nvSpPr>
+          <p:cNvPr id="10" name="Textfeld 9">
+            <a:extLst>
+              <a:ext uri="{FF2B5EF4-FFF2-40B4-BE49-F238E27FC236}">
+                <a16:creationId xmlns:a16="http://schemas.microsoft.com/office/drawing/2014/main" id="{581091B3-15D3-0705-8634-8C0AA4D825F5}"/>
+              </a:ext>
+            </a:extLst>
+          </p:cNvPr>
+          <p:cNvSpPr txBox="1"/>
+          <p:nvPr/>
+        </p:nvSpPr>
+        <p:spPr>
+          <a:xfrm>
+            <a:off x="9521304" y="3076229"/>
+            <a:ext cx="1322916" cy="523220"/>
+          </a:xfrm>
+          <a:prstGeom prst="rect">
+            <a:avLst/>
+          </a:prstGeom>
+          <a:noFill/>
+        </p:spPr>
+        <p:txBody>
+          <a:bodyPr wrap="square" rtlCol="0">
+            <a:spAutoFit/>
+          </a:bodyPr>
+          <a:lstStyle/>
+          <a:p>
+            <a:r>
+              <a:rPr lang="de-AT" sz="2800" b="1" dirty="0">
+                <a:solidFill>
+                  <a:schemeClr val="bg1"/>
+                </a:solidFill>
+              </a:rPr>
+              <a:t>Node.js</a:t>
+            </a:r>
+          </a:p>
+        </p:txBody>
+      </p:sp>
+      <p:pic>
+        <p:nvPicPr>
+          <p:cNvPr id="14" name="Grafik 13">
+            <a:extLst>
+              <a:ext uri="{FF2B5EF4-FFF2-40B4-BE49-F238E27FC236}">
+                <a16:creationId xmlns:a16="http://schemas.microsoft.com/office/drawing/2014/main" id="{D46F89C6-5C85-021A-F9E3-ABC5724CCF9D}"/>
+              </a:ext>
+            </a:extLst>
+          </p:cNvPr>
+          <p:cNvPicPr>
+            <a:picLocks noChangeAspect="1"/>
+          </p:cNvPicPr>
+          <p:nvPr/>
+        </p:nvPicPr>
+        <p:blipFill>
+          <a:blip r:embed="rId5">
+            <a:extLst>
+              <a:ext uri="{96DAC541-7B7A-43D3-8B79-37D633B846F1}">
+                <asvg:svgBlip xmlns:asvg="http://schemas.microsoft.com/office/drawing/2016/SVG/main" r:embed="rId6"/>
+              </a:ext>
+            </a:extLst>
+          </a:blip>
+          <a:stretch>
+            <a:fillRect/>
+          </a:stretch>
+        </p:blipFill>
+        <p:spPr>
+          <a:xfrm>
+            <a:off x="6378582" y="1799742"/>
+            <a:ext cx="1929449" cy="2178167"/>
+          </a:xfrm>
+          <a:prstGeom prst="rect">
+            <a:avLst/>
+          </a:prstGeom>
+        </p:spPr>
+      </p:pic>
+      <p:sp>
+        <p:nvSpPr>
+          <p:cNvPr id="15" name="Textfeld 14">
+            <a:extLst>
+              <a:ext uri="{FF2B5EF4-FFF2-40B4-BE49-F238E27FC236}">
+                <a16:creationId xmlns:a16="http://schemas.microsoft.com/office/drawing/2014/main" id="{559902E9-CD37-13C7-4740-779015762F35}"/>
+              </a:ext>
+            </a:extLst>
+          </p:cNvPr>
+          <p:cNvSpPr txBox="1"/>
+          <p:nvPr/>
+        </p:nvSpPr>
+        <p:spPr>
+          <a:xfrm>
+            <a:off x="799031" y="2627215"/>
+            <a:ext cx="1249120" cy="523220"/>
+          </a:xfrm>
+          <a:prstGeom prst="rect">
+            <a:avLst/>
+          </a:prstGeom>
+          <a:noFill/>
+        </p:spPr>
+        <p:txBody>
+          <a:bodyPr wrap="square" rtlCol="0">
+            <a:spAutoFit/>
+          </a:bodyPr>
+          <a:lstStyle/>
+          <a:p>
+            <a:r>
+              <a:rPr lang="de-AT" sz="2800" b="1" dirty="0" err="1">
+                <a:solidFill>
+                  <a:schemeClr val="bg1"/>
+                </a:solidFill>
+              </a:rPr>
+              <a:t>Traefik</a:t>
+            </a:r>
+            <a:endParaRPr lang="de-AT" sz="2800" b="1" dirty="0">
+              <a:solidFill>
+                <a:schemeClr val="bg1"/>
+              </a:solidFill>
+            </a:endParaRPr>
+          </a:p>
+        </p:txBody>
+      </p:sp>
+      <p:pic>
+        <p:nvPicPr>
+          <p:cNvPr id="17" name="Grafik 16">
+            <a:extLst>
+              <a:ext uri="{FF2B5EF4-FFF2-40B4-BE49-F238E27FC236}">
+                <a16:creationId xmlns:a16="http://schemas.microsoft.com/office/drawing/2014/main" id="{7B36E630-A147-BC3A-1CF4-5F075B9FA6DB}"/>
+              </a:ext>
+            </a:extLst>
+          </p:cNvPr>
+          <p:cNvPicPr>
+            <a:picLocks noChangeAspect="1"/>
+          </p:cNvPicPr>
+          <p:nvPr/>
+        </p:nvPicPr>
+        <p:blipFill>
+          <a:blip r:embed="rId7">
+            <a:extLst>
+              <a:ext uri="{96DAC541-7B7A-43D3-8B79-37D633B846F1}">
+                <asvg:svgBlip xmlns:asvg="http://schemas.microsoft.com/office/drawing/2016/SVG/main" r:embed="rId8"/>
+              </a:ext>
+            </a:extLst>
+          </a:blip>
+          <a:stretch>
+            <a:fillRect/>
+          </a:stretch>
+        </p:blipFill>
+        <p:spPr>
+          <a:xfrm>
+            <a:off x="3768204" y="2041448"/>
+            <a:ext cx="1984896" cy="1984896"/>
+          </a:xfrm>
+          <a:prstGeom prst="rect">
+            <a:avLst/>
+          </a:prstGeom>
+        </p:spPr>
+      </p:pic>
     </p:spTree>
     <p:extLst>
       <p:ext uri="{BB962C8B-B14F-4D97-AF65-F5344CB8AC3E}">
@@ -4703,6 +4976,242 @@
   <p:cSld>
     <p:spTree>
       <p:nvGrpSpPr>
+        <p:cNvPr id="1" name=""/>
+        <p:cNvGrpSpPr/>
+        <p:nvPr/>
+      </p:nvGrpSpPr>
+      <p:grpSpPr>
+        <a:xfrm>
+          <a:off x="0" y="0"/>
+          <a:ext cx="0" cy="0"/>
+          <a:chOff x="0" y="0"/>
+          <a:chExt cx="0" cy="0"/>
+        </a:xfrm>
+      </p:grpSpPr>
+      <p:sp>
+        <p:nvSpPr>
+          <p:cNvPr id="2" name="Titel 1">
+            <a:extLst>
+              <a:ext uri="{FF2B5EF4-FFF2-40B4-BE49-F238E27FC236}">
+                <a16:creationId xmlns:a16="http://schemas.microsoft.com/office/drawing/2014/main" id="{05100F6D-DC30-BB35-5CD0-BAF5C0E55577}"/>
+              </a:ext>
+            </a:extLst>
+          </p:cNvPr>
+          <p:cNvSpPr>
+            <a:spLocks noGrp="1"/>
+          </p:cNvSpPr>
+          <p:nvPr>
+            <p:ph type="title"/>
+          </p:nvPr>
+        </p:nvSpPr>
+        <p:spPr/>
+        <p:txBody>
+          <a:bodyPr/>
+          <a:lstStyle/>
+          <a:p>
+            <a:r>
+              <a:rPr lang="de-AT" dirty="0"/>
+              <a:t>Datenbanken</a:t>
+            </a:r>
+          </a:p>
+        </p:txBody>
+      </p:sp>
+      <p:sp>
+        <p:nvSpPr>
+          <p:cNvPr id="3" name="Inhaltsplatzhalter 2">
+            <a:extLst>
+              <a:ext uri="{FF2B5EF4-FFF2-40B4-BE49-F238E27FC236}">
+                <a16:creationId xmlns:a16="http://schemas.microsoft.com/office/drawing/2014/main" id="{371994D2-F083-3680-B02E-D095429270AC}"/>
+              </a:ext>
+            </a:extLst>
+          </p:cNvPr>
+          <p:cNvSpPr>
+            <a:spLocks noGrp="1"/>
+          </p:cNvSpPr>
+          <p:nvPr>
+            <p:ph idx="1"/>
+          </p:nvPr>
+        </p:nvSpPr>
+        <p:spPr/>
+        <p:txBody>
+          <a:bodyPr/>
+          <a:lstStyle/>
+          <a:p>
+            <a:r>
+              <a:rPr lang="de-AT" dirty="0"/>
+              <a:t>MySQL</a:t>
+            </a:r>
+          </a:p>
+          <a:p>
+            <a:pPr lvl="1"/>
+            <a:r>
+              <a:rPr lang="de-AT" dirty="0"/>
+              <a:t>Schiff</a:t>
+            </a:r>
+          </a:p>
+          <a:p>
+            <a:pPr lvl="1"/>
+            <a:r>
+              <a:rPr lang="de-AT" dirty="0"/>
+              <a:t>Container</a:t>
+            </a:r>
+          </a:p>
+          <a:p>
+            <a:pPr lvl="1"/>
+            <a:r>
+              <a:rPr lang="de-AT" dirty="0"/>
+              <a:t>Grenzwerte</a:t>
+            </a:r>
+          </a:p>
+          <a:p>
+            <a:pPr lvl="1"/>
+            <a:r>
+              <a:rPr lang="de-AT" dirty="0"/>
+              <a:t>User</a:t>
+            </a:r>
+          </a:p>
+          <a:p>
+            <a:r>
+              <a:rPr lang="de-AT" dirty="0" err="1"/>
+              <a:t>InfluxDB</a:t>
+            </a:r>
+            <a:endParaRPr lang="de-AT" dirty="0"/>
+          </a:p>
+          <a:p>
+            <a:pPr lvl="1"/>
+            <a:r>
+              <a:rPr lang="de-AT" dirty="0"/>
+              <a:t>Sensoren</a:t>
+            </a:r>
+          </a:p>
+          <a:p>
+            <a:r>
+              <a:rPr lang="de-AT" dirty="0" err="1"/>
+              <a:t>Grafana</a:t>
+            </a:r>
+            <a:endParaRPr lang="de-AT" dirty="0"/>
+          </a:p>
+          <a:p>
+            <a:pPr lvl="1"/>
+            <a:r>
+              <a:rPr lang="de-AT" dirty="0"/>
+              <a:t>Telegraf</a:t>
+            </a:r>
+          </a:p>
+        </p:txBody>
+      </p:sp>
+      <p:sp>
+        <p:nvSpPr>
+          <p:cNvPr id="4" name="Fußzeilenplatzhalter 3">
+            <a:extLst>
+              <a:ext uri="{FF2B5EF4-FFF2-40B4-BE49-F238E27FC236}">
+                <a16:creationId xmlns:a16="http://schemas.microsoft.com/office/drawing/2014/main" id="{7C9F0AB6-B175-7DDE-CF3D-7757212FA515}"/>
+              </a:ext>
+            </a:extLst>
+          </p:cNvPr>
+          <p:cNvSpPr>
+            <a:spLocks noGrp="1"/>
+          </p:cNvSpPr>
+          <p:nvPr>
+            <p:ph type="ftr" sz="quarter" idx="11"/>
+          </p:nvPr>
+        </p:nvSpPr>
+        <p:spPr/>
+        <p:txBody>
+          <a:bodyPr/>
+          <a:lstStyle/>
+          <a:p>
+            <a:r>
+              <a:rPr lang="de-AT"/>
+              <a:t>CONTRUDE Schrempf</a:t>
+            </a:r>
+            <a:endParaRPr lang="de-AT" dirty="0"/>
+          </a:p>
+        </p:txBody>
+      </p:sp>
+      <p:sp>
+        <p:nvSpPr>
+          <p:cNvPr id="5" name="Foliennummernplatzhalter 4">
+            <a:extLst>
+              <a:ext uri="{FF2B5EF4-FFF2-40B4-BE49-F238E27FC236}">
+                <a16:creationId xmlns:a16="http://schemas.microsoft.com/office/drawing/2014/main" id="{2BD01695-6E33-AEA9-547B-A78322DEB62D}"/>
+              </a:ext>
+            </a:extLst>
+          </p:cNvPr>
+          <p:cNvSpPr>
+            <a:spLocks noGrp="1"/>
+          </p:cNvSpPr>
+          <p:nvPr>
+            <p:ph type="sldNum" sz="quarter" idx="12"/>
+          </p:nvPr>
+        </p:nvSpPr>
+        <p:spPr/>
+        <p:txBody>
+          <a:bodyPr/>
+          <a:lstStyle/>
+          <a:p>
+            <a:fld id="{7DCD6803-3BAA-44F6-A698-23D950C9713B}" type="slidenum">
+              <a:rPr lang="de-AT" smtClean="0"/>
+              <a:pPr/>
+              <a:t>13</a:t>
+            </a:fld>
+            <a:endParaRPr lang="de-AT"/>
+          </a:p>
+        </p:txBody>
+      </p:sp>
+      <p:pic>
+        <p:nvPicPr>
+          <p:cNvPr id="11" name="Grafik 10" descr="Ein Bild, das Text, Screenshot, parallel, Diagramm enthält.&#10;&#10;KI-generierte Inhalte können fehlerhaft sein.">
+            <a:extLst>
+              <a:ext uri="{FF2B5EF4-FFF2-40B4-BE49-F238E27FC236}">
+                <a16:creationId xmlns:a16="http://schemas.microsoft.com/office/drawing/2014/main" id="{54623918-AF64-857E-06A7-67366A504E7C}"/>
+              </a:ext>
+            </a:extLst>
+          </p:cNvPr>
+          <p:cNvPicPr>
+            <a:picLocks noChangeAspect="1"/>
+          </p:cNvPicPr>
+          <p:nvPr/>
+        </p:nvPicPr>
+        <p:blipFill>
+          <a:blip r:embed="rId2" cstate="print">
+            <a:extLst>
+              <a:ext uri="{28A0092B-C50C-407E-A947-70E740481C1C}">
+                <a14:useLocalDpi xmlns:a14="http://schemas.microsoft.com/office/drawing/2010/main" val="0"/>
+              </a:ext>
+            </a:extLst>
+          </a:blip>
+          <a:srcRect t="5269"/>
+          <a:stretch/>
+        </p:blipFill>
+        <p:spPr>
+          <a:xfrm>
+            <a:off x="2997200" y="1370531"/>
+            <a:ext cx="9194800" cy="4437841"/>
+          </a:xfrm>
+          <a:prstGeom prst="rect">
+            <a:avLst/>
+          </a:prstGeom>
+        </p:spPr>
+      </p:pic>
+    </p:spTree>
+    <p:extLst>
+      <p:ext uri="{BB962C8B-B14F-4D97-AF65-F5344CB8AC3E}">
+        <p14:creationId xmlns:p14="http://schemas.microsoft.com/office/powerpoint/2010/main" val="2803739803"/>
+      </p:ext>
+    </p:extLst>
+  </p:cSld>
+  <p:clrMapOvr>
+    <a:masterClrMapping/>
+  </p:clrMapOvr>
+</p:sld>
+</file>
+
+<file path=ppt/slides/slide14.xml><?xml version="1.0" encoding="utf-8"?>
+<p:sld xmlns:a="http://schemas.openxmlformats.org/drawingml/2006/main" xmlns:r="http://schemas.openxmlformats.org/officeDocument/2006/relationships" xmlns:p="http://schemas.openxmlformats.org/presentationml/2006/main">
+  <p:cSld>
+    <p:spTree>
+      <p:nvGrpSpPr>
         <p:cNvPr id="1" name="">
           <a:extLst>
             <a:ext uri="{FF2B5EF4-FFF2-40B4-BE49-F238E27FC236}">
@@ -4773,7 +5282,7 @@
             <a:fld id="{7DCD6803-3BAA-44F6-A698-23D950C9713B}" type="slidenum">
               <a:rPr lang="de-AT" smtClean="0"/>
               <a:pPr/>
-              <a:t>13</a:t>
+              <a:t>14</a:t>
             </a:fld>
             <a:endParaRPr lang="de-AT"/>
           </a:p>
@@ -4827,138 +5336,6 @@
     <p:extLst>
       <p:ext uri="{BB962C8B-B14F-4D97-AF65-F5344CB8AC3E}">
         <p14:creationId xmlns:p14="http://schemas.microsoft.com/office/powerpoint/2010/main" val="3840576581"/>
-      </p:ext>
-    </p:extLst>
-  </p:cSld>
-  <p:clrMapOvr>
-    <a:masterClrMapping/>
-  </p:clrMapOvr>
-</p:sld>
-</file>
-
-<file path=ppt/slides/slide14.xml><?xml version="1.0" encoding="utf-8"?>
-<p:sld xmlns:a="http://schemas.openxmlformats.org/drawingml/2006/main" xmlns:r="http://schemas.openxmlformats.org/officeDocument/2006/relationships" xmlns:p="http://schemas.openxmlformats.org/presentationml/2006/main">
-  <p:cSld>
-    <p:spTree>
-      <p:nvGrpSpPr>
-        <p:cNvPr id="1" name=""/>
-        <p:cNvGrpSpPr/>
-        <p:nvPr/>
-      </p:nvGrpSpPr>
-      <p:grpSpPr>
-        <a:xfrm>
-          <a:off x="0" y="0"/>
-          <a:ext cx="0" cy="0"/>
-          <a:chOff x="0" y="0"/>
-          <a:chExt cx="0" cy="0"/>
-        </a:xfrm>
-      </p:grpSpPr>
-      <p:sp>
-        <p:nvSpPr>
-          <p:cNvPr id="4" name="Fußzeilenplatzhalter 3">
-            <a:extLst>
-              <a:ext uri="{FF2B5EF4-FFF2-40B4-BE49-F238E27FC236}">
-                <a16:creationId xmlns:a16="http://schemas.microsoft.com/office/drawing/2014/main" id="{B3CE102D-CC78-4BE1-BDB4-67D0F8D57C56}"/>
-              </a:ext>
-            </a:extLst>
-          </p:cNvPr>
-          <p:cNvSpPr>
-            <a:spLocks noGrp="1"/>
-          </p:cNvSpPr>
-          <p:nvPr>
-            <p:ph type="ftr" sz="quarter" idx="11"/>
-          </p:nvPr>
-        </p:nvSpPr>
-        <p:spPr/>
-        <p:txBody>
-          <a:bodyPr/>
-          <a:lstStyle/>
-          <a:p>
-            <a:r>
-              <a:rPr lang="de-AT" dirty="0"/>
-              <a:t>CONTRUDE Schrempf</a:t>
-            </a:r>
-          </a:p>
-        </p:txBody>
-      </p:sp>
-      <p:sp>
-        <p:nvSpPr>
-          <p:cNvPr id="5" name="Foliennummernplatzhalter 4">
-            <a:extLst>
-              <a:ext uri="{FF2B5EF4-FFF2-40B4-BE49-F238E27FC236}">
-                <a16:creationId xmlns:a16="http://schemas.microsoft.com/office/drawing/2014/main" id="{F8884CDD-B6BF-5A0E-36BE-3463B7C68BE9}"/>
-              </a:ext>
-            </a:extLst>
-          </p:cNvPr>
-          <p:cNvSpPr>
-            <a:spLocks noGrp="1"/>
-          </p:cNvSpPr>
-          <p:nvPr>
-            <p:ph type="sldNum" sz="quarter" idx="12"/>
-          </p:nvPr>
-        </p:nvSpPr>
-        <p:spPr/>
-        <p:txBody>
-          <a:bodyPr/>
-          <a:lstStyle/>
-          <a:p>
-            <a:fld id="{7DCD6803-3BAA-44F6-A698-23D950C9713B}" type="slidenum">
-              <a:rPr lang="de-AT" smtClean="0"/>
-              <a:pPr/>
-              <a:t>14</a:t>
-            </a:fld>
-            <a:endParaRPr lang="de-AT"/>
-          </a:p>
-        </p:txBody>
-      </p:sp>
-      <p:sp>
-        <p:nvSpPr>
-          <p:cNvPr id="6" name="Textfeld 5">
-            <a:extLst>
-              <a:ext uri="{FF2B5EF4-FFF2-40B4-BE49-F238E27FC236}">
-                <a16:creationId xmlns:a16="http://schemas.microsoft.com/office/drawing/2014/main" id="{44B73665-3D46-BD7A-F384-EC7A37F3E3EA}"/>
-              </a:ext>
-            </a:extLst>
-          </p:cNvPr>
-          <p:cNvSpPr txBox="1"/>
-          <p:nvPr/>
-        </p:nvSpPr>
-        <p:spPr>
-          <a:xfrm>
-            <a:off x="746646" y="2828835"/>
-            <a:ext cx="6075907" cy="1200329"/>
-          </a:xfrm>
-          <a:prstGeom prst="rect">
-            <a:avLst/>
-          </a:prstGeom>
-          <a:noFill/>
-        </p:spPr>
-        <p:txBody>
-          <a:bodyPr wrap="square" rtlCol="0">
-            <a:spAutoFit/>
-          </a:bodyPr>
-          <a:lstStyle/>
-          <a:p>
-            <a:r>
-              <a:rPr lang="de-DE" sz="7200" dirty="0">
-                <a:solidFill>
-                  <a:srgbClr val="9BBB59"/>
-                </a:solidFill>
-              </a:rPr>
-              <a:t>Zusatz</a:t>
-            </a:r>
-            <a:endParaRPr lang="en-US" sz="6600" dirty="0">
-              <a:solidFill>
-                <a:srgbClr val="9BBB59"/>
-              </a:solidFill>
-            </a:endParaRPr>
-          </a:p>
-        </p:txBody>
-      </p:sp>
-    </p:spTree>
-    <p:extLst>
-      <p:ext uri="{BB962C8B-B14F-4D97-AF65-F5344CB8AC3E}">
-        <p14:creationId xmlns:p14="http://schemas.microsoft.com/office/powerpoint/2010/main" val="1846633128"/>
       </p:ext>
     </p:extLst>
   </p:cSld>
@@ -4987,138 +5364,10 @@
       </p:grpSpPr>
       <p:sp>
         <p:nvSpPr>
-          <p:cNvPr id="2" name="Titel 1">
-            <a:extLst>
-              <a:ext uri="{FF2B5EF4-FFF2-40B4-BE49-F238E27FC236}">
-                <a16:creationId xmlns:a16="http://schemas.microsoft.com/office/drawing/2014/main" id="{C07E26C7-4C51-12BD-B6ED-59ED0456DB3A}"/>
-              </a:ext>
-            </a:extLst>
-          </p:cNvPr>
-          <p:cNvSpPr>
-            <a:spLocks noGrp="1"/>
-          </p:cNvSpPr>
-          <p:nvPr>
-            <p:ph type="title"/>
-          </p:nvPr>
-        </p:nvSpPr>
-        <p:spPr/>
-        <p:txBody>
-          <a:bodyPr/>
-          <a:lstStyle/>
-          <a:p>
-            <a:r>
-              <a:rPr lang="de-DE" dirty="0"/>
-              <a:t>PM </a:t>
-            </a:r>
-            <a:r>
-              <a:rPr lang="de-AT" noProof="0" dirty="0"/>
-              <a:t>–</a:t>
-            </a:r>
-            <a:r>
-              <a:rPr lang="de-DE" dirty="0"/>
-              <a:t> Meilensteine</a:t>
-            </a:r>
-            <a:endParaRPr lang="en-GB" dirty="0"/>
-          </a:p>
-        </p:txBody>
-      </p:sp>
-      <p:sp>
-        <p:nvSpPr>
-          <p:cNvPr id="3" name="Inhaltsplatzhalter 2">
-            <a:extLst>
-              <a:ext uri="{FF2B5EF4-FFF2-40B4-BE49-F238E27FC236}">
-                <a16:creationId xmlns:a16="http://schemas.microsoft.com/office/drawing/2014/main" id="{2298BAD1-D334-3EB5-39F2-5148AD4E9548}"/>
-              </a:ext>
-            </a:extLst>
-          </p:cNvPr>
-          <p:cNvSpPr>
-            <a:spLocks noGrp="1"/>
-          </p:cNvSpPr>
-          <p:nvPr>
-            <p:ph idx="1"/>
-          </p:nvPr>
-        </p:nvSpPr>
-        <p:spPr/>
-        <p:txBody>
-          <a:bodyPr>
-            <a:normAutofit lnSpcReduction="10000"/>
-          </a:bodyPr>
-          <a:lstStyle/>
-          <a:p>
-            <a:r>
-              <a:rPr lang="de-DE" sz="3200" dirty="0"/>
-              <a:t>2024-02-23: Genehmigung der DA</a:t>
-            </a:r>
-          </a:p>
-          <a:p>
-            <a:pPr lvl="1"/>
-            <a:r>
-              <a:rPr lang="de-DE" sz="2800" dirty="0"/>
-              <a:t>Einreichen des Antrags durch die Schüler</a:t>
-            </a:r>
-          </a:p>
-          <a:p>
-            <a:pPr lvl="1"/>
-            <a:r>
-              <a:rPr lang="de-DE" sz="2800" dirty="0"/>
-              <a:t>DA Dokumentation wurde ausgefüllt und unterschrieben</a:t>
-            </a:r>
-          </a:p>
-          <a:p>
-            <a:r>
-              <a:rPr lang="de-DE" sz="3200" dirty="0"/>
-              <a:t>2024-05-09: Projektplan Grobentwurf fertig</a:t>
-            </a:r>
-          </a:p>
-          <a:p>
-            <a:pPr lvl="1"/>
-            <a:r>
-              <a:rPr lang="de-DE" sz="2800" dirty="0"/>
-              <a:t>Zielsetzung ausgefüllt</a:t>
-            </a:r>
-          </a:p>
-          <a:p>
-            <a:pPr lvl="1"/>
-            <a:r>
-              <a:rPr lang="de-DE" sz="2800" dirty="0"/>
-              <a:t>Projektplan ausgefüllt</a:t>
-            </a:r>
-          </a:p>
-          <a:p>
-            <a:r>
-              <a:rPr lang="de-DE" sz="3200" dirty="0"/>
-              <a:t>2024-06-01: Hardware Komponenten Recherche fertig</a:t>
-            </a:r>
-          </a:p>
-          <a:p>
-            <a:pPr lvl="1"/>
-            <a:r>
-              <a:rPr lang="de-DE" sz="2800" dirty="0"/>
-              <a:t>Bestimmung der Komponenten</a:t>
-            </a:r>
-          </a:p>
-          <a:p>
-            <a:pPr lvl="1"/>
-            <a:r>
-              <a:rPr lang="de-DE" sz="2800" dirty="0"/>
-              <a:t>Preisrechnung</a:t>
-            </a:r>
-          </a:p>
-          <a:p>
-            <a:pPr lvl="1"/>
-            <a:r>
-              <a:rPr lang="de-DE" sz="2800" dirty="0"/>
-              <a:t>Terminrechnung</a:t>
-            </a:r>
-          </a:p>
-        </p:txBody>
-      </p:sp>
-      <p:sp>
-        <p:nvSpPr>
           <p:cNvPr id="4" name="Fußzeilenplatzhalter 3">
             <a:extLst>
               <a:ext uri="{FF2B5EF4-FFF2-40B4-BE49-F238E27FC236}">
-                <a16:creationId xmlns:a16="http://schemas.microsoft.com/office/drawing/2014/main" id="{DA87C74A-4E8C-97BD-B263-9ECDD3FA2390}"/>
+                <a16:creationId xmlns:a16="http://schemas.microsoft.com/office/drawing/2014/main" id="{B3CE102D-CC78-4BE1-BDB4-67D0F8D57C56}"/>
               </a:ext>
             </a:extLst>
           </p:cNvPr>
@@ -5146,7 +5395,7 @@
           <p:cNvPr id="5" name="Foliennummernplatzhalter 4">
             <a:extLst>
               <a:ext uri="{FF2B5EF4-FFF2-40B4-BE49-F238E27FC236}">
-                <a16:creationId xmlns:a16="http://schemas.microsoft.com/office/drawing/2014/main" id="{4A1C692A-074F-9345-4CEE-48C0116BFCA0}"/>
+                <a16:creationId xmlns:a16="http://schemas.microsoft.com/office/drawing/2014/main" id="{F8884CDD-B6BF-5A0E-36BE-3463B7C68BE9}"/>
               </a:ext>
             </a:extLst>
           </p:cNvPr>
@@ -5171,10 +5420,54 @@
           </a:p>
         </p:txBody>
       </p:sp>
+      <p:sp>
+        <p:nvSpPr>
+          <p:cNvPr id="6" name="Textfeld 5">
+            <a:extLst>
+              <a:ext uri="{FF2B5EF4-FFF2-40B4-BE49-F238E27FC236}">
+                <a16:creationId xmlns:a16="http://schemas.microsoft.com/office/drawing/2014/main" id="{44B73665-3D46-BD7A-F384-EC7A37F3E3EA}"/>
+              </a:ext>
+            </a:extLst>
+          </p:cNvPr>
+          <p:cNvSpPr txBox="1"/>
+          <p:nvPr/>
+        </p:nvSpPr>
+        <p:spPr>
+          <a:xfrm>
+            <a:off x="800434" y="2882623"/>
+            <a:ext cx="6075907" cy="1200329"/>
+          </a:xfrm>
+          <a:prstGeom prst="rect">
+            <a:avLst/>
+          </a:prstGeom>
+          <a:noFill/>
+        </p:spPr>
+        <p:txBody>
+          <a:bodyPr wrap="square" rtlCol="0">
+            <a:spAutoFit/>
+          </a:bodyPr>
+          <a:lstStyle/>
+          <a:p>
+            <a:r>
+              <a:rPr lang="de-DE" sz="7200" dirty="0">
+                <a:solidFill>
+                  <a:srgbClr val="9BBB59"/>
+                </a:solidFill>
+              </a:rPr>
+              <a:t>Zusatz</a:t>
+            </a:r>
+            <a:endParaRPr lang="en-US" sz="6600" dirty="0">
+              <a:solidFill>
+                <a:srgbClr val="9BBB59"/>
+              </a:solidFill>
+            </a:endParaRPr>
+          </a:p>
+        </p:txBody>
+      </p:sp>
     </p:spTree>
     <p:extLst>
       <p:ext uri="{BB962C8B-B14F-4D97-AF65-F5344CB8AC3E}">
-        <p14:creationId xmlns:p14="http://schemas.microsoft.com/office/powerpoint/2010/main" val="1145892815"/>
+        <p14:creationId xmlns:p14="http://schemas.microsoft.com/office/powerpoint/2010/main" val="1846633128"/>
       </p:ext>
     </p:extLst>
   </p:cSld>
@@ -5206,7 +5499,7 @@
           <p:cNvPr id="2" name="Titel 1">
             <a:extLst>
               <a:ext uri="{FF2B5EF4-FFF2-40B4-BE49-F238E27FC236}">
-                <a16:creationId xmlns:a16="http://schemas.microsoft.com/office/drawing/2014/main" id="{2E604182-9A1C-D7E8-6042-EDDB2477F9DA}"/>
+                <a16:creationId xmlns:a16="http://schemas.microsoft.com/office/drawing/2014/main" id="{C07E26C7-4C51-12BD-B6ED-59ED0456DB3A}"/>
               </a:ext>
             </a:extLst>
           </p:cNvPr>
@@ -5243,7 +5536,7 @@
           <p:cNvPr id="3" name="Inhaltsplatzhalter 2">
             <a:extLst>
               <a:ext uri="{FF2B5EF4-FFF2-40B4-BE49-F238E27FC236}">
-                <a16:creationId xmlns:a16="http://schemas.microsoft.com/office/drawing/2014/main" id="{46FFA03D-AD87-DE6E-5C59-97B054813CE7}"/>
+                <a16:creationId xmlns:a16="http://schemas.microsoft.com/office/drawing/2014/main" id="{2298BAD1-D334-3EB5-39F2-5148AD4E9548}"/>
               </a:ext>
             </a:extLst>
           </p:cNvPr>
@@ -5261,133 +5554,70 @@
           </a:bodyPr>
           <a:lstStyle/>
           <a:p>
-            <a:pPr>
-              <a:spcBef>
-                <a:spcPts val="624"/>
-              </a:spcBef>
-              <a:buSzPts val="2600"/>
-            </a:pPr>
-            <a:r>
-              <a:rPr lang="de-DE" sz="3200" dirty="0">
-                <a:solidFill>
-                  <a:srgbClr val="000000"/>
-                </a:solidFill>
-                <a:latin typeface="Calibri" panose="020F0502020204030204" pitchFamily="34" charset="0"/>
-              </a:rPr>
-              <a:t>2024-06-17: Datenbanken fertig</a:t>
-            </a:r>
-            <a:endParaRPr lang="en-GB" sz="3200" dirty="0">
-              <a:solidFill>
-                <a:srgbClr val="000000"/>
-              </a:solidFill>
-              <a:latin typeface="Calibri" panose="020F0502020204030204" pitchFamily="34" charset="0"/>
-            </a:endParaRPr>
-          </a:p>
-          <a:p>
-            <a:pPr lvl="1">
-              <a:spcBef>
-                <a:spcPts val="624"/>
-              </a:spcBef>
-              <a:buSzPts val="2600"/>
-            </a:pPr>
-            <a:r>
-              <a:rPr lang="de-DE" sz="2800" kern="1200" dirty="0">
-                <a:solidFill>
-                  <a:srgbClr val="000000"/>
-                </a:solidFill>
-                <a:effectLst/>
-                <a:latin typeface="Calibri" panose="020F0502020204030204" pitchFamily="34" charset="0"/>
-                <a:ea typeface="+mn-ea"/>
-                <a:cs typeface="+mn-cs"/>
-              </a:rPr>
-              <a:t>Allgemeine Container Informationen</a:t>
-            </a:r>
-            <a:endParaRPr lang="en-GB" sz="2800" dirty="0">
-              <a:effectLst/>
-            </a:endParaRPr>
+            <a:r>
+              <a:rPr lang="de-DE" sz="3200" dirty="0"/>
+              <a:t>2024-02-23: Genehmigung der DA</a:t>
+            </a:r>
           </a:p>
           <a:p>
             <a:pPr lvl="1"/>
             <a:r>
-              <a:rPr lang="de-DE" sz="2800" kern="1200" dirty="0">
-                <a:solidFill>
-                  <a:srgbClr val="000000"/>
-                </a:solidFill>
-                <a:effectLst/>
-                <a:latin typeface="Calibri" panose="020F0502020204030204" pitchFamily="34" charset="0"/>
-                <a:ea typeface="+mn-ea"/>
-                <a:cs typeface="+mn-cs"/>
-              </a:rPr>
-              <a:t>Sensor Daten</a:t>
-            </a:r>
-          </a:p>
-          <a:p>
-            <a:pPr>
-              <a:spcBef>
-                <a:spcPts val="624"/>
-              </a:spcBef>
-              <a:buSzPts val="2600"/>
-            </a:pPr>
-            <a:r>
-              <a:rPr lang="de-DE" sz="3200" dirty="0">
-                <a:solidFill>
-                  <a:srgbClr val="000000"/>
-                </a:solidFill>
-                <a:latin typeface="Calibri" panose="020F0502020204030204" pitchFamily="34" charset="0"/>
-              </a:rPr>
-              <a:t>2024-06-24: Erstpräsentation der DA</a:t>
+              <a:rPr lang="de-DE" sz="2800" dirty="0"/>
+              <a:t>Einreichen des Antrags durch die Schüler</a:t>
             </a:r>
           </a:p>
           <a:p>
             <a:pPr lvl="1"/>
             <a:r>
               <a:rPr lang="de-DE" sz="2800" dirty="0"/>
-              <a:t>Fortschritt zusammenfassen</a:t>
+              <a:t>DA Dokumentation wurde ausgefüllt und unterschrieben</a:t>
+            </a:r>
+          </a:p>
+          <a:p>
+            <a:r>
+              <a:rPr lang="de-DE" sz="3200" dirty="0"/>
+              <a:t>2024-05-09: Projektplan Grobentwurf fertig</a:t>
             </a:r>
           </a:p>
           <a:p>
             <a:pPr lvl="1"/>
             <a:r>
               <a:rPr lang="de-DE" sz="2800" dirty="0"/>
-              <a:t>Gantt-Diagramm erstellen</a:t>
-            </a:r>
-          </a:p>
-          <a:p>
-            <a:pPr>
-              <a:spcBef>
-                <a:spcPts val="624"/>
-              </a:spcBef>
-              <a:buSzPts val="2600"/>
-            </a:pPr>
-            <a:r>
-              <a:rPr lang="de-DE" sz="3200" dirty="0">
-                <a:solidFill>
-                  <a:srgbClr val="000000"/>
-                </a:solidFill>
-                <a:latin typeface="Calibri" panose="020F0502020204030204" pitchFamily="34" charset="0"/>
-              </a:rPr>
-              <a:t>2024-07-04: Server Architektur fertig</a:t>
+              <a:t>Zielsetzung ausgefüllt</a:t>
             </a:r>
           </a:p>
           <a:p>
             <a:pPr lvl="1"/>
             <a:r>
               <a:rPr lang="de-DE" sz="2800" dirty="0"/>
-              <a:t>Server ist einsatzfähig</a:t>
+              <a:t>Projektplan ausgefüllt</a:t>
+            </a:r>
+          </a:p>
+          <a:p>
+            <a:r>
+              <a:rPr lang="de-DE" sz="3200" dirty="0"/>
+              <a:t>2024-06-01: Hardware Komponenten Recherche fertig</a:t>
             </a:r>
           </a:p>
           <a:p>
             <a:pPr lvl="1"/>
             <a:r>
               <a:rPr lang="de-DE" sz="2800" dirty="0"/>
-              <a:t>REST-Schnittstelle</a:t>
+              <a:t>Bestimmung der Komponenten</a:t>
             </a:r>
           </a:p>
           <a:p>
             <a:pPr lvl="1"/>
             <a:r>
               <a:rPr lang="de-DE" sz="2800" dirty="0"/>
-              <a:t>Zugriff kann von überall gestattet werden</a:t>
+              <a:t>Preisrechnung</a:t>
+            </a:r>
+          </a:p>
+          <a:p>
+            <a:pPr lvl="1"/>
+            <a:r>
+              <a:rPr lang="de-DE" sz="2800" dirty="0"/>
+              <a:t>Terminrechnung</a:t>
             </a:r>
           </a:p>
         </p:txBody>
@@ -5397,7 +5627,7 @@
           <p:cNvPr id="4" name="Fußzeilenplatzhalter 3">
             <a:extLst>
               <a:ext uri="{FF2B5EF4-FFF2-40B4-BE49-F238E27FC236}">
-                <a16:creationId xmlns:a16="http://schemas.microsoft.com/office/drawing/2014/main" id="{094214A7-8620-D9B8-3FED-82856E7D3EA2}"/>
+                <a16:creationId xmlns:a16="http://schemas.microsoft.com/office/drawing/2014/main" id="{DA87C74A-4E8C-97BD-B263-9ECDD3FA2390}"/>
               </a:ext>
             </a:extLst>
           </p:cNvPr>
@@ -5425,7 +5655,7 @@
           <p:cNvPr id="5" name="Foliennummernplatzhalter 4">
             <a:extLst>
               <a:ext uri="{FF2B5EF4-FFF2-40B4-BE49-F238E27FC236}">
-                <a16:creationId xmlns:a16="http://schemas.microsoft.com/office/drawing/2014/main" id="{BA839904-ECA7-79B3-C0EF-868137B9341E}"/>
+                <a16:creationId xmlns:a16="http://schemas.microsoft.com/office/drawing/2014/main" id="{4A1C692A-074F-9345-4CEE-48C0116BFCA0}"/>
               </a:ext>
             </a:extLst>
           </p:cNvPr>
@@ -5453,7 +5683,7 @@
     </p:spTree>
     <p:extLst>
       <p:ext uri="{BB962C8B-B14F-4D97-AF65-F5344CB8AC3E}">
-        <p14:creationId xmlns:p14="http://schemas.microsoft.com/office/powerpoint/2010/main" val="4010256110"/>
+        <p14:creationId xmlns:p14="http://schemas.microsoft.com/office/powerpoint/2010/main" val="1145892815"/>
       </p:ext>
     </p:extLst>
   </p:cSld>
@@ -5485,7 +5715,7 @@
           <p:cNvPr id="2" name="Titel 1">
             <a:extLst>
               <a:ext uri="{FF2B5EF4-FFF2-40B4-BE49-F238E27FC236}">
-                <a16:creationId xmlns:a16="http://schemas.microsoft.com/office/drawing/2014/main" id="{DA508D63-14D9-FB7A-7F5E-DBD26DA9D211}"/>
+                <a16:creationId xmlns:a16="http://schemas.microsoft.com/office/drawing/2014/main" id="{2E604182-9A1C-D7E8-6042-EDDB2477F9DA}"/>
               </a:ext>
             </a:extLst>
           </p:cNvPr>
@@ -5522,7 +5752,7 @@
           <p:cNvPr id="3" name="Inhaltsplatzhalter 2">
             <a:extLst>
               <a:ext uri="{FF2B5EF4-FFF2-40B4-BE49-F238E27FC236}">
-                <a16:creationId xmlns:a16="http://schemas.microsoft.com/office/drawing/2014/main" id="{96C92B48-A3B2-FA7C-965F-05D4644F25AC}"/>
+                <a16:creationId xmlns:a16="http://schemas.microsoft.com/office/drawing/2014/main" id="{46FFA03D-AD87-DE6E-5C59-97B054813CE7}"/>
               </a:ext>
             </a:extLst>
           </p:cNvPr>
@@ -5535,39 +5765,86 @@
         </p:nvSpPr>
         <p:spPr/>
         <p:txBody>
-          <a:bodyPr/>
-          <a:lstStyle/>
-          <a:p>
-            <a:r>
-              <a:rPr lang="de-DE" sz="3200" dirty="0"/>
-              <a:t>2024-09-04: Prototyp funktionell</a:t>
-            </a:r>
+          <a:bodyPr>
+            <a:normAutofit lnSpcReduction="10000"/>
+          </a:bodyPr>
+          <a:lstStyle/>
+          <a:p>
+            <a:pPr>
+              <a:spcBef>
+                <a:spcPts val="624"/>
+              </a:spcBef>
+              <a:buSzPts val="2600"/>
+            </a:pPr>
+            <a:r>
+              <a:rPr lang="de-DE" sz="3200" dirty="0">
+                <a:solidFill>
+                  <a:srgbClr val="000000"/>
+                </a:solidFill>
+                <a:latin typeface="Calibri" panose="020F0502020204030204" pitchFamily="34" charset="0"/>
+              </a:rPr>
+              <a:t>2024-06-17: Datenbanken fertig</a:t>
+            </a:r>
+            <a:endParaRPr lang="en-GB" sz="3200" dirty="0">
+              <a:solidFill>
+                <a:srgbClr val="000000"/>
+              </a:solidFill>
+              <a:latin typeface="Calibri" panose="020F0502020204030204" pitchFamily="34" charset="0"/>
+            </a:endParaRPr>
+          </a:p>
+          <a:p>
+            <a:pPr lvl="1">
+              <a:spcBef>
+                <a:spcPts val="624"/>
+              </a:spcBef>
+              <a:buSzPts val="2600"/>
+            </a:pPr>
+            <a:r>
+              <a:rPr lang="de-DE" sz="2800" kern="1200" dirty="0">
+                <a:solidFill>
+                  <a:srgbClr val="000000"/>
+                </a:solidFill>
+                <a:effectLst/>
+                <a:latin typeface="Calibri" panose="020F0502020204030204" pitchFamily="34" charset="0"/>
+                <a:ea typeface="+mn-ea"/>
+                <a:cs typeface="+mn-cs"/>
+              </a:rPr>
+              <a:t>Allgemeine Container Informationen</a:t>
+            </a:r>
+            <a:endParaRPr lang="en-GB" sz="2800" dirty="0">
+              <a:effectLst/>
+            </a:endParaRPr>
           </a:p>
           <a:p>
             <a:pPr lvl="1"/>
             <a:r>
-              <a:rPr lang="de-DE" sz="2800" dirty="0"/>
-              <a:t>Hardware Komponenten gekauft und geliefert</a:t>
-            </a:r>
-          </a:p>
-          <a:p>
-            <a:pPr lvl="1"/>
-            <a:r>
-              <a:rPr lang="de-DE" sz="2800" dirty="0"/>
-              <a:t>Löten der Komponenten</a:t>
-            </a:r>
-          </a:p>
-          <a:p>
-            <a:pPr lvl="1"/>
-            <a:r>
-              <a:rPr lang="de-DE" sz="2800" dirty="0"/>
-              <a:t>Datenübertragung mittels MQTT</a:t>
-            </a:r>
-          </a:p>
-          <a:p>
-            <a:r>
-              <a:rPr lang="de-DE" sz="3200" dirty="0"/>
-              <a:t>2024-10-23: Zweitpräsentation der DA</a:t>
+              <a:rPr lang="de-DE" sz="2800" kern="1200" dirty="0">
+                <a:solidFill>
+                  <a:srgbClr val="000000"/>
+                </a:solidFill>
+                <a:effectLst/>
+                <a:latin typeface="Calibri" panose="020F0502020204030204" pitchFamily="34" charset="0"/>
+                <a:ea typeface="+mn-ea"/>
+                <a:cs typeface="+mn-cs"/>
+              </a:rPr>
+              <a:t>Sensor Daten</a:t>
+            </a:r>
+          </a:p>
+          <a:p>
+            <a:pPr>
+              <a:spcBef>
+                <a:spcPts val="624"/>
+              </a:spcBef>
+              <a:buSzPts val="2600"/>
+            </a:pPr>
+            <a:r>
+              <a:rPr lang="de-DE" sz="3200" dirty="0">
+                <a:solidFill>
+                  <a:srgbClr val="000000"/>
+                </a:solidFill>
+                <a:latin typeface="Calibri" panose="020F0502020204030204" pitchFamily="34" charset="0"/>
+              </a:rPr>
+              <a:t>2024-06-24: Erstpräsentation der DA</a:t>
             </a:r>
           </a:p>
           <a:p>
@@ -5578,23 +5855,48 @@
             </a:r>
           </a:p>
           <a:p>
-            <a:r>
-              <a:rPr lang="de-DE" sz="3200" dirty="0"/>
-              <a:t>2024-11-03: Positionsalgorithmus funktionell</a:t>
-            </a:r>
-          </a:p>
-          <a:p>
             <a:pPr lvl="1"/>
             <a:r>
               <a:rPr lang="de-DE" sz="2800" dirty="0"/>
-              <a:t>Ungefähre Position des Containers</a:t>
+              <a:t>Gantt-Diagramm erstellen</a:t>
+            </a:r>
+          </a:p>
+          <a:p>
+            <a:pPr>
+              <a:spcBef>
+                <a:spcPts val="624"/>
+              </a:spcBef>
+              <a:buSzPts val="2600"/>
+            </a:pPr>
+            <a:r>
+              <a:rPr lang="de-DE" sz="3200" dirty="0">
+                <a:solidFill>
+                  <a:srgbClr val="000000"/>
+                </a:solidFill>
+                <a:latin typeface="Calibri" panose="020F0502020204030204" pitchFamily="34" charset="0"/>
+              </a:rPr>
+              <a:t>2024-07-04: Server Architektur fertig</a:t>
             </a:r>
           </a:p>
           <a:p>
             <a:pPr lvl="1"/>
             <a:r>
               <a:rPr lang="de-DE" sz="2800" dirty="0"/>
-              <a:t>Entfernung zu benachbarten Containern ermitteln</a:t>
+              <a:t>Server ist einsatzfähig</a:t>
+            </a:r>
+          </a:p>
+          <a:p>
+            <a:pPr lvl="1"/>
+            <a:r>
+              <a:rPr lang="de-DE" sz="2800" dirty="0"/>
+              <a:t>REST-Schnittstelle</a:t>
+            </a:r>
+          </a:p>
+          <a:p>
+            <a:pPr lvl="1"/>
+            <a:r>
+              <a:rPr lang="de-DE" sz="2800" dirty="0"/>
+              <a:t>Zugriff kann von überall gestattet werden</a:t>
             </a:r>
           </a:p>
         </p:txBody>
@@ -5604,7 +5906,7 @@
           <p:cNvPr id="4" name="Fußzeilenplatzhalter 3">
             <a:extLst>
               <a:ext uri="{FF2B5EF4-FFF2-40B4-BE49-F238E27FC236}">
-                <a16:creationId xmlns:a16="http://schemas.microsoft.com/office/drawing/2014/main" id="{D2F6F857-2994-C8CD-13E0-FC23FA81066F}"/>
+                <a16:creationId xmlns:a16="http://schemas.microsoft.com/office/drawing/2014/main" id="{094214A7-8620-D9B8-3FED-82856E7D3EA2}"/>
               </a:ext>
             </a:extLst>
           </p:cNvPr>
@@ -5632,7 +5934,7 @@
           <p:cNvPr id="5" name="Foliennummernplatzhalter 4">
             <a:extLst>
               <a:ext uri="{FF2B5EF4-FFF2-40B4-BE49-F238E27FC236}">
-                <a16:creationId xmlns:a16="http://schemas.microsoft.com/office/drawing/2014/main" id="{33BFEAC2-79B3-54F2-A284-E5D35994050E}"/>
+                <a16:creationId xmlns:a16="http://schemas.microsoft.com/office/drawing/2014/main" id="{BA839904-ECA7-79B3-C0EF-868137B9341E}"/>
               </a:ext>
             </a:extLst>
           </p:cNvPr>
@@ -5660,7 +5962,7 @@
     </p:spTree>
     <p:extLst>
       <p:ext uri="{BB962C8B-B14F-4D97-AF65-F5344CB8AC3E}">
-        <p14:creationId xmlns:p14="http://schemas.microsoft.com/office/powerpoint/2010/main" val="1080840057"/>
+        <p14:creationId xmlns:p14="http://schemas.microsoft.com/office/powerpoint/2010/main" val="4010256110"/>
       </p:ext>
     </p:extLst>
   </p:cSld>
@@ -5692,7 +5994,7 @@
           <p:cNvPr id="2" name="Titel 1">
             <a:extLst>
               <a:ext uri="{FF2B5EF4-FFF2-40B4-BE49-F238E27FC236}">
-                <a16:creationId xmlns:a16="http://schemas.microsoft.com/office/drawing/2014/main" id="{792DCE68-0D3F-8C2C-0D12-EEB46A71510A}"/>
+                <a16:creationId xmlns:a16="http://schemas.microsoft.com/office/drawing/2014/main" id="{DA508D63-14D9-FB7A-7F5E-DBD26DA9D211}"/>
               </a:ext>
             </a:extLst>
           </p:cNvPr>
@@ -5729,7 +6031,7 @@
           <p:cNvPr id="3" name="Inhaltsplatzhalter 2">
             <a:extLst>
               <a:ext uri="{FF2B5EF4-FFF2-40B4-BE49-F238E27FC236}">
-                <a16:creationId xmlns:a16="http://schemas.microsoft.com/office/drawing/2014/main" id="{B837814D-07B7-2CD5-114B-36749EC8AC43}"/>
+                <a16:creationId xmlns:a16="http://schemas.microsoft.com/office/drawing/2014/main" id="{96C92B48-A3B2-FA7C-965F-05D4644F25AC}"/>
               </a:ext>
             </a:extLst>
           </p:cNvPr>
@@ -5742,112 +6044,66 @@
         </p:nvSpPr>
         <p:spPr/>
         <p:txBody>
-          <a:bodyPr>
-            <a:normAutofit lnSpcReduction="10000"/>
-          </a:bodyPr>
+          <a:bodyPr/>
           <a:lstStyle/>
           <a:p>
             <a:r>
               <a:rPr lang="de-DE" sz="3200" dirty="0"/>
-              <a:t>2024-11-30: (</a:t>
-            </a:r>
-            <a:r>
-              <a:rPr lang="de-DE" sz="3200" dirty="0" err="1"/>
-              <a:t>Directed</a:t>
-            </a:r>
+              <a:t>2024-09-04: Prototyp funktionell</a:t>
+            </a:r>
+          </a:p>
+          <a:p>
+            <a:pPr lvl="1"/>
+            <a:r>
+              <a:rPr lang="de-DE" sz="2800" dirty="0"/>
+              <a:t>Hardware Komponenten gekauft und geliefert</a:t>
+            </a:r>
+          </a:p>
+          <a:p>
+            <a:pPr lvl="1"/>
+            <a:r>
+              <a:rPr lang="de-DE" sz="2800" dirty="0"/>
+              <a:t>Löten der Komponenten</a:t>
+            </a:r>
+          </a:p>
+          <a:p>
+            <a:pPr lvl="1"/>
+            <a:r>
+              <a:rPr lang="de-DE" sz="2800" dirty="0"/>
+              <a:t>Datenübertragung mittels MQTT</a:t>
+            </a:r>
+          </a:p>
+          <a:p>
             <a:r>
               <a:rPr lang="de-DE" sz="3200" dirty="0"/>
-              <a:t> </a:t>
-            </a:r>
-            <a:r>
-              <a:rPr lang="de-DE" sz="3200" dirty="0" err="1"/>
-              <a:t>Draggable</a:t>
-            </a:r>
+              <a:t>2024-10-23: Zweitpräsentation der DA</a:t>
+            </a:r>
+          </a:p>
+          <a:p>
+            <a:pPr lvl="1"/>
+            <a:r>
+              <a:rPr lang="de-DE" sz="2800" dirty="0"/>
+              <a:t>Fortschritt zusammenfassen</a:t>
+            </a:r>
+          </a:p>
+          <a:p>
             <a:r>
               <a:rPr lang="de-DE" sz="3200" dirty="0"/>
-              <a:t>) Graph Visualisierung</a:t>
-            </a:r>
-          </a:p>
-          <a:p>
-            <a:pPr lvl="1">
-              <a:buFont typeface="Arial" panose="020B0604020202020204" pitchFamily="34" charset="0"/>
-              <a:buChar char="•"/>
-            </a:pPr>
+              <a:t>2024-11-03: Positionsalgorithmus funktionell</a:t>
+            </a:r>
+          </a:p>
+          <a:p>
+            <a:pPr lvl="1"/>
             <a:r>
               <a:rPr lang="de-DE" sz="2800" dirty="0"/>
-              <a:t>Container Entfernungen zu anderen visualisieren</a:t>
-            </a:r>
-          </a:p>
-          <a:p>
-            <a:pPr lvl="1">
-              <a:buFont typeface="Arial" panose="020B0604020202020204" pitchFamily="34" charset="0"/>
-              <a:buChar char="•"/>
-            </a:pPr>
+              <a:t>Ungefähre Position des Containers</a:t>
+            </a:r>
+          </a:p>
+          <a:p>
+            <a:pPr lvl="1"/>
             <a:r>
               <a:rPr lang="de-DE" sz="2800" dirty="0"/>
-              <a:t>Bewegbare Knoten</a:t>
-            </a:r>
-          </a:p>
-          <a:p>
-            <a:r>
-              <a:rPr lang="de-DE" sz="3200" dirty="0"/>
-              <a:t>2025-01-31: Webanwendung funktionell</a:t>
-            </a:r>
-          </a:p>
-          <a:p>
-            <a:pPr lvl="1">
-              <a:buFont typeface="Arial" panose="020B0604020202020204" pitchFamily="34" charset="0"/>
-              <a:buChar char="•"/>
-            </a:pPr>
-            <a:r>
-              <a:rPr lang="de-DE" sz="2800" dirty="0"/>
-              <a:t>Datenabfrage möglich</a:t>
-            </a:r>
-          </a:p>
-          <a:p>
-            <a:pPr lvl="1">
-              <a:buFont typeface="Arial" panose="020B0604020202020204" pitchFamily="34" charset="0"/>
-              <a:buChar char="•"/>
-            </a:pPr>
-            <a:r>
-              <a:rPr lang="de-DE" sz="2800" dirty="0"/>
-              <a:t>Ansprechende GUI</a:t>
-            </a:r>
-          </a:p>
-          <a:p>
-            <a:r>
-              <a:rPr lang="de-DE" sz="3200" dirty="0"/>
-              <a:t>2025-03-07: Finale Abgabe der DA</a:t>
-            </a:r>
-          </a:p>
-          <a:p>
-            <a:pPr lvl="1">
-              <a:buFont typeface="Arial" panose="020B0604020202020204" pitchFamily="34" charset="0"/>
-              <a:buChar char="•"/>
-            </a:pPr>
-            <a:r>
-              <a:rPr lang="de-DE" sz="2800" dirty="0"/>
-              <a:t>Korrektur gelesen</a:t>
-            </a:r>
-          </a:p>
-          <a:p>
-            <a:pPr lvl="1">
-              <a:buFont typeface="Arial" panose="020B0604020202020204" pitchFamily="34" charset="0"/>
-              <a:buChar char="•"/>
-            </a:pPr>
-            <a:r>
-              <a:rPr lang="de-DE" sz="2800" dirty="0"/>
-              <a:t>Alle drei Subthemen fertig</a:t>
-            </a:r>
-          </a:p>
-          <a:p>
-            <a:pPr lvl="1">
-              <a:buFont typeface="Arial" panose="020B0604020202020204" pitchFamily="34" charset="0"/>
-              <a:buChar char="•"/>
-            </a:pPr>
-            <a:r>
-              <a:rPr lang="de-DE" sz="2800" dirty="0"/>
-              <a:t>DA eingereicht</a:t>
+              <a:t>Entfernung zu benachbarten Containern ermitteln</a:t>
             </a:r>
           </a:p>
         </p:txBody>
@@ -5857,7 +6113,7 @@
           <p:cNvPr id="4" name="Fußzeilenplatzhalter 3">
             <a:extLst>
               <a:ext uri="{FF2B5EF4-FFF2-40B4-BE49-F238E27FC236}">
-                <a16:creationId xmlns:a16="http://schemas.microsoft.com/office/drawing/2014/main" id="{99A8227C-DF98-8867-4DC3-48318CD78C6E}"/>
+                <a16:creationId xmlns:a16="http://schemas.microsoft.com/office/drawing/2014/main" id="{D2F6F857-2994-C8CD-13E0-FC23FA81066F}"/>
               </a:ext>
             </a:extLst>
           </p:cNvPr>
@@ -5874,10 +6130,9 @@
           <a:lstStyle/>
           <a:p>
             <a:r>
-              <a:rPr lang="de-AT"/>
+              <a:rPr lang="de-AT" dirty="0"/>
               <a:t>CONTRUDE Schrempf</a:t>
             </a:r>
-            <a:endParaRPr lang="de-AT" dirty="0"/>
           </a:p>
         </p:txBody>
       </p:sp>
@@ -5886,7 +6141,7 @@
           <p:cNvPr id="5" name="Foliennummernplatzhalter 4">
             <a:extLst>
               <a:ext uri="{FF2B5EF4-FFF2-40B4-BE49-F238E27FC236}">
-                <a16:creationId xmlns:a16="http://schemas.microsoft.com/office/drawing/2014/main" id="{B275833A-3DE0-18E2-4BDF-A4E7798E9AB6}"/>
+                <a16:creationId xmlns:a16="http://schemas.microsoft.com/office/drawing/2014/main" id="{33BFEAC2-79B3-54F2-A284-E5D35994050E}"/>
               </a:ext>
             </a:extLst>
           </p:cNvPr>
@@ -5914,7 +6169,7 @@
     </p:spTree>
     <p:extLst>
       <p:ext uri="{BB962C8B-B14F-4D97-AF65-F5344CB8AC3E}">
-        <p14:creationId xmlns:p14="http://schemas.microsoft.com/office/powerpoint/2010/main" val="2908451006"/>
+        <p14:creationId xmlns:p14="http://schemas.microsoft.com/office/powerpoint/2010/main" val="1080840057"/>
       </p:ext>
     </p:extLst>
   </p:cSld>
@@ -5946,7 +6201,7 @@
           <p:cNvPr id="2" name="Titel 1">
             <a:extLst>
               <a:ext uri="{FF2B5EF4-FFF2-40B4-BE49-F238E27FC236}">
-                <a16:creationId xmlns:a16="http://schemas.microsoft.com/office/drawing/2014/main" id="{0352F495-BAD0-3200-6FE9-D6D86085AC9B}"/>
+                <a16:creationId xmlns:a16="http://schemas.microsoft.com/office/drawing/2014/main" id="{792DCE68-0D3F-8C2C-0D12-EEB46A71510A}"/>
               </a:ext>
             </a:extLst>
           </p:cNvPr>
@@ -5964,7 +6219,15 @@
           <a:p>
             <a:r>
               <a:rPr lang="de-DE" dirty="0"/>
-              <a:t>Literatur</a:t>
+              <a:t>PM </a:t>
+            </a:r>
+            <a:r>
+              <a:rPr lang="de-AT" noProof="0" dirty="0"/>
+              <a:t>–</a:t>
+            </a:r>
+            <a:r>
+              <a:rPr lang="de-DE" dirty="0"/>
+              <a:t> Meilensteine</a:t>
             </a:r>
             <a:endParaRPr lang="en-GB" dirty="0"/>
           </a:p>
@@ -5975,7 +6238,7 @@
           <p:cNvPr id="3" name="Inhaltsplatzhalter 2">
             <a:extLst>
               <a:ext uri="{FF2B5EF4-FFF2-40B4-BE49-F238E27FC236}">
-                <a16:creationId xmlns:a16="http://schemas.microsoft.com/office/drawing/2014/main" id="{2ECCEE14-815E-B183-E17D-8CF5C1206112}"/>
+                <a16:creationId xmlns:a16="http://schemas.microsoft.com/office/drawing/2014/main" id="{B837814D-07B7-2CD5-114B-36749EC8AC43}"/>
               </a:ext>
             </a:extLst>
           </p:cNvPr>
@@ -5988,53 +6251,113 @@
         </p:nvSpPr>
         <p:spPr/>
         <p:txBody>
-          <a:bodyPr/>
-          <a:lstStyle/>
-          <a:p>
-            <a:r>
-              <a:rPr lang="en-GB" b="0" i="0" dirty="0">
-                <a:effectLst/>
-                <a:latin typeface="Whitney"/>
-              </a:rPr>
-              <a:t>O’Reilly Media – </a:t>
-            </a:r>
-            <a:r>
-              <a:rPr lang="de-DE" b="0" i="0" dirty="0">
-                <a:effectLst/>
-                <a:latin typeface="Whitney"/>
-              </a:rPr>
-              <a:t>R</a:t>
-            </a:r>
-            <a:r>
-              <a:rPr lang="de-DE" dirty="0"/>
-              <a:t>EST API Design </a:t>
-            </a:r>
-            <a:r>
-              <a:rPr lang="de-DE" dirty="0" err="1"/>
-              <a:t>Rulebook</a:t>
-            </a:r>
-            <a:endParaRPr lang="de-DE" dirty="0"/>
-          </a:p>
-          <a:p>
-            <a:r>
-              <a:rPr lang="de-DE" dirty="0">
-                <a:solidFill>
-                  <a:srgbClr val="002021"/>
-                </a:solidFill>
-                <a:highlight>
-                  <a:srgbClr val="FFFFFF"/>
-                </a:highlight>
-                <a:latin typeface="Google Sans"/>
-              </a:rPr>
-              <a:t>ChatGPT-Abfragen</a:t>
-            </a:r>
-            <a:endParaRPr lang="en-GB" b="0" i="0" dirty="0">
-              <a:effectLst/>
-              <a:latin typeface="Whitney"/>
-            </a:endParaRPr>
-          </a:p>
-          <a:p>
-            <a:endParaRPr lang="en-GB" dirty="0"/>
+          <a:bodyPr>
+            <a:normAutofit lnSpcReduction="10000"/>
+          </a:bodyPr>
+          <a:lstStyle/>
+          <a:p>
+            <a:r>
+              <a:rPr lang="de-DE" sz="3200" dirty="0"/>
+              <a:t>2024-11-30: (</a:t>
+            </a:r>
+            <a:r>
+              <a:rPr lang="de-DE" sz="3200" dirty="0" err="1"/>
+              <a:t>Directed</a:t>
+            </a:r>
+            <a:r>
+              <a:rPr lang="de-DE" sz="3200" dirty="0"/>
+              <a:t> </a:t>
+            </a:r>
+            <a:r>
+              <a:rPr lang="de-DE" sz="3200" dirty="0" err="1"/>
+              <a:t>Draggable</a:t>
+            </a:r>
+            <a:r>
+              <a:rPr lang="de-DE" sz="3200" dirty="0"/>
+              <a:t>) Graph Visualisierung</a:t>
+            </a:r>
+          </a:p>
+          <a:p>
+            <a:pPr lvl="1">
+              <a:buFont typeface="Arial" panose="020B0604020202020204" pitchFamily="34" charset="0"/>
+              <a:buChar char="•"/>
+            </a:pPr>
+            <a:r>
+              <a:rPr lang="de-DE" sz="2800" dirty="0"/>
+              <a:t>Container Entfernungen zu anderen visualisieren</a:t>
+            </a:r>
+          </a:p>
+          <a:p>
+            <a:pPr lvl="1">
+              <a:buFont typeface="Arial" panose="020B0604020202020204" pitchFamily="34" charset="0"/>
+              <a:buChar char="•"/>
+            </a:pPr>
+            <a:r>
+              <a:rPr lang="de-DE" sz="2800" dirty="0"/>
+              <a:t>Bewegbare Knoten</a:t>
+            </a:r>
+          </a:p>
+          <a:p>
+            <a:r>
+              <a:rPr lang="de-DE" sz="3200" dirty="0"/>
+              <a:t>2025-01-31: Webanwendung funktionell</a:t>
+            </a:r>
+          </a:p>
+          <a:p>
+            <a:pPr lvl="1">
+              <a:buFont typeface="Arial" panose="020B0604020202020204" pitchFamily="34" charset="0"/>
+              <a:buChar char="•"/>
+            </a:pPr>
+            <a:r>
+              <a:rPr lang="de-DE" sz="2800" dirty="0"/>
+              <a:t>Datenabfrage möglich</a:t>
+            </a:r>
+          </a:p>
+          <a:p>
+            <a:pPr lvl="1">
+              <a:buFont typeface="Arial" panose="020B0604020202020204" pitchFamily="34" charset="0"/>
+              <a:buChar char="•"/>
+            </a:pPr>
+            <a:r>
+              <a:rPr lang="de-DE" sz="2800" dirty="0"/>
+              <a:t>Ansprechende GUI</a:t>
+            </a:r>
+          </a:p>
+          <a:p>
+            <a:r>
+              <a:rPr lang="de-DE" sz="3200" dirty="0"/>
+              <a:t>2025-03-07: Finale Abgabe der DA</a:t>
+            </a:r>
+          </a:p>
+          <a:p>
+            <a:pPr lvl="1">
+              <a:buFont typeface="Arial" panose="020B0604020202020204" pitchFamily="34" charset="0"/>
+              <a:buChar char="•"/>
+            </a:pPr>
+            <a:r>
+              <a:rPr lang="de-DE" sz="2800" dirty="0"/>
+              <a:t>Korrektur gelesen</a:t>
+            </a:r>
+          </a:p>
+          <a:p>
+            <a:pPr lvl="1">
+              <a:buFont typeface="Arial" panose="020B0604020202020204" pitchFamily="34" charset="0"/>
+              <a:buChar char="•"/>
+            </a:pPr>
+            <a:r>
+              <a:rPr lang="de-DE" sz="2800" dirty="0"/>
+              <a:t>Alle drei Subthemen fertig</a:t>
+            </a:r>
+          </a:p>
+          <a:p>
+            <a:pPr lvl="1">
+              <a:buFont typeface="Arial" panose="020B0604020202020204" pitchFamily="34" charset="0"/>
+              <a:buChar char="•"/>
+            </a:pPr>
+            <a:r>
+              <a:rPr lang="de-DE" sz="2800" dirty="0"/>
+              <a:t>DA eingereicht</a:t>
+            </a:r>
           </a:p>
         </p:txBody>
       </p:sp>
@@ -6043,7 +6366,7 @@
           <p:cNvPr id="4" name="Fußzeilenplatzhalter 3">
             <a:extLst>
               <a:ext uri="{FF2B5EF4-FFF2-40B4-BE49-F238E27FC236}">
-                <a16:creationId xmlns:a16="http://schemas.microsoft.com/office/drawing/2014/main" id="{81E70FB5-6AEA-CB48-FBE9-FA154C08D666}"/>
+                <a16:creationId xmlns:a16="http://schemas.microsoft.com/office/drawing/2014/main" id="{99A8227C-DF98-8867-4DC3-48318CD78C6E}"/>
               </a:ext>
             </a:extLst>
           </p:cNvPr>
@@ -6072,7 +6395,7 @@
           <p:cNvPr id="5" name="Foliennummernplatzhalter 4">
             <a:extLst>
               <a:ext uri="{FF2B5EF4-FFF2-40B4-BE49-F238E27FC236}">
-                <a16:creationId xmlns:a16="http://schemas.microsoft.com/office/drawing/2014/main" id="{FF5BC961-EB07-901E-E92D-797D766158DE}"/>
+                <a16:creationId xmlns:a16="http://schemas.microsoft.com/office/drawing/2014/main" id="{B275833A-3DE0-18E2-4BDF-A4E7798E9AB6}"/>
               </a:ext>
             </a:extLst>
           </p:cNvPr>
@@ -6100,7 +6423,7 @@
     </p:spTree>
     <p:extLst>
       <p:ext uri="{BB962C8B-B14F-4D97-AF65-F5344CB8AC3E}">
-        <p14:creationId xmlns:p14="http://schemas.microsoft.com/office/powerpoint/2010/main" val="2260846747"/>
+        <p14:creationId xmlns:p14="http://schemas.microsoft.com/office/powerpoint/2010/main" val="2908451006"/>
       </p:ext>
     </p:extLst>
   </p:cSld>
@@ -6270,7 +6593,7 @@
           <p:cNvPr id="2" name="Titel 1">
             <a:extLst>
               <a:ext uri="{FF2B5EF4-FFF2-40B4-BE49-F238E27FC236}">
-                <a16:creationId xmlns:a16="http://schemas.microsoft.com/office/drawing/2014/main" id="{366B6435-9459-7B22-BE3B-A911C6327046}"/>
+                <a16:creationId xmlns:a16="http://schemas.microsoft.com/office/drawing/2014/main" id="{0352F495-BAD0-3200-6FE9-D6D86085AC9B}"/>
               </a:ext>
             </a:extLst>
           </p:cNvPr>
@@ -6287,9 +6610,10 @@
           <a:lstStyle/>
           <a:p>
             <a:r>
-              <a:rPr lang="de-AT" dirty="0"/>
-              <a:t>Bildquellen</a:t>
-            </a:r>
+              <a:rPr lang="de-DE" dirty="0"/>
+              <a:t>Literatur</a:t>
+            </a:r>
+            <a:endParaRPr lang="en-GB" dirty="0"/>
           </a:p>
         </p:txBody>
       </p:sp>
@@ -6298,7 +6622,7 @@
           <p:cNvPr id="3" name="Inhaltsplatzhalter 2">
             <a:extLst>
               <a:ext uri="{FF2B5EF4-FFF2-40B4-BE49-F238E27FC236}">
-                <a16:creationId xmlns:a16="http://schemas.microsoft.com/office/drawing/2014/main" id="{E9600844-670E-9E47-9B44-DF36393CB30C}"/>
+                <a16:creationId xmlns:a16="http://schemas.microsoft.com/office/drawing/2014/main" id="{2ECCEE14-815E-B183-E17D-8CF5C1206112}"/>
               </a:ext>
             </a:extLst>
           </p:cNvPr>
@@ -6315,51 +6639,49 @@
           <a:lstStyle/>
           <a:p>
             <a:r>
-              <a:rPr lang="de-AT" dirty="0">
-                <a:hlinkClick r:id="rId2"/>
+              <a:rPr lang="en-GB" b="0" i="0" dirty="0">
+                <a:effectLst/>
+                <a:latin typeface="Whitney"/>
               </a:rPr>
-              <a:t>https://de.cleanpng.com/png-fsa3fn</a:t>
-            </a:r>
-            <a:r>
-              <a:rPr lang="de-AT" dirty="0"/>
-              <a:t> [18.04.2025]</a:t>
-            </a:r>
-          </a:p>
-          <a:p>
-            <a:r>
-              <a:rPr lang="de-AT" dirty="0">
-                <a:hlinkClick r:id="rId3"/>
+              <a:t>O’Reilly Media – </a:t>
+            </a:r>
+            <a:r>
+              <a:rPr lang="de-DE" b="0" i="0" dirty="0">
+                <a:effectLst/>
+                <a:latin typeface="Whitney"/>
               </a:rPr>
-              <a:t>https://www.sdgwatch.at</a:t>
-            </a:r>
-            <a:r>
-              <a:rPr lang="de-AT" dirty="0"/>
-              <a:t> [18.04.2025]</a:t>
-            </a:r>
-          </a:p>
-          <a:p>
-            <a:r>
-              <a:rPr lang="de-AT" dirty="0">
-                <a:hlinkClick r:id="rId4"/>
+              <a:t>R</a:t>
+            </a:r>
+            <a:r>
+              <a:rPr lang="de-DE" dirty="0"/>
+              <a:t>EST API Design </a:t>
+            </a:r>
+            <a:r>
+              <a:rPr lang="de-DE" dirty="0" err="1"/>
+              <a:t>Rulebook</a:t>
+            </a:r>
+            <a:endParaRPr lang="de-DE" dirty="0"/>
+          </a:p>
+          <a:p>
+            <a:r>
+              <a:rPr lang="de-DE" dirty="0">
+                <a:solidFill>
+                  <a:srgbClr val="002021"/>
+                </a:solidFill>
+                <a:highlight>
+                  <a:srgbClr val="FFFFFF"/>
+                </a:highlight>
+                <a:latin typeface="Google Sans"/>
               </a:rPr>
-              <a:t>https://thenounproject.com/icon/database-7670737</a:t>
-            </a:r>
-            <a:r>
-              <a:rPr lang="de-AT" dirty="0"/>
-              <a:t> [18.04.2025]</a:t>
-            </a:r>
-          </a:p>
-          <a:p>
-            <a:r>
-              <a:rPr lang="de-AT" dirty="0">
-                <a:hlinkClick r:id="rId5"/>
-              </a:rPr>
-              <a:t>https://www.svgrepo.com/svg/353829/grafana</a:t>
-            </a:r>
-            <a:r>
-              <a:rPr lang="de-AT" dirty="0"/>
-              <a:t> [18.04.2025]</a:t>
-            </a:r>
+              <a:t>ChatGPT-Abfragen</a:t>
+            </a:r>
+            <a:endParaRPr lang="en-GB" b="0" i="0" dirty="0">
+              <a:effectLst/>
+              <a:latin typeface="Whitney"/>
+            </a:endParaRPr>
+          </a:p>
+          <a:p>
+            <a:endParaRPr lang="en-GB" dirty="0"/>
           </a:p>
         </p:txBody>
       </p:sp>
@@ -6368,7 +6690,7 @@
           <p:cNvPr id="4" name="Fußzeilenplatzhalter 3">
             <a:extLst>
               <a:ext uri="{FF2B5EF4-FFF2-40B4-BE49-F238E27FC236}">
-                <a16:creationId xmlns:a16="http://schemas.microsoft.com/office/drawing/2014/main" id="{B4711875-828F-B56B-63D6-725C06E6E537}"/>
+                <a16:creationId xmlns:a16="http://schemas.microsoft.com/office/drawing/2014/main" id="{81E70FB5-6AEA-CB48-FBE9-FA154C08D666}"/>
               </a:ext>
             </a:extLst>
           </p:cNvPr>
@@ -6397,7 +6719,7 @@
           <p:cNvPr id="5" name="Foliennummernplatzhalter 4">
             <a:extLst>
               <a:ext uri="{FF2B5EF4-FFF2-40B4-BE49-F238E27FC236}">
-                <a16:creationId xmlns:a16="http://schemas.microsoft.com/office/drawing/2014/main" id="{75D391DE-B06F-7794-3334-D47E7860060B}"/>
+                <a16:creationId xmlns:a16="http://schemas.microsoft.com/office/drawing/2014/main" id="{FF5BC961-EB07-901E-E92D-797D766158DE}"/>
               </a:ext>
             </a:extLst>
           </p:cNvPr>
@@ -6425,7 +6747,661 @@
     </p:spTree>
     <p:extLst>
       <p:ext uri="{BB962C8B-B14F-4D97-AF65-F5344CB8AC3E}">
+        <p14:creationId xmlns:p14="http://schemas.microsoft.com/office/powerpoint/2010/main" val="2260846747"/>
+      </p:ext>
+    </p:extLst>
+  </p:cSld>
+  <p:clrMapOvr>
+    <a:masterClrMapping/>
+  </p:clrMapOvr>
+</p:sld>
+</file>
+
+<file path=ppt/slides/slide21.xml><?xml version="1.0" encoding="utf-8"?>
+<p:sld xmlns:a="http://schemas.openxmlformats.org/drawingml/2006/main" xmlns:r="http://schemas.openxmlformats.org/officeDocument/2006/relationships" xmlns:p="http://schemas.openxmlformats.org/presentationml/2006/main">
+  <p:cSld>
+    <p:spTree>
+      <p:nvGrpSpPr>
+        <p:cNvPr id="1" name=""/>
+        <p:cNvGrpSpPr/>
+        <p:nvPr/>
+      </p:nvGrpSpPr>
+      <p:grpSpPr>
+        <a:xfrm>
+          <a:off x="0" y="0"/>
+          <a:ext cx="0" cy="0"/>
+          <a:chOff x="0" y="0"/>
+          <a:chExt cx="0" cy="0"/>
+        </a:xfrm>
+      </p:grpSpPr>
+      <p:sp>
+        <p:nvSpPr>
+          <p:cNvPr id="4" name="Fußzeilenplatzhalter 3">
+            <a:extLst>
+              <a:ext uri="{FF2B5EF4-FFF2-40B4-BE49-F238E27FC236}">
+                <a16:creationId xmlns:a16="http://schemas.microsoft.com/office/drawing/2014/main" id="{52323336-2F30-F983-6641-76E2DC2B1605}"/>
+              </a:ext>
+            </a:extLst>
+          </p:cNvPr>
+          <p:cNvSpPr>
+            <a:spLocks noGrp="1"/>
+          </p:cNvSpPr>
+          <p:nvPr>
+            <p:ph type="ftr" sz="quarter" idx="11"/>
+          </p:nvPr>
+        </p:nvSpPr>
+        <p:spPr/>
+        <p:txBody>
+          <a:bodyPr/>
+          <a:lstStyle/>
+          <a:p>
+            <a:r>
+              <a:rPr lang="de-AT"/>
+              <a:t>CONTRUDE Schrempf</a:t>
+            </a:r>
+            <a:endParaRPr lang="de-AT" dirty="0"/>
+          </a:p>
+        </p:txBody>
+      </p:sp>
+      <p:sp>
+        <p:nvSpPr>
+          <p:cNvPr id="5" name="Foliennummernplatzhalter 4">
+            <a:extLst>
+              <a:ext uri="{FF2B5EF4-FFF2-40B4-BE49-F238E27FC236}">
+                <a16:creationId xmlns:a16="http://schemas.microsoft.com/office/drawing/2014/main" id="{FA793A73-DEA9-6129-2C09-B10028401715}"/>
+              </a:ext>
+            </a:extLst>
+          </p:cNvPr>
+          <p:cNvSpPr>
+            <a:spLocks noGrp="1"/>
+          </p:cNvSpPr>
+          <p:nvPr>
+            <p:ph type="sldNum" sz="quarter" idx="12"/>
+          </p:nvPr>
+        </p:nvSpPr>
+        <p:spPr/>
+        <p:txBody>
+          <a:bodyPr/>
+          <a:lstStyle/>
+          <a:p>
+            <a:fld id="{7DCD6803-3BAA-44F6-A698-23D950C9713B}" type="slidenum">
+              <a:rPr lang="de-AT" smtClean="0"/>
+              <a:pPr/>
+              <a:t>21</a:t>
+            </a:fld>
+            <a:endParaRPr lang="de-AT"/>
+          </a:p>
+        </p:txBody>
+      </p:sp>
+      <p:sp>
+        <p:nvSpPr>
+          <p:cNvPr id="6" name="Textfeld 5">
+            <a:extLst>
+              <a:ext uri="{FF2B5EF4-FFF2-40B4-BE49-F238E27FC236}">
+                <a16:creationId xmlns:a16="http://schemas.microsoft.com/office/drawing/2014/main" id="{34D7153C-DF57-5578-2AF4-03F4140B1A50}"/>
+              </a:ext>
+            </a:extLst>
+          </p:cNvPr>
+          <p:cNvSpPr txBox="1"/>
+          <p:nvPr/>
+        </p:nvSpPr>
+        <p:spPr>
+          <a:xfrm>
+            <a:off x="800434" y="2882623"/>
+            <a:ext cx="6075907" cy="1200329"/>
+          </a:xfrm>
+          <a:prstGeom prst="rect">
+            <a:avLst/>
+          </a:prstGeom>
+          <a:noFill/>
+        </p:spPr>
+        <p:txBody>
+          <a:bodyPr wrap="square" rtlCol="0">
+            <a:spAutoFit/>
+          </a:bodyPr>
+          <a:lstStyle/>
+          <a:p>
+            <a:r>
+              <a:rPr lang="de-DE" sz="7200" dirty="0">
+                <a:solidFill>
+                  <a:srgbClr val="9BBB59"/>
+                </a:solidFill>
+              </a:rPr>
+              <a:t>Bildquellen</a:t>
+            </a:r>
+            <a:endParaRPr lang="en-US" sz="6600" dirty="0">
+              <a:solidFill>
+                <a:srgbClr val="9BBB59"/>
+              </a:solidFill>
+            </a:endParaRPr>
+          </a:p>
+        </p:txBody>
+      </p:sp>
+    </p:spTree>
+    <p:extLst>
+      <p:ext uri="{BB962C8B-B14F-4D97-AF65-F5344CB8AC3E}">
+        <p14:creationId xmlns:p14="http://schemas.microsoft.com/office/powerpoint/2010/main" val="3986702212"/>
+      </p:ext>
+    </p:extLst>
+  </p:cSld>
+  <p:clrMapOvr>
+    <a:masterClrMapping/>
+  </p:clrMapOvr>
+</p:sld>
+</file>
+
+<file path=ppt/slides/slide22.xml><?xml version="1.0" encoding="utf-8"?>
+<p:sld xmlns:a="http://schemas.openxmlformats.org/drawingml/2006/main" xmlns:r="http://schemas.openxmlformats.org/officeDocument/2006/relationships" xmlns:p="http://schemas.openxmlformats.org/presentationml/2006/main">
+  <p:cSld>
+    <p:spTree>
+      <p:nvGrpSpPr>
+        <p:cNvPr id="1" name=""/>
+        <p:cNvGrpSpPr/>
+        <p:nvPr/>
+      </p:nvGrpSpPr>
+      <p:grpSpPr>
+        <a:xfrm>
+          <a:off x="0" y="0"/>
+          <a:ext cx="0" cy="0"/>
+          <a:chOff x="0" y="0"/>
+          <a:chExt cx="0" cy="0"/>
+        </a:xfrm>
+      </p:grpSpPr>
+      <p:sp>
+        <p:nvSpPr>
+          <p:cNvPr id="2" name="Titel 1">
+            <a:extLst>
+              <a:ext uri="{FF2B5EF4-FFF2-40B4-BE49-F238E27FC236}">
+                <a16:creationId xmlns:a16="http://schemas.microsoft.com/office/drawing/2014/main" id="{E9067B21-04AA-B863-1BC5-21EBEE4249A6}"/>
+              </a:ext>
+            </a:extLst>
+          </p:cNvPr>
+          <p:cNvSpPr>
+            <a:spLocks noGrp="1"/>
+          </p:cNvSpPr>
+          <p:nvPr>
+            <p:ph type="title"/>
+          </p:nvPr>
+        </p:nvSpPr>
+        <p:spPr/>
+        <p:txBody>
+          <a:bodyPr/>
+          <a:lstStyle/>
+          <a:p>
+            <a:r>
+              <a:rPr lang="de-AT" dirty="0"/>
+              <a:t>Bildquellen – Kampl</a:t>
+            </a:r>
+          </a:p>
+        </p:txBody>
+      </p:sp>
+      <p:sp>
+        <p:nvSpPr>
+          <p:cNvPr id="3" name="Inhaltsplatzhalter 2">
+            <a:extLst>
+              <a:ext uri="{FF2B5EF4-FFF2-40B4-BE49-F238E27FC236}">
+                <a16:creationId xmlns:a16="http://schemas.microsoft.com/office/drawing/2014/main" id="{CDF320DB-58E5-EDF5-0697-843A43B8D27E}"/>
+              </a:ext>
+            </a:extLst>
+          </p:cNvPr>
+          <p:cNvSpPr>
+            <a:spLocks noGrp="1"/>
+          </p:cNvSpPr>
+          <p:nvPr>
+            <p:ph idx="1"/>
+          </p:nvPr>
+        </p:nvSpPr>
+        <p:spPr/>
+        <p:txBody>
+          <a:bodyPr/>
+          <a:lstStyle/>
+          <a:p>
+            <a:endParaRPr lang="de-AT"/>
+          </a:p>
+        </p:txBody>
+      </p:sp>
+      <p:sp>
+        <p:nvSpPr>
+          <p:cNvPr id="4" name="Fußzeilenplatzhalter 3">
+            <a:extLst>
+              <a:ext uri="{FF2B5EF4-FFF2-40B4-BE49-F238E27FC236}">
+                <a16:creationId xmlns:a16="http://schemas.microsoft.com/office/drawing/2014/main" id="{A3DB105E-8365-A55C-B819-3BC49335B886}"/>
+              </a:ext>
+            </a:extLst>
+          </p:cNvPr>
+          <p:cNvSpPr>
+            <a:spLocks noGrp="1"/>
+          </p:cNvSpPr>
+          <p:nvPr>
+            <p:ph type="ftr" sz="quarter" idx="11"/>
+          </p:nvPr>
+        </p:nvSpPr>
+        <p:spPr/>
+        <p:txBody>
+          <a:bodyPr/>
+          <a:lstStyle/>
+          <a:p>
+            <a:r>
+              <a:rPr lang="de-AT"/>
+              <a:t>CONTRUDE Schrempf</a:t>
+            </a:r>
+            <a:endParaRPr lang="de-AT" dirty="0"/>
+          </a:p>
+        </p:txBody>
+      </p:sp>
+      <p:sp>
+        <p:nvSpPr>
+          <p:cNvPr id="5" name="Foliennummernplatzhalter 4">
+            <a:extLst>
+              <a:ext uri="{FF2B5EF4-FFF2-40B4-BE49-F238E27FC236}">
+                <a16:creationId xmlns:a16="http://schemas.microsoft.com/office/drawing/2014/main" id="{99CB3D7D-C8D2-F222-6263-523FEE1ED3A2}"/>
+              </a:ext>
+            </a:extLst>
+          </p:cNvPr>
+          <p:cNvSpPr>
+            <a:spLocks noGrp="1"/>
+          </p:cNvSpPr>
+          <p:nvPr>
+            <p:ph type="sldNum" sz="quarter" idx="12"/>
+          </p:nvPr>
+        </p:nvSpPr>
+        <p:spPr/>
+        <p:txBody>
+          <a:bodyPr/>
+          <a:lstStyle/>
+          <a:p>
+            <a:fld id="{7DCD6803-3BAA-44F6-A698-23D950C9713B}" type="slidenum">
+              <a:rPr lang="de-AT" smtClean="0"/>
+              <a:pPr/>
+              <a:t>22</a:t>
+            </a:fld>
+            <a:endParaRPr lang="de-AT"/>
+          </a:p>
+        </p:txBody>
+      </p:sp>
+    </p:spTree>
+    <p:extLst>
+      <p:ext uri="{BB962C8B-B14F-4D97-AF65-F5344CB8AC3E}">
+        <p14:creationId xmlns:p14="http://schemas.microsoft.com/office/powerpoint/2010/main" val="871335908"/>
+      </p:ext>
+    </p:extLst>
+  </p:cSld>
+  <p:clrMapOvr>
+    <a:masterClrMapping/>
+  </p:clrMapOvr>
+</p:sld>
+</file>
+
+<file path=ppt/slides/slide23.xml><?xml version="1.0" encoding="utf-8"?>
+<p:sld xmlns:a="http://schemas.openxmlformats.org/drawingml/2006/main" xmlns:r="http://schemas.openxmlformats.org/officeDocument/2006/relationships" xmlns:p="http://schemas.openxmlformats.org/presentationml/2006/main">
+  <p:cSld>
+    <p:spTree>
+      <p:nvGrpSpPr>
+        <p:cNvPr id="1" name=""/>
+        <p:cNvGrpSpPr/>
+        <p:nvPr/>
+      </p:nvGrpSpPr>
+      <p:grpSpPr>
+        <a:xfrm>
+          <a:off x="0" y="0"/>
+          <a:ext cx="0" cy="0"/>
+          <a:chOff x="0" y="0"/>
+          <a:chExt cx="0" cy="0"/>
+        </a:xfrm>
+      </p:grpSpPr>
+      <p:sp>
+        <p:nvSpPr>
+          <p:cNvPr id="2" name="Titel 1">
+            <a:extLst>
+              <a:ext uri="{FF2B5EF4-FFF2-40B4-BE49-F238E27FC236}">
+                <a16:creationId xmlns:a16="http://schemas.microsoft.com/office/drawing/2014/main" id="{366B6435-9459-7B22-BE3B-A911C6327046}"/>
+              </a:ext>
+            </a:extLst>
+          </p:cNvPr>
+          <p:cNvSpPr>
+            <a:spLocks noGrp="1"/>
+          </p:cNvSpPr>
+          <p:nvPr>
+            <p:ph type="title"/>
+          </p:nvPr>
+        </p:nvSpPr>
+        <p:spPr/>
+        <p:txBody>
+          <a:bodyPr/>
+          <a:lstStyle/>
+          <a:p>
+            <a:r>
+              <a:rPr lang="de-AT" dirty="0"/>
+              <a:t>Bildquellen – Schrempf</a:t>
+            </a:r>
+          </a:p>
+        </p:txBody>
+      </p:sp>
+      <p:sp>
+        <p:nvSpPr>
+          <p:cNvPr id="3" name="Inhaltsplatzhalter 2">
+            <a:extLst>
+              <a:ext uri="{FF2B5EF4-FFF2-40B4-BE49-F238E27FC236}">
+                <a16:creationId xmlns:a16="http://schemas.microsoft.com/office/drawing/2014/main" id="{E9600844-670E-9E47-9B44-DF36393CB30C}"/>
+              </a:ext>
+            </a:extLst>
+          </p:cNvPr>
+          <p:cNvSpPr>
+            <a:spLocks noGrp="1"/>
+          </p:cNvSpPr>
+          <p:nvPr>
+            <p:ph idx="1"/>
+          </p:nvPr>
+        </p:nvSpPr>
+        <p:spPr/>
+        <p:txBody>
+          <a:bodyPr>
+            <a:normAutofit/>
+          </a:bodyPr>
+          <a:lstStyle/>
+          <a:p>
+            <a:r>
+              <a:rPr lang="de-AT" dirty="0">
+                <a:hlinkClick r:id="rId2"/>
+              </a:rPr>
+              <a:t>https://de.cleanpng.com/png-fsa3fn</a:t>
+            </a:r>
+            <a:r>
+              <a:rPr lang="de-AT" dirty="0"/>
+              <a:t> [18.04.2025]</a:t>
+            </a:r>
+          </a:p>
+          <a:p>
+            <a:r>
+              <a:rPr lang="de-AT" dirty="0">
+                <a:hlinkClick r:id="rId3"/>
+              </a:rPr>
+              <a:t>https://www.sdgwatch.at</a:t>
+            </a:r>
+            <a:r>
+              <a:rPr lang="de-AT" dirty="0"/>
+              <a:t> [18.04.2025]</a:t>
+            </a:r>
+          </a:p>
+          <a:p>
+            <a:r>
+              <a:rPr lang="de-AT" dirty="0">
+                <a:hlinkClick r:id="rId4"/>
+              </a:rPr>
+              <a:t>https://thenounproject.com/icon/database-7670737</a:t>
+            </a:r>
+            <a:r>
+              <a:rPr lang="de-AT" dirty="0"/>
+              <a:t> [18.04.2025]</a:t>
+            </a:r>
+          </a:p>
+          <a:p>
+            <a:r>
+              <a:rPr lang="de-AT" dirty="0">
+                <a:hlinkClick r:id="rId5"/>
+              </a:rPr>
+              <a:t>https://www.svgrepo.com/svg/353829/grafana</a:t>
+            </a:r>
+            <a:r>
+              <a:rPr lang="de-AT" dirty="0"/>
+              <a:t> [18.04.2025]</a:t>
+            </a:r>
+          </a:p>
+          <a:p>
+            <a:r>
+              <a:rPr lang="de-AT" dirty="0">
+                <a:hlinkClick r:id="rId6"/>
+              </a:rPr>
+              <a:t>https://techicons.dev/icons/docker</a:t>
+            </a:r>
+            <a:r>
+              <a:rPr lang="de-AT" dirty="0"/>
+              <a:t> [18.04.2025]</a:t>
+            </a:r>
+          </a:p>
+          <a:p>
+            <a:r>
+              <a:rPr lang="de-AT" dirty="0">
+                <a:hlinkClick r:id="rId7"/>
+              </a:rPr>
+              <a:t>https://de.wikipedia.org/wiki/Datei:Octicons-mark-github.svg</a:t>
+            </a:r>
+            <a:r>
+              <a:rPr lang="de-AT" dirty="0"/>
+              <a:t> [18.04.2025]</a:t>
+            </a:r>
+          </a:p>
+          <a:p>
+            <a:r>
+              <a:rPr lang="de-AT" dirty="0">
+                <a:hlinkClick r:id="rId8"/>
+              </a:rPr>
+              <a:t>https://seeklogo.com/vector-logo/273749/node-js</a:t>
+            </a:r>
+            <a:r>
+              <a:rPr lang="de-AT" dirty="0"/>
+              <a:t> [18.04.2025]</a:t>
+            </a:r>
+          </a:p>
+          <a:p>
+            <a:r>
+              <a:rPr lang="de-AT" dirty="0">
+                <a:hlinkClick r:id="rId9"/>
+              </a:rPr>
+              <a:t>https://techicons.dev/icons/traefikproxy</a:t>
+            </a:r>
+            <a:r>
+              <a:rPr lang="de-AT" dirty="0"/>
+              <a:t> [18.04.2025]</a:t>
+            </a:r>
+          </a:p>
+        </p:txBody>
+      </p:sp>
+      <p:sp>
+        <p:nvSpPr>
+          <p:cNvPr id="4" name="Fußzeilenplatzhalter 3">
+            <a:extLst>
+              <a:ext uri="{FF2B5EF4-FFF2-40B4-BE49-F238E27FC236}">
+                <a16:creationId xmlns:a16="http://schemas.microsoft.com/office/drawing/2014/main" id="{B4711875-828F-B56B-63D6-725C06E6E537}"/>
+              </a:ext>
+            </a:extLst>
+          </p:cNvPr>
+          <p:cNvSpPr>
+            <a:spLocks noGrp="1"/>
+          </p:cNvSpPr>
+          <p:nvPr>
+            <p:ph type="ftr" sz="quarter" idx="11"/>
+          </p:nvPr>
+        </p:nvSpPr>
+        <p:spPr/>
+        <p:txBody>
+          <a:bodyPr/>
+          <a:lstStyle/>
+          <a:p>
+            <a:r>
+              <a:rPr lang="de-AT"/>
+              <a:t>CONTRUDE Schrempf</a:t>
+            </a:r>
+            <a:endParaRPr lang="de-AT" dirty="0"/>
+          </a:p>
+        </p:txBody>
+      </p:sp>
+      <p:sp>
+        <p:nvSpPr>
+          <p:cNvPr id="5" name="Foliennummernplatzhalter 4">
+            <a:extLst>
+              <a:ext uri="{FF2B5EF4-FFF2-40B4-BE49-F238E27FC236}">
+                <a16:creationId xmlns:a16="http://schemas.microsoft.com/office/drawing/2014/main" id="{75D391DE-B06F-7794-3334-D47E7860060B}"/>
+              </a:ext>
+            </a:extLst>
+          </p:cNvPr>
+          <p:cNvSpPr>
+            <a:spLocks noGrp="1"/>
+          </p:cNvSpPr>
+          <p:nvPr>
+            <p:ph type="sldNum" sz="quarter" idx="12"/>
+          </p:nvPr>
+        </p:nvSpPr>
+        <p:spPr/>
+        <p:txBody>
+          <a:bodyPr/>
+          <a:lstStyle/>
+          <a:p>
+            <a:fld id="{7DCD6803-3BAA-44F6-A698-23D950C9713B}" type="slidenum">
+              <a:rPr lang="de-AT" smtClean="0"/>
+              <a:pPr/>
+              <a:t>23</a:t>
+            </a:fld>
+            <a:endParaRPr lang="de-AT"/>
+          </a:p>
+        </p:txBody>
+      </p:sp>
+    </p:spTree>
+    <p:extLst>
+      <p:ext uri="{BB962C8B-B14F-4D97-AF65-F5344CB8AC3E}">
         <p14:creationId xmlns:p14="http://schemas.microsoft.com/office/powerpoint/2010/main" val="1641466425"/>
+      </p:ext>
+    </p:extLst>
+  </p:cSld>
+  <p:clrMapOvr>
+    <a:masterClrMapping/>
+  </p:clrMapOvr>
+</p:sld>
+</file>
+
+<file path=ppt/slides/slide24.xml><?xml version="1.0" encoding="utf-8"?>
+<p:sld xmlns:a="http://schemas.openxmlformats.org/drawingml/2006/main" xmlns:r="http://schemas.openxmlformats.org/officeDocument/2006/relationships" xmlns:p="http://schemas.openxmlformats.org/presentationml/2006/main">
+  <p:cSld>
+    <p:spTree>
+      <p:nvGrpSpPr>
+        <p:cNvPr id="1" name=""/>
+        <p:cNvGrpSpPr/>
+        <p:nvPr/>
+      </p:nvGrpSpPr>
+      <p:grpSpPr>
+        <a:xfrm>
+          <a:off x="0" y="0"/>
+          <a:ext cx="0" cy="0"/>
+          <a:chOff x="0" y="0"/>
+          <a:chExt cx="0" cy="0"/>
+        </a:xfrm>
+      </p:grpSpPr>
+      <p:sp>
+        <p:nvSpPr>
+          <p:cNvPr id="2" name="Titel 1">
+            <a:extLst>
+              <a:ext uri="{FF2B5EF4-FFF2-40B4-BE49-F238E27FC236}">
+                <a16:creationId xmlns:a16="http://schemas.microsoft.com/office/drawing/2014/main" id="{6843AA73-C052-59B9-1B4F-A641524F86B5}"/>
+              </a:ext>
+            </a:extLst>
+          </p:cNvPr>
+          <p:cNvSpPr>
+            <a:spLocks noGrp="1"/>
+          </p:cNvSpPr>
+          <p:nvPr>
+            <p:ph type="title"/>
+          </p:nvPr>
+        </p:nvSpPr>
+        <p:spPr/>
+        <p:txBody>
+          <a:bodyPr/>
+          <a:lstStyle/>
+          <a:p>
+            <a:r>
+              <a:rPr lang="de-AT" dirty="0"/>
+              <a:t>Gekle</a:t>
+            </a:r>
+          </a:p>
+        </p:txBody>
+      </p:sp>
+      <p:sp>
+        <p:nvSpPr>
+          <p:cNvPr id="3" name="Inhaltsplatzhalter 2">
+            <a:extLst>
+              <a:ext uri="{FF2B5EF4-FFF2-40B4-BE49-F238E27FC236}">
+                <a16:creationId xmlns:a16="http://schemas.microsoft.com/office/drawing/2014/main" id="{D9249581-8698-82EA-9B49-664D015569FF}"/>
+              </a:ext>
+            </a:extLst>
+          </p:cNvPr>
+          <p:cNvSpPr>
+            <a:spLocks noGrp="1"/>
+          </p:cNvSpPr>
+          <p:nvPr>
+            <p:ph idx="1"/>
+          </p:nvPr>
+        </p:nvSpPr>
+        <p:spPr/>
+        <p:txBody>
+          <a:bodyPr/>
+          <a:lstStyle/>
+          <a:p>
+            <a:endParaRPr lang="de-AT"/>
+          </a:p>
+        </p:txBody>
+      </p:sp>
+      <p:sp>
+        <p:nvSpPr>
+          <p:cNvPr id="4" name="Fußzeilenplatzhalter 3">
+            <a:extLst>
+              <a:ext uri="{FF2B5EF4-FFF2-40B4-BE49-F238E27FC236}">
+                <a16:creationId xmlns:a16="http://schemas.microsoft.com/office/drawing/2014/main" id="{51C5C890-B07D-8FE6-DF7D-DD73167FE310}"/>
+              </a:ext>
+            </a:extLst>
+          </p:cNvPr>
+          <p:cNvSpPr>
+            <a:spLocks noGrp="1"/>
+          </p:cNvSpPr>
+          <p:nvPr>
+            <p:ph type="ftr" sz="quarter" idx="11"/>
+          </p:nvPr>
+        </p:nvSpPr>
+        <p:spPr/>
+        <p:txBody>
+          <a:bodyPr/>
+          <a:lstStyle/>
+          <a:p>
+            <a:r>
+              <a:rPr lang="de-AT"/>
+              <a:t>CONTRUDE Schrempf</a:t>
+            </a:r>
+            <a:endParaRPr lang="de-AT" dirty="0"/>
+          </a:p>
+        </p:txBody>
+      </p:sp>
+      <p:sp>
+        <p:nvSpPr>
+          <p:cNvPr id="5" name="Foliennummernplatzhalter 4">
+            <a:extLst>
+              <a:ext uri="{FF2B5EF4-FFF2-40B4-BE49-F238E27FC236}">
+                <a16:creationId xmlns:a16="http://schemas.microsoft.com/office/drawing/2014/main" id="{2DF4B31A-7C85-6AED-BB12-8F0C05262B33}"/>
+              </a:ext>
+            </a:extLst>
+          </p:cNvPr>
+          <p:cNvSpPr>
+            <a:spLocks noGrp="1"/>
+          </p:cNvSpPr>
+          <p:nvPr>
+            <p:ph type="sldNum" sz="quarter" idx="12"/>
+          </p:nvPr>
+        </p:nvSpPr>
+        <p:spPr/>
+        <p:txBody>
+          <a:bodyPr/>
+          <a:lstStyle/>
+          <a:p>
+            <a:fld id="{7DCD6803-3BAA-44F6-A698-23D950C9713B}" type="slidenum">
+              <a:rPr lang="de-AT" smtClean="0"/>
+              <a:pPr/>
+              <a:t>24</a:t>
+            </a:fld>
+            <a:endParaRPr lang="de-AT"/>
+          </a:p>
+        </p:txBody>
+      </p:sp>
+    </p:spTree>
+    <p:extLst>
+      <p:ext uri="{BB962C8B-B14F-4D97-AF65-F5344CB8AC3E}">
+        <p14:creationId xmlns:p14="http://schemas.microsoft.com/office/powerpoint/2010/main" val="1856491369"/>
       </p:ext>
     </p:extLst>
   </p:cSld>
@@ -7613,7 +8589,7 @@
             </a:extLst>
           </p:cNvPr>
           <p:cNvPicPr>
-            <a:picLocks noChangeAspect="1"/>
+            <a:picLocks noGrp="1" noRot="1" noChangeAspect="1" noMove="1" noResize="1" noEditPoints="1" noAdjustHandles="1" noChangeArrowheads="1" noChangeShapeType="1" noCrop="1"/>
           </p:cNvPicPr>
           <p:nvPr/>
         </p:nvPicPr>
@@ -8725,6 +9701,15 @@
 </file>
 
 <file path=customXml/item2.xml><?xml version="1.0" encoding="utf-8"?>
+<?mso-contentType ?>
+<FormTemplates xmlns="http://schemas.microsoft.com/sharepoint/v3/contenttype/forms">
+  <Display>DocumentLibraryForm</Display>
+  <Edit>DocumentLibraryForm</Edit>
+  <New>DocumentLibraryForm</New>
+</FormTemplates>
+</file>
+
+<file path=customXml/item3.xml><?xml version="1.0" encoding="utf-8"?>
 <ct:contentTypeSchema xmlns:ct="http://schemas.microsoft.com/office/2006/metadata/contentType" xmlns:ma="http://schemas.microsoft.com/office/2006/metadata/properties/metaAttributes" ct:_="" ma:_="" ma:contentTypeName="Dokument" ma:contentTypeID="0x010100B5F8F8BE0F772449AA3E28E2051A517F" ma:contentTypeVersion="0" ma:contentTypeDescription="Ein neues Dokument erstellen." ma:contentTypeScope="" ma:versionID="0d260f8c1711e932026baa77adf35126">
   <xsd:schema xmlns:xsd="http://www.w3.org/2001/XMLSchema" xmlns:xs="http://www.w3.org/2001/XMLSchema" xmlns:p="http://schemas.microsoft.com/office/2006/metadata/properties" targetNamespace="http://schemas.microsoft.com/office/2006/metadata/properties" ma:root="true" ma:fieldsID="10627edd4f09c1f414843cf0643fb7ba">
     <xsd:element name="properties">
@@ -8838,15 +9823,6 @@
 </ct:contentTypeSchema>
 </file>
 
-<file path=customXml/item3.xml><?xml version="1.0" encoding="utf-8"?>
-<?mso-contentType ?>
-<FormTemplates xmlns="http://schemas.microsoft.com/sharepoint/v3/contenttype/forms">
-  <Display>DocumentLibraryForm</Display>
-  <Edit>DocumentLibraryForm</Edit>
-  <New>DocumentLibraryForm</New>
-</FormTemplates>
-</file>
-
 <file path=customXml/itemProps1.xml><?xml version="1.0" encoding="utf-8"?>
 <ds:datastoreItem xmlns:ds="http://schemas.openxmlformats.org/officeDocument/2006/customXml" ds:itemID="{91B09AE3-FA1D-40C8-A6CE-A2D9F55131C8}">
   <ds:schemaRefs>
@@ -8863,6 +9839,14 @@
 </file>
 
 <file path=customXml/itemProps2.xml><?xml version="1.0" encoding="utf-8"?>
+<ds:datastoreItem xmlns:ds="http://schemas.openxmlformats.org/officeDocument/2006/customXml" ds:itemID="{A62B322D-2084-418A-8960-B074ADC5B6DB}">
+  <ds:schemaRefs>
+    <ds:schemaRef ds:uri="http://schemas.microsoft.com/sharepoint/v3/contenttype/forms"/>
+  </ds:schemaRefs>
+</ds:datastoreItem>
+</file>
+
+<file path=customXml/itemProps3.xml><?xml version="1.0" encoding="utf-8"?>
 <ds:datastoreItem xmlns:ds="http://schemas.openxmlformats.org/officeDocument/2006/customXml" ds:itemID="{52C214F1-4297-4767-8275-0DA039616A9F}">
   <ds:schemaRefs>
     <ds:schemaRef ds:uri="http://purl.org/dc/elements/1.1/"/>
@@ -8876,12 +9860,4 @@
     <ds:schemaRef ds:uri="http://www.w3.org/2001/XMLSchema"/>
   </ds:schemaRefs>
 </ds:datastoreItem>
-</file>
-
-<file path=customXml/itemProps3.xml><?xml version="1.0" encoding="utf-8"?>
-<ds:datastoreItem xmlns:ds="http://schemas.openxmlformats.org/officeDocument/2006/customXml" ds:itemID="{A62B322D-2084-418A-8960-B074ADC5B6DB}">
-  <ds:schemaRefs>
-    <ds:schemaRef ds:uri="http://schemas.microsoft.com/sharepoint/v3/contenttype/forms"/>
-  </ds:schemaRefs>
-</ds:datastoreItem>
 </file>
</xml_diff>

<commit_message>
Updated Gekle part of final DA PP
</commit_message>
<xml_diff>
--- a/Diplomarbeit/doc/Presentations/DA-Präsentation2025-Verteidigung.pptx
+++ b/Diplomarbeit/doc/Presentations/DA-Präsentation2025-Verteidigung.pptx
@@ -5,10 +5,10 @@
     <p:sldMasterId id="2147483648" r:id="rId4"/>
   </p:sldMasterIdLst>
   <p:notesMasterIdLst>
-    <p:notesMasterId r:id="rId29"/>
+    <p:notesMasterId r:id="rId34"/>
   </p:notesMasterIdLst>
   <p:handoutMasterIdLst>
-    <p:handoutMasterId r:id="rId30"/>
+    <p:handoutMasterId r:id="rId35"/>
   </p:handoutMasterIdLst>
   <p:sldIdLst>
     <p:sldId id="256" r:id="rId5"/>
@@ -25,16 +25,21 @@
     <p:sldId id="2596" r:id="rId16"/>
     <p:sldId id="2614" r:id="rId17"/>
     <p:sldId id="271" r:id="rId18"/>
-    <p:sldId id="257" r:id="rId19"/>
-    <p:sldId id="258" r:id="rId20"/>
-    <p:sldId id="259" r:id="rId21"/>
-    <p:sldId id="260" r:id="rId22"/>
-    <p:sldId id="261" r:id="rId23"/>
-    <p:sldId id="262" r:id="rId24"/>
-    <p:sldId id="2613" r:id="rId25"/>
-    <p:sldId id="2611" r:id="rId26"/>
-    <p:sldId id="2610" r:id="rId27"/>
-    <p:sldId id="2612" r:id="rId28"/>
+    <p:sldId id="2615" r:id="rId19"/>
+    <p:sldId id="2616" r:id="rId20"/>
+    <p:sldId id="2617" r:id="rId21"/>
+    <p:sldId id="2618" r:id="rId22"/>
+    <p:sldId id="2619" r:id="rId23"/>
+    <p:sldId id="257" r:id="rId24"/>
+    <p:sldId id="258" r:id="rId25"/>
+    <p:sldId id="259" r:id="rId26"/>
+    <p:sldId id="260" r:id="rId27"/>
+    <p:sldId id="261" r:id="rId28"/>
+    <p:sldId id="262" r:id="rId29"/>
+    <p:sldId id="2613" r:id="rId30"/>
+    <p:sldId id="2611" r:id="rId31"/>
+    <p:sldId id="2610" r:id="rId32"/>
+    <p:sldId id="2612" r:id="rId33"/>
   </p:sldIdLst>
   <p:sldSz cx="12192000" cy="6858000"/>
   <p:notesSz cx="7099300" cy="10234613"/>
@@ -164,6 +169,11 @@
         <p14:section name="Gekle" id="{1498EEE0-9AA7-42F6-9085-4B26EBB008AF}">
           <p14:sldIdLst>
             <p14:sldId id="271"/>
+            <p14:sldId id="2615"/>
+            <p14:sldId id="2616"/>
+            <p14:sldId id="2617"/>
+            <p14:sldId id="2618"/>
+            <p14:sldId id="2619"/>
           </p14:sldIdLst>
         </p14:section>
         <p14:section name="Zusatz" id="{2D0687EC-8608-4738-AB4A-6BCBAC6A7ACE}">
@@ -1197,6 +1207,333 @@
     <p:extLst>
       <p:ext uri="{BB962C8B-B14F-4D97-AF65-F5344CB8AC3E}">
         <p14:creationId xmlns:p14="http://schemas.microsoft.com/office/powerpoint/2010/main" val="1600532133"/>
+      </p:ext>
+    </p:extLst>
+  </p:cSld>
+  <p:clrMapOvr>
+    <a:masterClrMapping/>
+  </p:clrMapOvr>
+</p:notes>
+</file>
+
+<file path=ppt/notesSlides/notesSlide6.xml><?xml version="1.0" encoding="utf-8"?>
+<p:notes xmlns:a="http://schemas.openxmlformats.org/drawingml/2006/main" xmlns:r="http://schemas.openxmlformats.org/officeDocument/2006/relationships" xmlns:p="http://schemas.openxmlformats.org/presentationml/2006/main">
+  <p:cSld>
+    <p:spTree>
+      <p:nvGrpSpPr>
+        <p:cNvPr id="1" name="">
+          <a:extLst>
+            <a:ext uri="{FF2B5EF4-FFF2-40B4-BE49-F238E27FC236}">
+              <a16:creationId xmlns:a16="http://schemas.microsoft.com/office/drawing/2014/main" id="{DE5B3FF9-7631-0196-DCD7-B70EE86DFFB5}"/>
+            </a:ext>
+          </a:extLst>
+        </p:cNvPr>
+        <p:cNvGrpSpPr/>
+        <p:nvPr/>
+      </p:nvGrpSpPr>
+      <p:grpSpPr>
+        <a:xfrm>
+          <a:off x="0" y="0"/>
+          <a:ext cx="0" cy="0"/>
+          <a:chOff x="0" y="0"/>
+          <a:chExt cx="0" cy="0"/>
+        </a:xfrm>
+      </p:grpSpPr>
+      <p:sp>
+        <p:nvSpPr>
+          <p:cNvPr id="2" name="Folienbildplatzhalter 1">
+            <a:extLst>
+              <a:ext uri="{FF2B5EF4-FFF2-40B4-BE49-F238E27FC236}">
+                <a16:creationId xmlns:a16="http://schemas.microsoft.com/office/drawing/2014/main" id="{46A5C5F0-6D06-5A79-7237-18D798AE844E}"/>
+              </a:ext>
+            </a:extLst>
+          </p:cNvPr>
+          <p:cNvSpPr>
+            <a:spLocks noGrp="1" noRot="1" noChangeAspect="1"/>
+          </p:cNvSpPr>
+          <p:nvPr>
+            <p:ph type="sldImg"/>
+          </p:nvPr>
+        </p:nvSpPr>
+        <p:spPr/>
+      </p:sp>
+      <p:sp>
+        <p:nvSpPr>
+          <p:cNvPr id="3" name="Notizenplatzhalter 2">
+            <a:extLst>
+              <a:ext uri="{FF2B5EF4-FFF2-40B4-BE49-F238E27FC236}">
+                <a16:creationId xmlns:a16="http://schemas.microsoft.com/office/drawing/2014/main" id="{5BE74D28-1822-2DFB-9CC9-5747ED4B0194}"/>
+              </a:ext>
+            </a:extLst>
+          </p:cNvPr>
+          <p:cNvSpPr>
+            <a:spLocks noGrp="1"/>
+          </p:cNvSpPr>
+          <p:nvPr>
+            <p:ph type="body" idx="1"/>
+          </p:nvPr>
+        </p:nvSpPr>
+        <p:spPr/>
+        <p:txBody>
+          <a:bodyPr/>
+          <a:lstStyle/>
+          <a:p>
+            <a:endParaRPr lang="en-US" dirty="0"/>
+          </a:p>
+        </p:txBody>
+      </p:sp>
+      <p:sp>
+        <p:nvSpPr>
+          <p:cNvPr id="4" name="Foliennummernplatzhalter 3">
+            <a:extLst>
+              <a:ext uri="{FF2B5EF4-FFF2-40B4-BE49-F238E27FC236}">
+                <a16:creationId xmlns:a16="http://schemas.microsoft.com/office/drawing/2014/main" id="{6B5044C3-0606-EE8A-5928-2030E2339158}"/>
+              </a:ext>
+            </a:extLst>
+          </p:cNvPr>
+          <p:cNvSpPr>
+            <a:spLocks noGrp="1"/>
+          </p:cNvSpPr>
+          <p:nvPr>
+            <p:ph type="sldNum" sz="quarter" idx="5"/>
+          </p:nvPr>
+        </p:nvSpPr>
+        <p:spPr/>
+        <p:txBody>
+          <a:bodyPr/>
+          <a:lstStyle/>
+          <a:p>
+            <a:fld id="{7AA6D168-C717-485B-B0C8-699ECBDF2CFF}" type="slidenum">
+              <a:rPr lang="de-AT" smtClean="0"/>
+              <a:pPr/>
+              <a:t>16</a:t>
+            </a:fld>
+            <a:endParaRPr lang="de-AT"/>
+          </a:p>
+        </p:txBody>
+      </p:sp>
+    </p:spTree>
+    <p:extLst>
+      <p:ext uri="{BB962C8B-B14F-4D97-AF65-F5344CB8AC3E}">
+        <p14:creationId xmlns:p14="http://schemas.microsoft.com/office/powerpoint/2010/main" val="4075383943"/>
+      </p:ext>
+    </p:extLst>
+  </p:cSld>
+  <p:clrMapOvr>
+    <a:masterClrMapping/>
+  </p:clrMapOvr>
+</p:notes>
+</file>
+
+<file path=ppt/notesSlides/notesSlide7.xml><?xml version="1.0" encoding="utf-8"?>
+<p:notes xmlns:a="http://schemas.openxmlformats.org/drawingml/2006/main" xmlns:r="http://schemas.openxmlformats.org/officeDocument/2006/relationships" xmlns:p="http://schemas.openxmlformats.org/presentationml/2006/main">
+  <p:cSld>
+    <p:spTree>
+      <p:nvGrpSpPr>
+        <p:cNvPr id="1" name="">
+          <a:extLst>
+            <a:ext uri="{FF2B5EF4-FFF2-40B4-BE49-F238E27FC236}">
+              <a16:creationId xmlns:a16="http://schemas.microsoft.com/office/drawing/2014/main" id="{C21AB0BD-4EC1-F478-F8B1-5FCD94B460C2}"/>
+            </a:ext>
+          </a:extLst>
+        </p:cNvPr>
+        <p:cNvGrpSpPr/>
+        <p:nvPr/>
+      </p:nvGrpSpPr>
+      <p:grpSpPr>
+        <a:xfrm>
+          <a:off x="0" y="0"/>
+          <a:ext cx="0" cy="0"/>
+          <a:chOff x="0" y="0"/>
+          <a:chExt cx="0" cy="0"/>
+        </a:xfrm>
+      </p:grpSpPr>
+      <p:sp>
+        <p:nvSpPr>
+          <p:cNvPr id="2" name="Folienbildplatzhalter 1">
+            <a:extLst>
+              <a:ext uri="{FF2B5EF4-FFF2-40B4-BE49-F238E27FC236}">
+                <a16:creationId xmlns:a16="http://schemas.microsoft.com/office/drawing/2014/main" id="{AC755714-32D3-B1C8-D3EC-B128BD085547}"/>
+              </a:ext>
+            </a:extLst>
+          </p:cNvPr>
+          <p:cNvSpPr>
+            <a:spLocks noGrp="1" noRot="1" noChangeAspect="1"/>
+          </p:cNvSpPr>
+          <p:nvPr>
+            <p:ph type="sldImg"/>
+          </p:nvPr>
+        </p:nvSpPr>
+        <p:spPr/>
+      </p:sp>
+      <p:sp>
+        <p:nvSpPr>
+          <p:cNvPr id="3" name="Notizenplatzhalter 2">
+            <a:extLst>
+              <a:ext uri="{FF2B5EF4-FFF2-40B4-BE49-F238E27FC236}">
+                <a16:creationId xmlns:a16="http://schemas.microsoft.com/office/drawing/2014/main" id="{382C2E1B-B9EB-489E-F3E9-91294851B2F8}"/>
+              </a:ext>
+            </a:extLst>
+          </p:cNvPr>
+          <p:cNvSpPr>
+            <a:spLocks noGrp="1"/>
+          </p:cNvSpPr>
+          <p:nvPr>
+            <p:ph type="body" idx="1"/>
+          </p:nvPr>
+        </p:nvSpPr>
+        <p:spPr/>
+        <p:txBody>
+          <a:bodyPr/>
+          <a:lstStyle/>
+          <a:p>
+            <a:endParaRPr lang="en-US"/>
+          </a:p>
+        </p:txBody>
+      </p:sp>
+      <p:sp>
+        <p:nvSpPr>
+          <p:cNvPr id="4" name="Foliennummernplatzhalter 3">
+            <a:extLst>
+              <a:ext uri="{FF2B5EF4-FFF2-40B4-BE49-F238E27FC236}">
+                <a16:creationId xmlns:a16="http://schemas.microsoft.com/office/drawing/2014/main" id="{EC213784-E527-2D93-F224-28D42480E143}"/>
+              </a:ext>
+            </a:extLst>
+          </p:cNvPr>
+          <p:cNvSpPr>
+            <a:spLocks noGrp="1"/>
+          </p:cNvSpPr>
+          <p:nvPr>
+            <p:ph type="sldNum" sz="quarter" idx="5"/>
+          </p:nvPr>
+        </p:nvSpPr>
+        <p:spPr/>
+        <p:txBody>
+          <a:bodyPr/>
+          <a:lstStyle/>
+          <a:p>
+            <a:fld id="{7AA6D168-C717-485B-B0C8-699ECBDF2CFF}" type="slidenum">
+              <a:rPr lang="de-AT" smtClean="0"/>
+              <a:pPr/>
+              <a:t>17</a:t>
+            </a:fld>
+            <a:endParaRPr lang="de-AT"/>
+          </a:p>
+        </p:txBody>
+      </p:sp>
+    </p:spTree>
+    <p:extLst>
+      <p:ext uri="{BB962C8B-B14F-4D97-AF65-F5344CB8AC3E}">
+        <p14:creationId xmlns:p14="http://schemas.microsoft.com/office/powerpoint/2010/main" val="1252094991"/>
+      </p:ext>
+    </p:extLst>
+  </p:cSld>
+  <p:clrMapOvr>
+    <a:masterClrMapping/>
+  </p:clrMapOvr>
+</p:notes>
+</file>
+
+<file path=ppt/notesSlides/notesSlide8.xml><?xml version="1.0" encoding="utf-8"?>
+<p:notes xmlns:a="http://schemas.openxmlformats.org/drawingml/2006/main" xmlns:r="http://schemas.openxmlformats.org/officeDocument/2006/relationships" xmlns:p="http://schemas.openxmlformats.org/presentationml/2006/main">
+  <p:cSld>
+    <p:spTree>
+      <p:nvGrpSpPr>
+        <p:cNvPr id="1" name="">
+          <a:extLst>
+            <a:ext uri="{FF2B5EF4-FFF2-40B4-BE49-F238E27FC236}">
+              <a16:creationId xmlns:a16="http://schemas.microsoft.com/office/drawing/2014/main" id="{64D82255-2F4C-D702-A28D-3868F9A5B766}"/>
+            </a:ext>
+          </a:extLst>
+        </p:cNvPr>
+        <p:cNvGrpSpPr/>
+        <p:nvPr/>
+      </p:nvGrpSpPr>
+      <p:grpSpPr>
+        <a:xfrm>
+          <a:off x="0" y="0"/>
+          <a:ext cx="0" cy="0"/>
+          <a:chOff x="0" y="0"/>
+          <a:chExt cx="0" cy="0"/>
+        </a:xfrm>
+      </p:grpSpPr>
+      <p:sp>
+        <p:nvSpPr>
+          <p:cNvPr id="2" name="Folienbildplatzhalter 1">
+            <a:extLst>
+              <a:ext uri="{FF2B5EF4-FFF2-40B4-BE49-F238E27FC236}">
+                <a16:creationId xmlns:a16="http://schemas.microsoft.com/office/drawing/2014/main" id="{5560C75D-FB8E-BF63-74FF-E31DCC8EA385}"/>
+              </a:ext>
+            </a:extLst>
+          </p:cNvPr>
+          <p:cNvSpPr>
+            <a:spLocks noGrp="1" noRot="1" noChangeAspect="1"/>
+          </p:cNvSpPr>
+          <p:nvPr>
+            <p:ph type="sldImg"/>
+          </p:nvPr>
+        </p:nvSpPr>
+        <p:spPr/>
+      </p:sp>
+      <p:sp>
+        <p:nvSpPr>
+          <p:cNvPr id="3" name="Notizenplatzhalter 2">
+            <a:extLst>
+              <a:ext uri="{FF2B5EF4-FFF2-40B4-BE49-F238E27FC236}">
+                <a16:creationId xmlns:a16="http://schemas.microsoft.com/office/drawing/2014/main" id="{9921AF5C-24F7-84F4-9789-E489EF7CE2C3}"/>
+              </a:ext>
+            </a:extLst>
+          </p:cNvPr>
+          <p:cNvSpPr>
+            <a:spLocks noGrp="1"/>
+          </p:cNvSpPr>
+          <p:nvPr>
+            <p:ph type="body" idx="1"/>
+          </p:nvPr>
+        </p:nvSpPr>
+        <p:spPr/>
+        <p:txBody>
+          <a:bodyPr/>
+          <a:lstStyle/>
+          <a:p>
+            <a:endParaRPr lang="en-US"/>
+          </a:p>
+        </p:txBody>
+      </p:sp>
+      <p:sp>
+        <p:nvSpPr>
+          <p:cNvPr id="4" name="Foliennummernplatzhalter 3">
+            <a:extLst>
+              <a:ext uri="{FF2B5EF4-FFF2-40B4-BE49-F238E27FC236}">
+                <a16:creationId xmlns:a16="http://schemas.microsoft.com/office/drawing/2014/main" id="{DA40FEAC-5512-16E2-4CEB-EDEEB0383A9B}"/>
+              </a:ext>
+            </a:extLst>
+          </p:cNvPr>
+          <p:cNvSpPr>
+            <a:spLocks noGrp="1"/>
+          </p:cNvSpPr>
+          <p:nvPr>
+            <p:ph type="sldNum" sz="quarter" idx="5"/>
+          </p:nvPr>
+        </p:nvSpPr>
+        <p:spPr/>
+        <p:txBody>
+          <a:bodyPr/>
+          <a:lstStyle/>
+          <a:p>
+            <a:fld id="{7AA6D168-C717-485B-B0C8-699ECBDF2CFF}" type="slidenum">
+              <a:rPr lang="de-AT" smtClean="0"/>
+              <a:pPr/>
+              <a:t>18</a:t>
+            </a:fld>
+            <a:endParaRPr lang="de-AT"/>
+          </a:p>
+        </p:txBody>
+      </p:sp>
+    </p:spTree>
+    <p:extLst>
+      <p:ext uri="{BB962C8B-B14F-4D97-AF65-F5344CB8AC3E}">
+        <p14:creationId xmlns:p14="http://schemas.microsoft.com/office/powerpoint/2010/main" val="1717813938"/>
       </p:ext>
     </p:extLst>
   </p:cSld>
@@ -5253,7 +5590,7 @@
           <a:p>
             <a:r>
               <a:rPr lang="de-AT" dirty="0"/>
-              <a:t>CONTRUDE Schrempf</a:t>
+              <a:t>CONTRUDE Gekle</a:t>
             </a:r>
           </a:p>
         </p:txBody>
@@ -5350,7 +5687,13 @@
   <p:cSld>
     <p:spTree>
       <p:nvGrpSpPr>
-        <p:cNvPr id="1" name=""/>
+        <p:cNvPr id="1" name="">
+          <a:extLst>
+            <a:ext uri="{FF2B5EF4-FFF2-40B4-BE49-F238E27FC236}">
+              <a16:creationId xmlns:a16="http://schemas.microsoft.com/office/drawing/2014/main" id="{82E24322-B66E-8B59-2F7B-B3CA6C879B6F}"/>
+            </a:ext>
+          </a:extLst>
+        </p:cNvPr>
         <p:cNvGrpSpPr/>
         <p:nvPr/>
       </p:nvGrpSpPr>
@@ -5367,7 +5710,7 @@
           <p:cNvPr id="4" name="Fußzeilenplatzhalter 3">
             <a:extLst>
               <a:ext uri="{FF2B5EF4-FFF2-40B4-BE49-F238E27FC236}">
-                <a16:creationId xmlns:a16="http://schemas.microsoft.com/office/drawing/2014/main" id="{B3CE102D-CC78-4BE1-BDB4-67D0F8D57C56}"/>
+                <a16:creationId xmlns:a16="http://schemas.microsoft.com/office/drawing/2014/main" id="{6DEF0729-EEE5-BA05-101D-AF6618B51E1C}"/>
               </a:ext>
             </a:extLst>
           </p:cNvPr>
@@ -5385,7 +5728,7 @@
           <a:p>
             <a:r>
               <a:rPr lang="de-AT" dirty="0"/>
-              <a:t>CONTRUDE Schrempf</a:t>
+              <a:t>CONTRUDE Gekle</a:t>
             </a:r>
           </a:p>
         </p:txBody>
@@ -5395,7 +5738,7 @@
           <p:cNvPr id="5" name="Foliennummernplatzhalter 4">
             <a:extLst>
               <a:ext uri="{FF2B5EF4-FFF2-40B4-BE49-F238E27FC236}">
-                <a16:creationId xmlns:a16="http://schemas.microsoft.com/office/drawing/2014/main" id="{F8884CDD-B6BF-5A0E-36BE-3463B7C68BE9}"/>
+                <a16:creationId xmlns:a16="http://schemas.microsoft.com/office/drawing/2014/main" id="{DBB91875-284C-CABB-81DF-C979111B8358}"/>
               </a:ext>
             </a:extLst>
           </p:cNvPr>
@@ -5422,58 +5765,296 @@
       </p:sp>
       <p:sp>
         <p:nvSpPr>
-          <p:cNvPr id="6" name="Textfeld 5">
-            <a:extLst>
-              <a:ext uri="{FF2B5EF4-FFF2-40B4-BE49-F238E27FC236}">
-                <a16:creationId xmlns:a16="http://schemas.microsoft.com/office/drawing/2014/main" id="{44B73665-3D46-BD7A-F384-EC7A37F3E3EA}"/>
-              </a:ext>
-            </a:extLst>
-          </p:cNvPr>
-          <p:cNvSpPr txBox="1"/>
-          <p:nvPr/>
+          <p:cNvPr id="9" name="Titel 1">
+            <a:extLst>
+              <a:ext uri="{FF2B5EF4-FFF2-40B4-BE49-F238E27FC236}">
+                <a16:creationId xmlns:a16="http://schemas.microsoft.com/office/drawing/2014/main" id="{7DECD37C-3DD1-85DB-EB27-D3ACB4F2A33F}"/>
+              </a:ext>
+            </a:extLst>
+          </p:cNvPr>
+          <p:cNvSpPr>
+            <a:spLocks noGrp="1"/>
+          </p:cNvSpPr>
+          <p:nvPr>
+            <p:ph type="title"/>
+          </p:nvPr>
         </p:nvSpPr>
         <p:spPr>
           <a:xfrm>
-            <a:off x="800434" y="2882623"/>
-            <a:ext cx="6075907" cy="1200329"/>
+            <a:off x="969158" y="188640"/>
+            <a:ext cx="10270380" cy="720080"/>
+          </a:xfrm>
+        </p:spPr>
+        <p:txBody>
+          <a:bodyPr/>
+          <a:lstStyle/>
+          <a:p>
+            <a:r>
+              <a:rPr lang="de-AT" dirty="0"/>
+              <a:t>Aufgaben</a:t>
+            </a:r>
+          </a:p>
+        </p:txBody>
+      </p:sp>
+      <p:pic>
+        <p:nvPicPr>
+          <p:cNvPr id="2" name="Grafik 1">
+            <a:extLst>
+              <a:ext uri="{FF2B5EF4-FFF2-40B4-BE49-F238E27FC236}">
+                <a16:creationId xmlns:a16="http://schemas.microsoft.com/office/drawing/2014/main" id="{97391A01-26FA-D53D-BBEB-22073E0DF551}"/>
+              </a:ext>
+            </a:extLst>
+          </p:cNvPr>
+          <p:cNvPicPr>
+            <a:picLocks noGrp="1" noRot="1" noChangeAspect="1" noMove="1" noResize="1" noEditPoints="1" noAdjustHandles="1" noChangeArrowheads="1" noChangeShapeType="1" noCrop="1"/>
+          </p:cNvPicPr>
+          <p:nvPr/>
+        </p:nvPicPr>
+        <p:blipFill>
+          <a:blip r:embed="rId4">
+            <a:extLst>
+              <a:ext uri="{28A0092B-C50C-407E-A947-70E740481C1C}">
+                <a14:useLocalDpi xmlns:a14="http://schemas.microsoft.com/office/drawing/2010/main" val="0"/>
+              </a:ext>
+              <a:ext uri="{96DAC541-7B7A-43D3-8B79-37D633B846F1}">
+                <asvg:svgBlip xmlns:asvg="http://schemas.microsoft.com/office/drawing/2016/SVG/main" r:embed="rId5"/>
+              </a:ext>
+            </a:extLst>
+          </a:blip>
+          <a:stretch>
+            <a:fillRect/>
+          </a:stretch>
+        </p:blipFill>
+        <p:spPr>
+          <a:xfrm>
+            <a:off x="0" y="2220568"/>
+            <a:ext cx="12192000" cy="2416864"/>
           </a:xfrm>
           <a:prstGeom prst="rect">
             <a:avLst/>
           </a:prstGeom>
-          <a:noFill/>
         </p:spPr>
-        <p:txBody>
-          <a:bodyPr wrap="square" rtlCol="0">
-            <a:spAutoFit/>
-          </a:bodyPr>
-          <a:lstStyle/>
-          <a:p>
-            <a:r>
-              <a:rPr lang="de-DE" sz="7200" dirty="0">
-                <a:solidFill>
-                  <a:srgbClr val="9BBB59"/>
-                </a:solidFill>
-              </a:rPr>
-              <a:t>Zusatz</a:t>
-            </a:r>
-            <a:endParaRPr lang="en-US" sz="6600" dirty="0">
-              <a:solidFill>
-                <a:srgbClr val="9BBB59"/>
-              </a:solidFill>
-            </a:endParaRPr>
-          </a:p>
-        </p:txBody>
-      </p:sp>
+      </p:pic>
+      <p:pic>
+        <p:nvPicPr>
+          <p:cNvPr id="3" name="ship-horn-3">
+            <a:hlinkClick r:id="" action="ppaction://media"/>
+            <a:extLst>
+              <a:ext uri="{FF2B5EF4-FFF2-40B4-BE49-F238E27FC236}">
+                <a16:creationId xmlns:a16="http://schemas.microsoft.com/office/drawing/2014/main" id="{614C19D5-4A85-BEB6-DAD9-ED96190BF5FC}"/>
+              </a:ext>
+            </a:extLst>
+          </p:cNvPr>
+          <p:cNvPicPr>
+            <a:picLocks noChangeAspect="1"/>
+          </p:cNvPicPr>
+          <p:nvPr>
+            <a:audioFile r:link="rId1"/>
+            <p:extLst>
+              <p:ext uri="{DAA4B4D4-6D71-4841-9C94-3DE7FCFB9230}">
+                <p14:media xmlns:p14="http://schemas.microsoft.com/office/powerpoint/2010/main" r:embed="rId2">
+                  <p14:trim end="9695.3974"/>
+                  <p14:fade out="500"/>
+                </p14:media>
+              </p:ext>
+            </p:extLst>
+          </p:nvPr>
+        </p:nvPicPr>
+        <p:blipFill>
+          <a:blip r:embed="rId6"/>
+          <a:stretch>
+            <a:fillRect/>
+          </a:stretch>
+        </p:blipFill>
+        <p:spPr>
+          <a:xfrm>
+            <a:off x="725476" y="1037136"/>
+            <a:ext cx="487363" cy="487363"/>
+          </a:xfrm>
+          <a:prstGeom prst="rect">
+            <a:avLst/>
+          </a:prstGeom>
+        </p:spPr>
+      </p:pic>
     </p:spTree>
     <p:extLst>
       <p:ext uri="{BB962C8B-B14F-4D97-AF65-F5344CB8AC3E}">
-        <p14:creationId xmlns:p14="http://schemas.microsoft.com/office/powerpoint/2010/main" val="1846633128"/>
+        <p14:creationId xmlns:p14="http://schemas.microsoft.com/office/powerpoint/2010/main" val="90479122"/>
       </p:ext>
     </p:extLst>
   </p:cSld>
   <p:clrMapOvr>
     <a:masterClrMapping/>
   </p:clrMapOvr>
+  <mc:AlternateContent xmlns:mc="http://schemas.openxmlformats.org/markup-compatibility/2006" xmlns:p159="http://schemas.microsoft.com/office/powerpoint/2015/09/main">
+    <mc:Choice Requires="p159">
+      <p:transition xmlns:p14="http://schemas.microsoft.com/office/powerpoint/2010/main" spd="slow" p14:dur="2000">
+        <p159:morph option="byObject"/>
+      </p:transition>
+    </mc:Choice>
+    <mc:Fallback xmlns="">
+      <p:transition spd="slow">
+        <p:fade/>
+      </p:transition>
+    </mc:Fallback>
+  </mc:AlternateContent>
+  <p:timing>
+    <p:tnLst>
+      <p:par>
+        <p:cTn id="1" dur="indefinite" restart="never" nodeType="tmRoot">
+          <p:childTnLst>
+            <p:seq concurrent="1" nextAc="seek">
+              <p:cTn id="2" dur="indefinite" nodeType="mainSeq">
+                <p:childTnLst>
+                  <p:par>
+                    <p:cTn id="3" fill="hold">
+                      <p:stCondLst>
+                        <p:cond delay="indefinite"/>
+                      </p:stCondLst>
+                      <p:childTnLst>
+                        <p:par>
+                          <p:cTn id="4" fill="hold">
+                            <p:stCondLst>
+                              <p:cond delay="0"/>
+                            </p:stCondLst>
+                            <p:childTnLst>
+                              <p:par>
+                                <p:cTn id="5" presetID="2" presetClass="entr" presetSubtype="2" fill="hold" nodeType="clickEffect">
+                                  <p:stCondLst>
+                                    <p:cond delay="0"/>
+                                  </p:stCondLst>
+                                  <p:childTnLst>
+                                    <p:set>
+                                      <p:cBhvr>
+                                        <p:cTn id="6" dur="1" fill="hold">
+                                          <p:stCondLst>
+                                            <p:cond delay="0"/>
+                                          </p:stCondLst>
+                                        </p:cTn>
+                                        <p:tgtEl>
+                                          <p:spTgt spid="2"/>
+                                        </p:tgtEl>
+                                        <p:attrNameLst>
+                                          <p:attrName>style.visibility</p:attrName>
+                                        </p:attrNameLst>
+                                      </p:cBhvr>
+                                      <p:to>
+                                        <p:strVal val="visible"/>
+                                      </p:to>
+                                    </p:set>
+                                    <p:anim calcmode="lin" valueType="num">
+                                      <p:cBhvr additive="base">
+                                        <p:cTn id="7" dur="3000" fill="hold"/>
+                                        <p:tgtEl>
+                                          <p:spTgt spid="2"/>
+                                        </p:tgtEl>
+                                        <p:attrNameLst>
+                                          <p:attrName>ppt_x</p:attrName>
+                                        </p:attrNameLst>
+                                      </p:cBhvr>
+                                      <p:tavLst>
+                                        <p:tav tm="0">
+                                          <p:val>
+                                            <p:strVal val="1+#ppt_w/2"/>
+                                          </p:val>
+                                        </p:tav>
+                                        <p:tav tm="100000">
+                                          <p:val>
+                                            <p:strVal val="#ppt_x"/>
+                                          </p:val>
+                                        </p:tav>
+                                      </p:tavLst>
+                                    </p:anim>
+                                    <p:anim calcmode="lin" valueType="num">
+                                      <p:cBhvr additive="base">
+                                        <p:cTn id="8" dur="3000" fill="hold"/>
+                                        <p:tgtEl>
+                                          <p:spTgt spid="2"/>
+                                        </p:tgtEl>
+                                        <p:attrNameLst>
+                                          <p:attrName>ppt_y</p:attrName>
+                                        </p:attrNameLst>
+                                      </p:cBhvr>
+                                      <p:tavLst>
+                                        <p:tav tm="0">
+                                          <p:val>
+                                            <p:strVal val="#ppt_y"/>
+                                          </p:val>
+                                        </p:tav>
+                                        <p:tav tm="100000">
+                                          <p:val>
+                                            <p:strVal val="#ppt_y"/>
+                                          </p:val>
+                                        </p:tav>
+                                      </p:tavLst>
+                                    </p:anim>
+                                  </p:childTnLst>
+                                </p:cTn>
+                              </p:par>
+                              <p:par>
+                                <p:cTn id="9" presetID="1" presetClass="mediacall" presetSubtype="0" fill="hold" nodeType="withEffect">
+                                  <p:stCondLst>
+                                    <p:cond delay="0"/>
+                                  </p:stCondLst>
+                                  <p:childTnLst>
+                                    <p:cmd type="call" cmd="playFrom(0.0)">
+                                      <p:cBhvr>
+                                        <p:cTn id="10" dur="3848" fill="hold"/>
+                                        <p:tgtEl>
+                                          <p:spTgt spid="3"/>
+                                        </p:tgtEl>
+                                      </p:cBhvr>
+                                    </p:cmd>
+                                  </p:childTnLst>
+                                </p:cTn>
+                              </p:par>
+                            </p:childTnLst>
+                          </p:cTn>
+                        </p:par>
+                      </p:childTnLst>
+                    </p:cTn>
+                  </p:par>
+                </p:childTnLst>
+              </p:cTn>
+              <p:prevCondLst>
+                <p:cond evt="onPrev" delay="0">
+                  <p:tgtEl>
+                    <p:sldTgt/>
+                  </p:tgtEl>
+                </p:cond>
+              </p:prevCondLst>
+              <p:nextCondLst>
+                <p:cond evt="onNext" delay="0">
+                  <p:tgtEl>
+                    <p:sldTgt/>
+                  </p:tgtEl>
+                </p:cond>
+              </p:nextCondLst>
+            </p:seq>
+            <p:audio>
+              <p:cMediaNode showWhenStopped="0">
+                <p:cTn id="11" fill="hold" display="0">
+                  <p:stCondLst>
+                    <p:cond delay="indefinite"/>
+                  </p:stCondLst>
+                  <p:endCondLst>
+                    <p:cond evt="onStopAudio" delay="0">
+                      <p:tgtEl>
+                        <p:sldTgt/>
+                      </p:tgtEl>
+                    </p:cond>
+                  </p:endCondLst>
+                </p:cTn>
+                <p:tgtEl>
+                  <p:spTgt spid="3"/>
+                </p:tgtEl>
+              </p:cMediaNode>
+            </p:audio>
+          </p:childTnLst>
+        </p:cTn>
+      </p:par>
+    </p:tnLst>
+  </p:timing>
 </p:sld>
 </file>
 
@@ -5482,7 +6063,13 @@
   <p:cSld>
     <p:spTree>
       <p:nvGrpSpPr>
-        <p:cNvPr id="1" name=""/>
+        <p:cNvPr id="1" name="">
+          <a:extLst>
+            <a:ext uri="{FF2B5EF4-FFF2-40B4-BE49-F238E27FC236}">
+              <a16:creationId xmlns:a16="http://schemas.microsoft.com/office/drawing/2014/main" id="{290DC40E-9FE2-0DE2-B49D-59E99AD4B5B1}"/>
+            </a:ext>
+          </a:extLst>
+        </p:cNvPr>
         <p:cNvGrpSpPr/>
         <p:nvPr/>
       </p:nvGrpSpPr>
@@ -5494,20 +6081,58 @@
           <a:chExt cx="0" cy="0"/>
         </a:xfrm>
       </p:grpSpPr>
-      <p:sp>
-        <p:nvSpPr>
-          <p:cNvPr id="2" name="Titel 1">
-            <a:extLst>
-              <a:ext uri="{FF2B5EF4-FFF2-40B4-BE49-F238E27FC236}">
-                <a16:creationId xmlns:a16="http://schemas.microsoft.com/office/drawing/2014/main" id="{C07E26C7-4C51-12BD-B6ED-59ED0456DB3A}"/>
-              </a:ext>
-            </a:extLst>
-          </p:cNvPr>
-          <p:cNvSpPr>
-            <a:spLocks noGrp="1"/>
-          </p:cNvSpPr>
-          <p:nvPr>
-            <p:ph type="title"/>
+      <p:pic>
+        <p:nvPicPr>
+          <p:cNvPr id="21" name="Grafik 20">
+            <a:extLst>
+              <a:ext uri="{FF2B5EF4-FFF2-40B4-BE49-F238E27FC236}">
+                <a16:creationId xmlns:a16="http://schemas.microsoft.com/office/drawing/2014/main" id="{AFF99463-EA2A-B5F4-BA07-29113ABFADFF}"/>
+              </a:ext>
+            </a:extLst>
+          </p:cNvPr>
+          <p:cNvPicPr>
+            <a:picLocks noGrp="1" noRot="1" noChangeAspect="1" noMove="1" noResize="1" noEditPoints="1" noAdjustHandles="1" noChangeArrowheads="1" noChangeShapeType="1" noCrop="1"/>
+          </p:cNvPicPr>
+          <p:nvPr/>
+        </p:nvPicPr>
+        <p:blipFill>
+          <a:blip r:embed="rId3">
+            <a:extLst>
+              <a:ext uri="{28A0092B-C50C-407E-A947-70E740481C1C}">
+                <a14:useLocalDpi xmlns:a14="http://schemas.microsoft.com/office/drawing/2010/main" val="0"/>
+              </a:ext>
+              <a:ext uri="{96DAC541-7B7A-43D3-8B79-37D633B846F1}">
+                <asvg:svgBlip xmlns:asvg="http://schemas.microsoft.com/office/drawing/2016/SVG/main" r:embed="rId4"/>
+              </a:ext>
+            </a:extLst>
+          </a:blip>
+          <a:srcRect l="69606" t="21903" r="1"/>
+          <a:stretch/>
+        </p:blipFill>
+        <p:spPr>
+          <a:xfrm>
+            <a:off x="-1" y="0"/>
+            <a:ext cx="12192003" cy="6210206"/>
+          </a:xfrm>
+          <a:prstGeom prst="rect">
+            <a:avLst/>
+          </a:prstGeom>
+        </p:spPr>
+      </p:pic>
+      <p:sp>
+        <p:nvSpPr>
+          <p:cNvPr id="4" name="Fußzeilenplatzhalter 3">
+            <a:extLst>
+              <a:ext uri="{FF2B5EF4-FFF2-40B4-BE49-F238E27FC236}">
+                <a16:creationId xmlns:a16="http://schemas.microsoft.com/office/drawing/2014/main" id="{05FB4E07-B5B0-054D-29A2-7220079B2C8B}"/>
+              </a:ext>
+            </a:extLst>
+          </p:cNvPr>
+          <p:cNvSpPr>
+            <a:spLocks noGrp="1"/>
+          </p:cNvSpPr>
+          <p:nvPr>
+            <p:ph type="ftr" sz="quarter" idx="11"/>
           </p:nvPr>
         </p:nvSpPr>
         <p:spPr/>
@@ -5516,136 +6141,8 @@
           <a:lstStyle/>
           <a:p>
             <a:r>
-              <a:rPr lang="de-DE" dirty="0"/>
-              <a:t>PM </a:t>
-            </a:r>
-            <a:r>
-              <a:rPr lang="de-AT" noProof="0" dirty="0"/>
-              <a:t>–</a:t>
-            </a:r>
-            <a:r>
-              <a:rPr lang="de-DE" dirty="0"/>
-              <a:t> Meilensteine</a:t>
-            </a:r>
-            <a:endParaRPr lang="en-GB" dirty="0"/>
-          </a:p>
-        </p:txBody>
-      </p:sp>
-      <p:sp>
-        <p:nvSpPr>
-          <p:cNvPr id="3" name="Inhaltsplatzhalter 2">
-            <a:extLst>
-              <a:ext uri="{FF2B5EF4-FFF2-40B4-BE49-F238E27FC236}">
-                <a16:creationId xmlns:a16="http://schemas.microsoft.com/office/drawing/2014/main" id="{2298BAD1-D334-3EB5-39F2-5148AD4E9548}"/>
-              </a:ext>
-            </a:extLst>
-          </p:cNvPr>
-          <p:cNvSpPr>
-            <a:spLocks noGrp="1"/>
-          </p:cNvSpPr>
-          <p:nvPr>
-            <p:ph idx="1"/>
-          </p:nvPr>
-        </p:nvSpPr>
-        <p:spPr/>
-        <p:txBody>
-          <a:bodyPr>
-            <a:normAutofit lnSpcReduction="10000"/>
-          </a:bodyPr>
-          <a:lstStyle/>
-          <a:p>
-            <a:r>
-              <a:rPr lang="de-DE" sz="3200" dirty="0"/>
-              <a:t>2024-02-23: Genehmigung der DA</a:t>
-            </a:r>
-          </a:p>
-          <a:p>
-            <a:pPr lvl="1"/>
-            <a:r>
-              <a:rPr lang="de-DE" sz="2800" dirty="0"/>
-              <a:t>Einreichen des Antrags durch die Schüler</a:t>
-            </a:r>
-          </a:p>
-          <a:p>
-            <a:pPr lvl="1"/>
-            <a:r>
-              <a:rPr lang="de-DE" sz="2800" dirty="0"/>
-              <a:t>DA Dokumentation wurde ausgefüllt und unterschrieben</a:t>
-            </a:r>
-          </a:p>
-          <a:p>
-            <a:r>
-              <a:rPr lang="de-DE" sz="3200" dirty="0"/>
-              <a:t>2024-05-09: Projektplan Grobentwurf fertig</a:t>
-            </a:r>
-          </a:p>
-          <a:p>
-            <a:pPr lvl="1"/>
-            <a:r>
-              <a:rPr lang="de-DE" sz="2800" dirty="0"/>
-              <a:t>Zielsetzung ausgefüllt</a:t>
-            </a:r>
-          </a:p>
-          <a:p>
-            <a:pPr lvl="1"/>
-            <a:r>
-              <a:rPr lang="de-DE" sz="2800" dirty="0"/>
-              <a:t>Projektplan ausgefüllt</a:t>
-            </a:r>
-          </a:p>
-          <a:p>
-            <a:r>
-              <a:rPr lang="de-DE" sz="3200" dirty="0"/>
-              <a:t>2024-06-01: Hardware Komponenten Recherche fertig</a:t>
-            </a:r>
-          </a:p>
-          <a:p>
-            <a:pPr lvl="1"/>
-            <a:r>
-              <a:rPr lang="de-DE" sz="2800" dirty="0"/>
-              <a:t>Bestimmung der Komponenten</a:t>
-            </a:r>
-          </a:p>
-          <a:p>
-            <a:pPr lvl="1"/>
-            <a:r>
-              <a:rPr lang="de-DE" sz="2800" dirty="0"/>
-              <a:t>Preisrechnung</a:t>
-            </a:r>
-          </a:p>
-          <a:p>
-            <a:pPr lvl="1"/>
-            <a:r>
-              <a:rPr lang="de-DE" sz="2800" dirty="0"/>
-              <a:t>Terminrechnung</a:t>
-            </a:r>
-          </a:p>
-        </p:txBody>
-      </p:sp>
-      <p:sp>
-        <p:nvSpPr>
-          <p:cNvPr id="4" name="Fußzeilenplatzhalter 3">
-            <a:extLst>
-              <a:ext uri="{FF2B5EF4-FFF2-40B4-BE49-F238E27FC236}">
-                <a16:creationId xmlns:a16="http://schemas.microsoft.com/office/drawing/2014/main" id="{DA87C74A-4E8C-97BD-B263-9ECDD3FA2390}"/>
-              </a:ext>
-            </a:extLst>
-          </p:cNvPr>
-          <p:cNvSpPr>
-            <a:spLocks noGrp="1"/>
-          </p:cNvSpPr>
-          <p:nvPr>
-            <p:ph type="ftr" sz="quarter" idx="11"/>
-          </p:nvPr>
-        </p:nvSpPr>
-        <p:spPr/>
-        <p:txBody>
-          <a:bodyPr/>
-          <a:lstStyle/>
-          <a:p>
-            <a:r>
               <a:rPr lang="de-AT" dirty="0"/>
-              <a:t>CONTRUDE Schrempf</a:t>
+              <a:t>CONTRUDE Gekle</a:t>
             </a:r>
           </a:p>
         </p:txBody>
@@ -5655,7 +6152,7 @@
           <p:cNvPr id="5" name="Foliennummernplatzhalter 4">
             <a:extLst>
               <a:ext uri="{FF2B5EF4-FFF2-40B4-BE49-F238E27FC236}">
-                <a16:creationId xmlns:a16="http://schemas.microsoft.com/office/drawing/2014/main" id="{4A1C692A-074F-9345-4CEE-48C0116BFCA0}"/>
+                <a16:creationId xmlns:a16="http://schemas.microsoft.com/office/drawing/2014/main" id="{5834DF85-A644-B206-C87E-46917C1A48A0}"/>
               </a:ext>
             </a:extLst>
           </p:cNvPr>
@@ -5680,16 +6177,189 @@
           </a:p>
         </p:txBody>
       </p:sp>
+      <p:sp>
+        <p:nvSpPr>
+          <p:cNvPr id="2" name="Textfeld 1">
+            <a:extLst>
+              <a:ext uri="{FF2B5EF4-FFF2-40B4-BE49-F238E27FC236}">
+                <a16:creationId xmlns:a16="http://schemas.microsoft.com/office/drawing/2014/main" id="{98FE706A-3889-CB1E-CDA8-BE13B2FB4310}"/>
+              </a:ext>
+            </a:extLst>
+          </p:cNvPr>
+          <p:cNvSpPr txBox="1"/>
+          <p:nvPr/>
+        </p:nvSpPr>
+        <p:spPr>
+          <a:xfrm>
+            <a:off x="4870337" y="4697970"/>
+            <a:ext cx="3508349" cy="584775"/>
+          </a:xfrm>
+          <a:prstGeom prst="rect">
+            <a:avLst/>
+          </a:prstGeom>
+          <a:noFill/>
+        </p:spPr>
+        <p:txBody>
+          <a:bodyPr wrap="square" rtlCol="0">
+            <a:spAutoFit/>
+          </a:bodyPr>
+          <a:lstStyle/>
+          <a:p>
+            <a:r>
+              <a:rPr lang="de-AT" sz="3200" b="1" u="sng" dirty="0">
+                <a:solidFill>
+                  <a:schemeClr val="bg1"/>
+                </a:solidFill>
+              </a:rPr>
+              <a:t>Containersimulator</a:t>
+            </a:r>
+          </a:p>
+        </p:txBody>
+      </p:sp>
+      <p:sp>
+        <p:nvSpPr>
+          <p:cNvPr id="8" name="Textfeld 7">
+            <a:extLst>
+              <a:ext uri="{FF2B5EF4-FFF2-40B4-BE49-F238E27FC236}">
+                <a16:creationId xmlns:a16="http://schemas.microsoft.com/office/drawing/2014/main" id="{EF9C9E63-C082-E3F6-4821-4FBFB15A4BA4}"/>
+              </a:ext>
+            </a:extLst>
+          </p:cNvPr>
+          <p:cNvSpPr txBox="1"/>
+          <p:nvPr/>
+        </p:nvSpPr>
+        <p:spPr>
+          <a:xfrm>
+            <a:off x="7496831" y="1321339"/>
+            <a:ext cx="1537839" cy="507831"/>
+          </a:xfrm>
+          <a:prstGeom prst="rect">
+            <a:avLst/>
+          </a:prstGeom>
+          <a:noFill/>
+        </p:spPr>
+        <p:txBody>
+          <a:bodyPr wrap="square" rtlCol="0">
+            <a:spAutoFit/>
+          </a:bodyPr>
+          <a:lstStyle/>
+          <a:p>
+            <a:r>
+              <a:rPr lang="de-DE" sz="2700" b="1" dirty="0">
+                <a:solidFill>
+                  <a:schemeClr val="bg1"/>
+                </a:solidFill>
+              </a:rPr>
+              <a:t>S</a:t>
+            </a:r>
+            <a:r>
+              <a:rPr lang="de-AT" sz="2700" b="1" dirty="0">
+                <a:solidFill>
+                  <a:schemeClr val="bg1"/>
+                </a:solidFill>
+              </a:rPr>
+              <a:t>hip.java</a:t>
+            </a:r>
+          </a:p>
+        </p:txBody>
+      </p:sp>
+      <p:sp>
+        <p:nvSpPr>
+          <p:cNvPr id="11" name="Textfeld 10">
+            <a:extLst>
+              <a:ext uri="{FF2B5EF4-FFF2-40B4-BE49-F238E27FC236}">
+                <a16:creationId xmlns:a16="http://schemas.microsoft.com/office/drawing/2014/main" id="{4EFE939B-E3E4-6DAA-CFCD-9E6284BDB2A0}"/>
+              </a:ext>
+            </a:extLst>
+          </p:cNvPr>
+          <p:cNvSpPr txBox="1"/>
+          <p:nvPr/>
+        </p:nvSpPr>
+        <p:spPr>
+          <a:xfrm>
+            <a:off x="9809922" y="3652207"/>
+            <a:ext cx="2295939" cy="523220"/>
+          </a:xfrm>
+          <a:prstGeom prst="rect">
+            <a:avLst/>
+          </a:prstGeom>
+          <a:noFill/>
+        </p:spPr>
+        <p:txBody>
+          <a:bodyPr wrap="square" rtlCol="0">
+            <a:spAutoFit/>
+          </a:bodyPr>
+          <a:lstStyle/>
+          <a:p>
+            <a:r>
+              <a:rPr lang="de-AT" sz="2800" b="1" dirty="0">
+                <a:solidFill>
+                  <a:schemeClr val="bg1"/>
+                </a:solidFill>
+              </a:rPr>
+              <a:t>Container.java</a:t>
+            </a:r>
+          </a:p>
+        </p:txBody>
+      </p:sp>
+      <p:pic>
+        <p:nvPicPr>
+          <p:cNvPr id="6" name="Grafik 5" descr="Ein Bild, das Grafiken, Schrift, Text, Poster enthält.&#10;&#10;KI-generierte Inhalte können fehlerhaft sein.">
+            <a:extLst>
+              <a:ext uri="{FF2B5EF4-FFF2-40B4-BE49-F238E27FC236}">
+                <a16:creationId xmlns:a16="http://schemas.microsoft.com/office/drawing/2014/main" id="{E0F90778-B535-665E-F170-079C60279EAB}"/>
+              </a:ext>
+            </a:extLst>
+          </p:cNvPr>
+          <p:cNvPicPr>
+            <a:picLocks noChangeAspect="1"/>
+          </p:cNvPicPr>
+          <p:nvPr/>
+        </p:nvPicPr>
+        <p:blipFill>
+          <a:blip r:embed="rId5" cstate="print">
+            <a:extLst>
+              <a:ext uri="{28A0092B-C50C-407E-A947-70E740481C1C}">
+                <a14:useLocalDpi xmlns:a14="http://schemas.microsoft.com/office/drawing/2010/main" val="0"/>
+              </a:ext>
+            </a:extLst>
+          </a:blip>
+          <a:stretch>
+            <a:fillRect/>
+          </a:stretch>
+        </p:blipFill>
+        <p:spPr>
+          <a:xfrm>
+            <a:off x="4695170" y="861388"/>
+            <a:ext cx="1722199" cy="2909121"/>
+          </a:xfrm>
+          <a:prstGeom prst="rect">
+            <a:avLst/>
+          </a:prstGeom>
+        </p:spPr>
+      </p:pic>
     </p:spTree>
     <p:extLst>
       <p:ext uri="{BB962C8B-B14F-4D97-AF65-F5344CB8AC3E}">
-        <p14:creationId xmlns:p14="http://schemas.microsoft.com/office/powerpoint/2010/main" val="1145892815"/>
+        <p14:creationId xmlns:p14="http://schemas.microsoft.com/office/powerpoint/2010/main" val="3095648488"/>
       </p:ext>
     </p:extLst>
   </p:cSld>
   <p:clrMapOvr>
     <a:masterClrMapping/>
   </p:clrMapOvr>
+  <mc:AlternateContent xmlns:mc="http://schemas.openxmlformats.org/markup-compatibility/2006" xmlns:p159="http://schemas.microsoft.com/office/powerpoint/2015/09/main">
+    <mc:Choice Requires="p159">
+      <p:transition xmlns:p14="http://schemas.microsoft.com/office/powerpoint/2010/main" spd="slow" p14:dur="2000">
+        <p159:morph option="byObject"/>
+      </p:transition>
+    </mc:Choice>
+    <mc:Fallback xmlns="">
+      <p:transition spd="slow">
+        <p:fade/>
+      </p:transition>
+    </mc:Fallback>
+  </mc:AlternateContent>
 </p:sld>
 </file>
 
@@ -5698,7 +6368,13 @@
   <p:cSld>
     <p:spTree>
       <p:nvGrpSpPr>
-        <p:cNvPr id="1" name=""/>
+        <p:cNvPr id="1" name="">
+          <a:extLst>
+            <a:ext uri="{FF2B5EF4-FFF2-40B4-BE49-F238E27FC236}">
+              <a16:creationId xmlns:a16="http://schemas.microsoft.com/office/drawing/2014/main" id="{713DB4F4-9DAB-FA96-68A5-EA195C9F0F23}"/>
+            </a:ext>
+          </a:extLst>
+        </p:cNvPr>
         <p:cNvGrpSpPr/>
         <p:nvPr/>
       </p:nvGrpSpPr>
@@ -5712,18 +6388,18 @@
       </p:grpSpPr>
       <p:sp>
         <p:nvSpPr>
-          <p:cNvPr id="2" name="Titel 1">
-            <a:extLst>
-              <a:ext uri="{FF2B5EF4-FFF2-40B4-BE49-F238E27FC236}">
-                <a16:creationId xmlns:a16="http://schemas.microsoft.com/office/drawing/2014/main" id="{2E604182-9A1C-D7E8-6042-EDDB2477F9DA}"/>
-              </a:ext>
-            </a:extLst>
-          </p:cNvPr>
-          <p:cNvSpPr>
-            <a:spLocks noGrp="1"/>
-          </p:cNvSpPr>
-          <p:nvPr>
-            <p:ph type="title"/>
+          <p:cNvPr id="4" name="Fußzeilenplatzhalter 3">
+            <a:extLst>
+              <a:ext uri="{FF2B5EF4-FFF2-40B4-BE49-F238E27FC236}">
+                <a16:creationId xmlns:a16="http://schemas.microsoft.com/office/drawing/2014/main" id="{3E9E4CF8-36AB-ED91-4577-CEE8CDDACD0E}"/>
+              </a:ext>
+            </a:extLst>
+          </p:cNvPr>
+          <p:cNvSpPr>
+            <a:spLocks noGrp="1"/>
+          </p:cNvSpPr>
+          <p:nvPr>
+            <p:ph type="ftr" sz="quarter" idx="11"/>
           </p:nvPr>
         </p:nvSpPr>
         <p:spPr/>
@@ -5732,243 +6408,367 @@
           <a:lstStyle/>
           <a:p>
             <a:r>
-              <a:rPr lang="de-DE" dirty="0"/>
-              <a:t>PM </a:t>
-            </a:r>
-            <a:r>
-              <a:rPr lang="de-AT" noProof="0" dirty="0"/>
-              <a:t>–</a:t>
-            </a:r>
-            <a:r>
-              <a:rPr lang="de-DE" dirty="0"/>
-              <a:t> Meilensteine</a:t>
-            </a:r>
-            <a:endParaRPr lang="en-GB" dirty="0"/>
-          </a:p>
-        </p:txBody>
-      </p:sp>
-      <p:sp>
-        <p:nvSpPr>
-          <p:cNvPr id="3" name="Inhaltsplatzhalter 2">
-            <a:extLst>
-              <a:ext uri="{FF2B5EF4-FFF2-40B4-BE49-F238E27FC236}">
-                <a16:creationId xmlns:a16="http://schemas.microsoft.com/office/drawing/2014/main" id="{46FFA03D-AD87-DE6E-5C59-97B054813CE7}"/>
-              </a:ext>
-            </a:extLst>
-          </p:cNvPr>
-          <p:cNvSpPr>
-            <a:spLocks noGrp="1"/>
-          </p:cNvSpPr>
-          <p:nvPr>
-            <p:ph idx="1"/>
+              <a:rPr lang="de-AT" dirty="0"/>
+              <a:t>CONTRUDE Gekle</a:t>
+            </a:r>
+          </a:p>
+        </p:txBody>
+      </p:sp>
+      <p:sp>
+        <p:nvSpPr>
+          <p:cNvPr id="5" name="Foliennummernplatzhalter 4">
+            <a:extLst>
+              <a:ext uri="{FF2B5EF4-FFF2-40B4-BE49-F238E27FC236}">
+                <a16:creationId xmlns:a16="http://schemas.microsoft.com/office/drawing/2014/main" id="{19A6C87D-D1CC-B5F8-B074-B66A4858AAEF}"/>
+              </a:ext>
+            </a:extLst>
+          </p:cNvPr>
+          <p:cNvSpPr>
+            <a:spLocks noGrp="1"/>
+          </p:cNvSpPr>
+          <p:nvPr>
+            <p:ph type="sldNum" sz="quarter" idx="12"/>
           </p:nvPr>
         </p:nvSpPr>
         <p:spPr/>
         <p:txBody>
-          <a:bodyPr>
-            <a:normAutofit lnSpcReduction="10000"/>
-          </a:bodyPr>
-          <a:lstStyle/>
-          <a:p>
-            <a:pPr>
-              <a:spcBef>
-                <a:spcPts val="624"/>
-              </a:spcBef>
-              <a:buSzPts val="2600"/>
-            </a:pPr>
-            <a:r>
-              <a:rPr lang="de-DE" sz="3200" dirty="0">
+          <a:bodyPr/>
+          <a:lstStyle/>
+          <a:p>
+            <a:fld id="{7DCD6803-3BAA-44F6-A698-23D950C9713B}" type="slidenum">
+              <a:rPr lang="de-AT" smtClean="0">
                 <a:solidFill>
-                  <a:srgbClr val="000000"/>
+                  <a:schemeClr val="bg1"/>
                 </a:solidFill>
-                <a:latin typeface="Calibri" panose="020F0502020204030204" pitchFamily="34" charset="0"/>
               </a:rPr>
-              <a:t>2024-06-17: Datenbanken fertig</a:t>
-            </a:r>
-            <a:endParaRPr lang="en-GB" sz="3200" dirty="0">
-              <a:solidFill>
-                <a:srgbClr val="000000"/>
-              </a:solidFill>
-              <a:latin typeface="Calibri" panose="020F0502020204030204" pitchFamily="34" charset="0"/>
-            </a:endParaRPr>
-          </a:p>
-          <a:p>
-            <a:pPr lvl="1">
-              <a:spcBef>
-                <a:spcPts val="624"/>
-              </a:spcBef>
-              <a:buSzPts val="2600"/>
-            </a:pPr>
-            <a:r>
-              <a:rPr lang="de-DE" sz="2800" kern="1200" dirty="0">
-                <a:solidFill>
-                  <a:srgbClr val="000000"/>
-                </a:solidFill>
-                <a:effectLst/>
-                <a:latin typeface="Calibri" panose="020F0502020204030204" pitchFamily="34" charset="0"/>
-                <a:ea typeface="+mn-ea"/>
-                <a:cs typeface="+mn-cs"/>
-              </a:rPr>
-              <a:t>Allgemeine Container Informationen</a:t>
-            </a:r>
-            <a:endParaRPr lang="en-GB" sz="2800" dirty="0">
-              <a:effectLst/>
-            </a:endParaRPr>
-          </a:p>
-          <a:p>
-            <a:pPr lvl="1"/>
-            <a:r>
-              <a:rPr lang="de-DE" sz="2800" kern="1200" dirty="0">
-                <a:solidFill>
-                  <a:srgbClr val="000000"/>
-                </a:solidFill>
-                <a:effectLst/>
-                <a:latin typeface="Calibri" panose="020F0502020204030204" pitchFamily="34" charset="0"/>
-                <a:ea typeface="+mn-ea"/>
-                <a:cs typeface="+mn-cs"/>
-              </a:rPr>
-              <a:t>Sensor Daten</a:t>
-            </a:r>
-          </a:p>
-          <a:p>
-            <a:pPr>
-              <a:spcBef>
-                <a:spcPts val="624"/>
-              </a:spcBef>
-              <a:buSzPts val="2600"/>
-            </a:pPr>
-            <a:r>
-              <a:rPr lang="de-DE" sz="3200" dirty="0">
-                <a:solidFill>
-                  <a:srgbClr val="000000"/>
-                </a:solidFill>
-                <a:latin typeface="Calibri" panose="020F0502020204030204" pitchFamily="34" charset="0"/>
-              </a:rPr>
-              <a:t>2024-06-24: Erstpräsentation der DA</a:t>
-            </a:r>
-          </a:p>
-          <a:p>
-            <a:pPr lvl="1"/>
-            <a:r>
-              <a:rPr lang="de-DE" sz="2800" dirty="0"/>
-              <a:t>Fortschritt zusammenfassen</a:t>
-            </a:r>
-          </a:p>
-          <a:p>
-            <a:pPr lvl="1"/>
-            <a:r>
-              <a:rPr lang="de-DE" sz="2800" dirty="0"/>
-              <a:t>Gantt-Diagramm erstellen</a:t>
-            </a:r>
-          </a:p>
-          <a:p>
-            <a:pPr>
-              <a:spcBef>
-                <a:spcPts val="624"/>
-              </a:spcBef>
-              <a:buSzPts val="2600"/>
-            </a:pPr>
-            <a:r>
-              <a:rPr lang="de-DE" sz="3200" dirty="0">
-                <a:solidFill>
-                  <a:srgbClr val="000000"/>
-                </a:solidFill>
-                <a:latin typeface="Calibri" panose="020F0502020204030204" pitchFamily="34" charset="0"/>
-              </a:rPr>
-              <a:t>2024-07-04: Server Architektur fertig</a:t>
-            </a:r>
-          </a:p>
-          <a:p>
-            <a:pPr lvl="1"/>
-            <a:r>
-              <a:rPr lang="de-DE" sz="2800" dirty="0"/>
-              <a:t>Server ist einsatzfähig</a:t>
-            </a:r>
-          </a:p>
-          <a:p>
-            <a:pPr lvl="1"/>
-            <a:r>
-              <a:rPr lang="de-DE" sz="2800" dirty="0"/>
-              <a:t>REST-Schnittstelle</a:t>
-            </a:r>
-          </a:p>
-          <a:p>
-            <a:pPr lvl="1"/>
-            <a:r>
-              <a:rPr lang="de-DE" sz="2800" dirty="0"/>
-              <a:t>Zugriff kann von überall gestattet werden</a:t>
-            </a:r>
-          </a:p>
-        </p:txBody>
-      </p:sp>
-      <p:sp>
-        <p:nvSpPr>
-          <p:cNvPr id="4" name="Fußzeilenplatzhalter 3">
-            <a:extLst>
-              <a:ext uri="{FF2B5EF4-FFF2-40B4-BE49-F238E27FC236}">
-                <a16:creationId xmlns:a16="http://schemas.microsoft.com/office/drawing/2014/main" id="{094214A7-8620-D9B8-3FED-82856E7D3EA2}"/>
-              </a:ext>
-            </a:extLst>
-          </p:cNvPr>
-          <p:cNvSpPr>
-            <a:spLocks noGrp="1"/>
-          </p:cNvSpPr>
-          <p:nvPr>
-            <p:ph type="ftr" sz="quarter" idx="11"/>
-          </p:nvPr>
-        </p:nvSpPr>
-        <p:spPr/>
-        <p:txBody>
-          <a:bodyPr/>
-          <a:lstStyle/>
-          <a:p>
-            <a:r>
-              <a:rPr lang="de-AT" dirty="0"/>
-              <a:t>CONTRUDE Schrempf</a:t>
-            </a:r>
-          </a:p>
-        </p:txBody>
-      </p:sp>
-      <p:sp>
-        <p:nvSpPr>
-          <p:cNvPr id="5" name="Foliennummernplatzhalter 4">
-            <a:extLst>
-              <a:ext uri="{FF2B5EF4-FFF2-40B4-BE49-F238E27FC236}">
-                <a16:creationId xmlns:a16="http://schemas.microsoft.com/office/drawing/2014/main" id="{BA839904-ECA7-79B3-C0EF-868137B9341E}"/>
-              </a:ext>
-            </a:extLst>
-          </p:cNvPr>
-          <p:cNvSpPr>
-            <a:spLocks noGrp="1"/>
-          </p:cNvSpPr>
-          <p:nvPr>
-            <p:ph type="sldNum" sz="quarter" idx="12"/>
-          </p:nvPr>
-        </p:nvSpPr>
-        <p:spPr/>
-        <p:txBody>
-          <a:bodyPr/>
-          <a:lstStyle/>
-          <a:p>
-            <a:fld id="{7DCD6803-3BAA-44F6-A698-23D950C9713B}" type="slidenum">
-              <a:rPr lang="de-AT" smtClean="0"/>
               <a:pPr/>
               <a:t>17</a:t>
             </a:fld>
-            <a:endParaRPr lang="de-AT"/>
-          </a:p>
-        </p:txBody>
-      </p:sp>
+            <a:endParaRPr lang="de-AT">
+              <a:solidFill>
+                <a:schemeClr val="bg1"/>
+              </a:solidFill>
+            </a:endParaRPr>
+          </a:p>
+        </p:txBody>
+      </p:sp>
+      <p:pic>
+        <p:nvPicPr>
+          <p:cNvPr id="2050" name="Picture 2" descr="NodeMCU ESP32 | Joy-IT">
+            <a:extLst>
+              <a:ext uri="{FF2B5EF4-FFF2-40B4-BE49-F238E27FC236}">
+                <a16:creationId xmlns:a16="http://schemas.microsoft.com/office/drawing/2014/main" id="{5599432D-2D7D-1466-EC9F-FF200ADD0D05}"/>
+              </a:ext>
+            </a:extLst>
+          </p:cNvPr>
+          <p:cNvPicPr>
+            <a:picLocks noChangeAspect="1" noChangeArrowheads="1"/>
+          </p:cNvPicPr>
+          <p:nvPr/>
+        </p:nvPicPr>
+        <p:blipFill>
+          <a:blip r:embed="rId3" cstate="print">
+            <a:extLst>
+              <a:ext uri="{28A0092B-C50C-407E-A947-70E740481C1C}">
+                <a14:useLocalDpi xmlns:a14="http://schemas.microsoft.com/office/drawing/2010/main" val="0"/>
+              </a:ext>
+            </a:extLst>
+          </a:blip>
+          <a:srcRect/>
+          <a:stretch>
+            <a:fillRect/>
+          </a:stretch>
+        </p:blipFill>
+        <p:spPr bwMode="auto">
+          <a:xfrm>
+            <a:off x="5312724" y="1785166"/>
+            <a:ext cx="559134" cy="559134"/>
+          </a:xfrm>
+          <a:prstGeom prst="rect">
+            <a:avLst/>
+          </a:prstGeom>
+          <a:noFill/>
+          <a:extLst>
+            <a:ext uri="{909E8E84-426E-40DD-AFC4-6F175D3DCCD1}">
+              <a14:hiddenFill xmlns:a14="http://schemas.microsoft.com/office/drawing/2010/main">
+                <a:solidFill>
+                  <a:srgbClr val="FFFFFF"/>
+                </a:solidFill>
+              </a14:hiddenFill>
+            </a:ext>
+          </a:extLst>
+        </p:spPr>
+      </p:pic>
+      <p:pic>
+        <p:nvPicPr>
+          <p:cNvPr id="6" name="Grafik 5">
+            <a:extLst>
+              <a:ext uri="{FF2B5EF4-FFF2-40B4-BE49-F238E27FC236}">
+                <a16:creationId xmlns:a16="http://schemas.microsoft.com/office/drawing/2014/main" id="{2F782A7C-601B-944F-E25E-5602F727B3BE}"/>
+              </a:ext>
+            </a:extLst>
+          </p:cNvPr>
+          <p:cNvPicPr>
+            <a:picLocks noGrp="1" noRot="1" noChangeAspect="1" noMove="1" noResize="1" noEditPoints="1" noAdjustHandles="1" noChangeArrowheads="1" noChangeShapeType="1" noCrop="1"/>
+          </p:cNvPicPr>
+          <p:nvPr/>
+        </p:nvPicPr>
+        <p:blipFill rotWithShape="1">
+          <a:blip r:embed="rId4">
+            <a:extLst>
+              <a:ext uri="{28A0092B-C50C-407E-A947-70E740481C1C}">
+                <a14:useLocalDpi xmlns:a14="http://schemas.microsoft.com/office/drawing/2010/main" val="0"/>
+              </a:ext>
+              <a:ext uri="{96DAC541-7B7A-43D3-8B79-37D633B846F1}">
+                <asvg:svgBlip xmlns:asvg="http://schemas.microsoft.com/office/drawing/2016/SVG/main" r:embed="rId5"/>
+              </a:ext>
+            </a:extLst>
+          </a:blip>
+          <a:srcRect l="38369" t="12999" r="30542" b="-2628"/>
+          <a:stretch/>
+        </p:blipFill>
+        <p:spPr>
+          <a:xfrm>
+            <a:off x="0" y="140765"/>
+            <a:ext cx="12192000" cy="6215588"/>
+          </a:xfrm>
+          <a:prstGeom prst="rect">
+            <a:avLst/>
+          </a:prstGeom>
+        </p:spPr>
+      </p:pic>
+      <p:sp>
+        <p:nvSpPr>
+          <p:cNvPr id="2" name="Textfeld 1">
+            <a:extLst>
+              <a:ext uri="{FF2B5EF4-FFF2-40B4-BE49-F238E27FC236}">
+                <a16:creationId xmlns:a16="http://schemas.microsoft.com/office/drawing/2014/main" id="{B9A8C308-EE1C-D87F-C067-4147AAF7B27F}"/>
+              </a:ext>
+            </a:extLst>
+          </p:cNvPr>
+          <p:cNvSpPr txBox="1"/>
+          <p:nvPr/>
+        </p:nvSpPr>
+        <p:spPr>
+          <a:xfrm>
+            <a:off x="4492339" y="4708492"/>
+            <a:ext cx="3305462" cy="584775"/>
+          </a:xfrm>
+          <a:prstGeom prst="rect">
+            <a:avLst/>
+          </a:prstGeom>
+          <a:noFill/>
+        </p:spPr>
+        <p:txBody>
+          <a:bodyPr wrap="square" rtlCol="0">
+            <a:spAutoFit/>
+          </a:bodyPr>
+          <a:lstStyle/>
+          <a:p>
+            <a:r>
+              <a:rPr lang="de-AT" sz="3200" b="1" u="sng" dirty="0">
+                <a:solidFill>
+                  <a:schemeClr val="bg1"/>
+                </a:solidFill>
+              </a:rPr>
+              <a:t>Graphentheorie</a:t>
+            </a:r>
+          </a:p>
+        </p:txBody>
+      </p:sp>
+      <p:sp>
+        <p:nvSpPr>
+          <p:cNvPr id="9" name="Textfeld 8">
+            <a:extLst>
+              <a:ext uri="{FF2B5EF4-FFF2-40B4-BE49-F238E27FC236}">
+                <a16:creationId xmlns:a16="http://schemas.microsoft.com/office/drawing/2014/main" id="{664CAFD9-C326-7889-69C0-4B95D393BD19}"/>
+              </a:ext>
+            </a:extLst>
+          </p:cNvPr>
+          <p:cNvSpPr txBox="1"/>
+          <p:nvPr/>
+        </p:nvSpPr>
+        <p:spPr>
+          <a:xfrm>
+            <a:off x="2473858" y="1782395"/>
+            <a:ext cx="1601185" cy="954107"/>
+          </a:xfrm>
+          <a:prstGeom prst="rect">
+            <a:avLst/>
+          </a:prstGeom>
+          <a:noFill/>
+        </p:spPr>
+        <p:txBody>
+          <a:bodyPr wrap="square" rtlCol="0">
+            <a:spAutoFit/>
+          </a:bodyPr>
+          <a:lstStyle/>
+          <a:p>
+            <a:r>
+              <a:rPr lang="de-AT" sz="2800" b="1" dirty="0" err="1">
+                <a:solidFill>
+                  <a:schemeClr val="bg1"/>
+                </a:solidFill>
+              </a:rPr>
+              <a:t>Adjazen</a:t>
+            </a:r>
+            <a:r>
+              <a:rPr lang="de-AT" sz="2800" b="1" dirty="0">
+                <a:solidFill>
+                  <a:schemeClr val="bg1"/>
+                </a:solidFill>
+              </a:rPr>
+              <a:t>-Matrix</a:t>
+            </a:r>
+          </a:p>
+        </p:txBody>
+      </p:sp>
+      <p:sp>
+        <p:nvSpPr>
+          <p:cNvPr id="10" name="Textfeld 9">
+            <a:extLst>
+              <a:ext uri="{FF2B5EF4-FFF2-40B4-BE49-F238E27FC236}">
+                <a16:creationId xmlns:a16="http://schemas.microsoft.com/office/drawing/2014/main" id="{3EB5E95A-6817-304D-80F5-88A5929ED772}"/>
+              </a:ext>
+            </a:extLst>
+          </p:cNvPr>
+          <p:cNvSpPr txBox="1"/>
+          <p:nvPr/>
+        </p:nvSpPr>
+        <p:spPr>
+          <a:xfrm>
+            <a:off x="7797801" y="1782395"/>
+            <a:ext cx="1704008" cy="954107"/>
+          </a:xfrm>
+          <a:prstGeom prst="rect">
+            <a:avLst/>
+          </a:prstGeom>
+          <a:noFill/>
+        </p:spPr>
+        <p:txBody>
+          <a:bodyPr wrap="square" rtlCol="0">
+            <a:spAutoFit/>
+          </a:bodyPr>
+          <a:lstStyle/>
+          <a:p>
+            <a:r>
+              <a:rPr lang="de-DE" sz="2800" b="1" dirty="0" err="1">
+                <a:solidFill>
+                  <a:schemeClr val="bg1"/>
+                </a:solidFill>
+              </a:rPr>
+              <a:t>Draggable</a:t>
+            </a:r>
+            <a:r>
+              <a:rPr lang="de-DE" sz="2800" b="1" dirty="0">
+                <a:solidFill>
+                  <a:schemeClr val="bg1"/>
+                </a:solidFill>
+              </a:rPr>
+              <a:t> Graph</a:t>
+            </a:r>
+            <a:endParaRPr lang="de-AT" sz="2800" b="1" dirty="0">
+              <a:solidFill>
+                <a:schemeClr val="bg1"/>
+              </a:solidFill>
+            </a:endParaRPr>
+          </a:p>
+        </p:txBody>
+      </p:sp>
+      <p:pic>
+        <p:nvPicPr>
+          <p:cNvPr id="7" name="Grafik 6" descr="Ein Bild, das Grafiken, Kreis, Schrift, Grafikdesign enthält.&#10;&#10;KI-generierte Inhalte können fehlerhaft sein.">
+            <a:extLst>
+              <a:ext uri="{FF2B5EF4-FFF2-40B4-BE49-F238E27FC236}">
+                <a16:creationId xmlns:a16="http://schemas.microsoft.com/office/drawing/2014/main" id="{4EDA8D3D-B290-C20E-2E0A-EB2AE38D4B6F}"/>
+              </a:ext>
+            </a:extLst>
+          </p:cNvPr>
+          <p:cNvPicPr>
+            <a:picLocks noChangeAspect="1"/>
+          </p:cNvPicPr>
+          <p:nvPr/>
+        </p:nvPicPr>
+        <p:blipFill>
+          <a:blip r:embed="rId6" cstate="print">
+            <a:extLst>
+              <a:ext uri="{28A0092B-C50C-407E-A947-70E740481C1C}">
+                <a14:useLocalDpi xmlns:a14="http://schemas.microsoft.com/office/drawing/2010/main" val="0"/>
+              </a:ext>
+            </a:extLst>
+          </a:blip>
+          <a:stretch>
+            <a:fillRect/>
+          </a:stretch>
+        </p:blipFill>
+        <p:spPr>
+          <a:xfrm>
+            <a:off x="5216550" y="2055905"/>
+            <a:ext cx="1800181" cy="1708420"/>
+          </a:xfrm>
+          <a:prstGeom prst="rect">
+            <a:avLst/>
+          </a:prstGeom>
+        </p:spPr>
+      </p:pic>
+      <p:pic>
+        <p:nvPicPr>
+          <p:cNvPr id="11" name="Grafik 10" descr="Ein Bild, das Screenshot, Grafiken, gelb, Rechteck enthält.&#10;&#10;KI-generierte Inhalte können fehlerhaft sein.">
+            <a:extLst>
+              <a:ext uri="{FF2B5EF4-FFF2-40B4-BE49-F238E27FC236}">
+                <a16:creationId xmlns:a16="http://schemas.microsoft.com/office/drawing/2014/main" id="{86623333-EDE8-AADC-4FF0-3C1BFD9C43BB}"/>
+              </a:ext>
+            </a:extLst>
+          </p:cNvPr>
+          <p:cNvPicPr>
+            <a:picLocks noChangeAspect="1"/>
+          </p:cNvPicPr>
+          <p:nvPr/>
+        </p:nvPicPr>
+        <p:blipFill>
+          <a:blip r:embed="rId7" cstate="print">
+            <a:extLst>
+              <a:ext uri="{28A0092B-C50C-407E-A947-70E740481C1C}">
+                <a14:useLocalDpi xmlns:a14="http://schemas.microsoft.com/office/drawing/2010/main" val="0"/>
+              </a:ext>
+            </a:extLst>
+          </a:blip>
+          <a:stretch>
+            <a:fillRect/>
+          </a:stretch>
+        </p:blipFill>
+        <p:spPr>
+          <a:xfrm>
+            <a:off x="117014" y="1980806"/>
+            <a:ext cx="1660841" cy="1858617"/>
+          </a:xfrm>
+          <a:prstGeom prst="rect">
+            <a:avLst/>
+          </a:prstGeom>
+        </p:spPr>
+      </p:pic>
     </p:spTree>
     <p:extLst>
       <p:ext uri="{BB962C8B-B14F-4D97-AF65-F5344CB8AC3E}">
-        <p14:creationId xmlns:p14="http://schemas.microsoft.com/office/powerpoint/2010/main" val="4010256110"/>
+        <p14:creationId xmlns:p14="http://schemas.microsoft.com/office/powerpoint/2010/main" val="1791650650"/>
       </p:ext>
     </p:extLst>
   </p:cSld>
   <p:clrMapOvr>
     <a:masterClrMapping/>
   </p:clrMapOvr>
+  <mc:AlternateContent xmlns:mc="http://schemas.openxmlformats.org/markup-compatibility/2006" xmlns:p159="http://schemas.microsoft.com/office/powerpoint/2015/09/main">
+    <mc:Choice Requires="p159">
+      <p:transition xmlns:p14="http://schemas.microsoft.com/office/powerpoint/2010/main" spd="slow" p14:dur="2000" advClick="0">
+        <p159:morph option="byObject"/>
+      </p:transition>
+    </mc:Choice>
+    <mc:Fallback xmlns="">
+      <p:transition spd="slow" advClick="0">
+        <p:fade/>
+      </p:transition>
+    </mc:Fallback>
+  </mc:AlternateContent>
 </p:sld>
 </file>
 
@@ -5977,7 +6777,13 @@
   <p:cSld>
     <p:spTree>
       <p:nvGrpSpPr>
-        <p:cNvPr id="1" name=""/>
+        <p:cNvPr id="1" name="">
+          <a:extLst>
+            <a:ext uri="{FF2B5EF4-FFF2-40B4-BE49-F238E27FC236}">
+              <a16:creationId xmlns:a16="http://schemas.microsoft.com/office/drawing/2014/main" id="{6AF8AFAF-B773-21D1-41A6-81D8E01F6C9A}"/>
+            </a:ext>
+          </a:extLst>
+        </p:cNvPr>
         <p:cNvGrpSpPr/>
         <p:nvPr/>
       </p:nvGrpSpPr>
@@ -5991,18 +6797,18 @@
       </p:grpSpPr>
       <p:sp>
         <p:nvSpPr>
-          <p:cNvPr id="2" name="Titel 1">
-            <a:extLst>
-              <a:ext uri="{FF2B5EF4-FFF2-40B4-BE49-F238E27FC236}">
-                <a16:creationId xmlns:a16="http://schemas.microsoft.com/office/drawing/2014/main" id="{DA508D63-14D9-FB7A-7F5E-DBD26DA9D211}"/>
-              </a:ext>
-            </a:extLst>
-          </p:cNvPr>
-          <p:cNvSpPr>
-            <a:spLocks noGrp="1"/>
-          </p:cNvSpPr>
-          <p:nvPr>
-            <p:ph type="title"/>
+          <p:cNvPr id="4" name="Fußzeilenplatzhalter 3">
+            <a:extLst>
+              <a:ext uri="{FF2B5EF4-FFF2-40B4-BE49-F238E27FC236}">
+                <a16:creationId xmlns:a16="http://schemas.microsoft.com/office/drawing/2014/main" id="{EBBC8281-D6D3-9C1C-8ACB-64E69FBF365C}"/>
+              </a:ext>
+            </a:extLst>
+          </p:cNvPr>
+          <p:cNvSpPr>
+            <a:spLocks noGrp="1"/>
+          </p:cNvSpPr>
+          <p:nvPr>
+            <p:ph type="ftr" sz="quarter" idx="11"/>
           </p:nvPr>
         </p:nvSpPr>
         <p:spPr/>
@@ -6011,127 +6817,8 @@
           <a:lstStyle/>
           <a:p>
             <a:r>
-              <a:rPr lang="de-DE" dirty="0"/>
-              <a:t>PM </a:t>
-            </a:r>
-            <a:r>
-              <a:rPr lang="de-AT" noProof="0" dirty="0"/>
-              <a:t>–</a:t>
-            </a:r>
-            <a:r>
-              <a:rPr lang="de-DE" dirty="0"/>
-              <a:t> Meilensteine</a:t>
-            </a:r>
-            <a:endParaRPr lang="en-GB" dirty="0"/>
-          </a:p>
-        </p:txBody>
-      </p:sp>
-      <p:sp>
-        <p:nvSpPr>
-          <p:cNvPr id="3" name="Inhaltsplatzhalter 2">
-            <a:extLst>
-              <a:ext uri="{FF2B5EF4-FFF2-40B4-BE49-F238E27FC236}">
-                <a16:creationId xmlns:a16="http://schemas.microsoft.com/office/drawing/2014/main" id="{96C92B48-A3B2-FA7C-965F-05D4644F25AC}"/>
-              </a:ext>
-            </a:extLst>
-          </p:cNvPr>
-          <p:cNvSpPr>
-            <a:spLocks noGrp="1"/>
-          </p:cNvSpPr>
-          <p:nvPr>
-            <p:ph idx="1"/>
-          </p:nvPr>
-        </p:nvSpPr>
-        <p:spPr/>
-        <p:txBody>
-          <a:bodyPr/>
-          <a:lstStyle/>
-          <a:p>
-            <a:r>
-              <a:rPr lang="de-DE" sz="3200" dirty="0"/>
-              <a:t>2024-09-04: Prototyp funktionell</a:t>
-            </a:r>
-          </a:p>
-          <a:p>
-            <a:pPr lvl="1"/>
-            <a:r>
-              <a:rPr lang="de-DE" sz="2800" dirty="0"/>
-              <a:t>Hardware Komponenten gekauft und geliefert</a:t>
-            </a:r>
-          </a:p>
-          <a:p>
-            <a:pPr lvl="1"/>
-            <a:r>
-              <a:rPr lang="de-DE" sz="2800" dirty="0"/>
-              <a:t>Löten der Komponenten</a:t>
-            </a:r>
-          </a:p>
-          <a:p>
-            <a:pPr lvl="1"/>
-            <a:r>
-              <a:rPr lang="de-DE" sz="2800" dirty="0"/>
-              <a:t>Datenübertragung mittels MQTT</a:t>
-            </a:r>
-          </a:p>
-          <a:p>
-            <a:r>
-              <a:rPr lang="de-DE" sz="3200" dirty="0"/>
-              <a:t>2024-10-23: Zweitpräsentation der DA</a:t>
-            </a:r>
-          </a:p>
-          <a:p>
-            <a:pPr lvl="1"/>
-            <a:r>
-              <a:rPr lang="de-DE" sz="2800" dirty="0"/>
-              <a:t>Fortschritt zusammenfassen</a:t>
-            </a:r>
-          </a:p>
-          <a:p>
-            <a:r>
-              <a:rPr lang="de-DE" sz="3200" dirty="0"/>
-              <a:t>2024-11-03: Positionsalgorithmus funktionell</a:t>
-            </a:r>
-          </a:p>
-          <a:p>
-            <a:pPr lvl="1"/>
-            <a:r>
-              <a:rPr lang="de-DE" sz="2800" dirty="0"/>
-              <a:t>Ungefähre Position des Containers</a:t>
-            </a:r>
-          </a:p>
-          <a:p>
-            <a:pPr lvl="1"/>
-            <a:r>
-              <a:rPr lang="de-DE" sz="2800" dirty="0"/>
-              <a:t>Entfernung zu benachbarten Containern ermitteln</a:t>
-            </a:r>
-          </a:p>
-        </p:txBody>
-      </p:sp>
-      <p:sp>
-        <p:nvSpPr>
-          <p:cNvPr id="4" name="Fußzeilenplatzhalter 3">
-            <a:extLst>
-              <a:ext uri="{FF2B5EF4-FFF2-40B4-BE49-F238E27FC236}">
-                <a16:creationId xmlns:a16="http://schemas.microsoft.com/office/drawing/2014/main" id="{D2F6F857-2994-C8CD-13E0-FC23FA81066F}"/>
-              </a:ext>
-            </a:extLst>
-          </p:cNvPr>
-          <p:cNvSpPr>
-            <a:spLocks noGrp="1"/>
-          </p:cNvSpPr>
-          <p:nvPr>
-            <p:ph type="ftr" sz="quarter" idx="11"/>
-          </p:nvPr>
-        </p:nvSpPr>
-        <p:spPr/>
-        <p:txBody>
-          <a:bodyPr/>
-          <a:lstStyle/>
-          <a:p>
-            <a:r>
               <a:rPr lang="de-AT" dirty="0"/>
-              <a:t>CONTRUDE Schrempf</a:t>
+              <a:t>CONTRUDE Gekle</a:t>
             </a:r>
           </a:p>
         </p:txBody>
@@ -6141,7 +6828,7 @@
           <p:cNvPr id="5" name="Foliennummernplatzhalter 4">
             <a:extLst>
               <a:ext uri="{FF2B5EF4-FFF2-40B4-BE49-F238E27FC236}">
-                <a16:creationId xmlns:a16="http://schemas.microsoft.com/office/drawing/2014/main" id="{33BFEAC2-79B3-54F2-A284-E5D35994050E}"/>
+                <a16:creationId xmlns:a16="http://schemas.microsoft.com/office/drawing/2014/main" id="{1462792D-5944-6C32-DE18-158D2A2182F1}"/>
               </a:ext>
             </a:extLst>
           </p:cNvPr>
@@ -6166,16 +6853,321 @@
           </a:p>
         </p:txBody>
       </p:sp>
+      <p:pic>
+        <p:nvPicPr>
+          <p:cNvPr id="6" name="Grafik 5">
+            <a:extLst>
+              <a:ext uri="{FF2B5EF4-FFF2-40B4-BE49-F238E27FC236}">
+                <a16:creationId xmlns:a16="http://schemas.microsoft.com/office/drawing/2014/main" id="{816449EC-0DE1-3C62-B742-B1BBA5D21A52}"/>
+              </a:ext>
+            </a:extLst>
+          </p:cNvPr>
+          <p:cNvPicPr>
+            <a:picLocks noGrp="1" noRot="1" noChangeAspect="1" noMove="1" noResize="1" noEditPoints="1" noAdjustHandles="1" noChangeArrowheads="1" noChangeShapeType="1" noCrop="1"/>
+          </p:cNvPicPr>
+          <p:nvPr/>
+        </p:nvPicPr>
+        <p:blipFill rotWithShape="1">
+          <a:blip r:embed="rId3">
+            <a:extLst>
+              <a:ext uri="{28A0092B-C50C-407E-A947-70E740481C1C}">
+                <a14:useLocalDpi xmlns:a14="http://schemas.microsoft.com/office/drawing/2010/main" val="0"/>
+              </a:ext>
+              <a:ext uri="{96DAC541-7B7A-43D3-8B79-37D633B846F1}">
+                <asvg:svgBlip xmlns:asvg="http://schemas.microsoft.com/office/drawing/2016/SVG/main" r:embed="rId4"/>
+              </a:ext>
+            </a:extLst>
+          </a:blip>
+          <a:srcRect l="7899" t="12999" r="61013" b="-2628"/>
+          <a:stretch/>
+        </p:blipFill>
+        <p:spPr>
+          <a:xfrm>
+            <a:off x="0" y="168884"/>
+            <a:ext cx="12191999" cy="6215588"/>
+          </a:xfrm>
+          <a:prstGeom prst="rect">
+            <a:avLst/>
+          </a:prstGeom>
+        </p:spPr>
+      </p:pic>
+      <p:sp>
+        <p:nvSpPr>
+          <p:cNvPr id="2" name="Textfeld 1">
+            <a:extLst>
+              <a:ext uri="{FF2B5EF4-FFF2-40B4-BE49-F238E27FC236}">
+                <a16:creationId xmlns:a16="http://schemas.microsoft.com/office/drawing/2014/main" id="{C1102F82-55F1-E1CE-4975-3226392C9427}"/>
+              </a:ext>
+            </a:extLst>
+          </p:cNvPr>
+          <p:cNvSpPr txBox="1"/>
+          <p:nvPr/>
+        </p:nvSpPr>
+        <p:spPr>
+          <a:xfrm>
+            <a:off x="5459394" y="4698004"/>
+            <a:ext cx="3187649" cy="584775"/>
+          </a:xfrm>
+          <a:prstGeom prst="rect">
+            <a:avLst/>
+          </a:prstGeom>
+          <a:noFill/>
+        </p:spPr>
+        <p:txBody>
+          <a:bodyPr wrap="square" rtlCol="0">
+            <a:spAutoFit/>
+          </a:bodyPr>
+          <a:lstStyle/>
+          <a:p>
+            <a:r>
+              <a:rPr lang="de-AT" sz="3200" b="1" u="sng" dirty="0">
+                <a:solidFill>
+                  <a:schemeClr val="bg1"/>
+                </a:solidFill>
+              </a:rPr>
+              <a:t>Webanwendung</a:t>
+            </a:r>
+          </a:p>
+        </p:txBody>
+      </p:sp>
+      <p:sp>
+        <p:nvSpPr>
+          <p:cNvPr id="9" name="Textfeld 8">
+            <a:extLst>
+              <a:ext uri="{FF2B5EF4-FFF2-40B4-BE49-F238E27FC236}">
+                <a16:creationId xmlns:a16="http://schemas.microsoft.com/office/drawing/2014/main" id="{605F7652-CB78-DC84-5D7E-9FD88CB1D1C0}"/>
+              </a:ext>
+            </a:extLst>
+          </p:cNvPr>
+          <p:cNvSpPr txBox="1"/>
+          <p:nvPr/>
+        </p:nvSpPr>
+        <p:spPr>
+          <a:xfrm>
+            <a:off x="9153598" y="2210454"/>
+            <a:ext cx="2012804" cy="523220"/>
+          </a:xfrm>
+          <a:prstGeom prst="rect">
+            <a:avLst/>
+          </a:prstGeom>
+          <a:noFill/>
+        </p:spPr>
+        <p:txBody>
+          <a:bodyPr wrap="square" rtlCol="0">
+            <a:spAutoFit/>
+          </a:bodyPr>
+          <a:lstStyle/>
+          <a:p>
+            <a:r>
+              <a:rPr lang="de-AT" sz="2800" b="1" dirty="0" err="1">
+                <a:solidFill>
+                  <a:schemeClr val="bg1"/>
+                </a:solidFill>
+              </a:rPr>
+              <a:t>TailwindCSS</a:t>
+            </a:r>
+            <a:endParaRPr lang="de-AT" sz="2800" b="1" dirty="0">
+              <a:solidFill>
+                <a:schemeClr val="bg1"/>
+              </a:solidFill>
+            </a:endParaRPr>
+          </a:p>
+        </p:txBody>
+      </p:sp>
+      <p:sp>
+        <p:nvSpPr>
+          <p:cNvPr id="10" name="Textfeld 9">
+            <a:extLst>
+              <a:ext uri="{FF2B5EF4-FFF2-40B4-BE49-F238E27FC236}">
+                <a16:creationId xmlns:a16="http://schemas.microsoft.com/office/drawing/2014/main" id="{021C6229-40C4-6020-6CD6-5780C6690F3C}"/>
+              </a:ext>
+            </a:extLst>
+          </p:cNvPr>
+          <p:cNvSpPr txBox="1"/>
+          <p:nvPr/>
+        </p:nvSpPr>
+        <p:spPr>
+          <a:xfrm>
+            <a:off x="6917170" y="3519268"/>
+            <a:ext cx="955594" cy="523220"/>
+          </a:xfrm>
+          <a:prstGeom prst="rect">
+            <a:avLst/>
+          </a:prstGeom>
+          <a:noFill/>
+        </p:spPr>
+        <p:txBody>
+          <a:bodyPr wrap="square" rtlCol="0">
+            <a:spAutoFit/>
+          </a:bodyPr>
+          <a:lstStyle/>
+          <a:p>
+            <a:r>
+              <a:rPr lang="de-AT" sz="2800" b="1" dirty="0">
+                <a:solidFill>
+                  <a:schemeClr val="bg1"/>
+                </a:solidFill>
+              </a:rPr>
+              <a:t>Vite</a:t>
+            </a:r>
+          </a:p>
+        </p:txBody>
+      </p:sp>
+      <p:sp>
+        <p:nvSpPr>
+          <p:cNvPr id="15" name="Textfeld 14">
+            <a:extLst>
+              <a:ext uri="{FF2B5EF4-FFF2-40B4-BE49-F238E27FC236}">
+                <a16:creationId xmlns:a16="http://schemas.microsoft.com/office/drawing/2014/main" id="{066BAD0E-9FFC-53F5-9425-72546721FEB1}"/>
+              </a:ext>
+            </a:extLst>
+          </p:cNvPr>
+          <p:cNvSpPr txBox="1"/>
+          <p:nvPr/>
+        </p:nvSpPr>
+        <p:spPr>
+          <a:xfrm>
+            <a:off x="858665" y="2667808"/>
+            <a:ext cx="1249120" cy="523220"/>
+          </a:xfrm>
+          <a:prstGeom prst="rect">
+            <a:avLst/>
+          </a:prstGeom>
+          <a:noFill/>
+        </p:spPr>
+        <p:txBody>
+          <a:bodyPr wrap="square" rtlCol="0">
+            <a:spAutoFit/>
+          </a:bodyPr>
+          <a:lstStyle/>
+          <a:p>
+            <a:r>
+              <a:rPr lang="de-AT" sz="2800" b="1" dirty="0">
+                <a:solidFill>
+                  <a:schemeClr val="bg1"/>
+                </a:solidFill>
+              </a:rPr>
+              <a:t>React</a:t>
+            </a:r>
+          </a:p>
+        </p:txBody>
+      </p:sp>
+      <p:pic>
+        <p:nvPicPr>
+          <p:cNvPr id="1028" name="Picture 4" descr="React.js - Wikipedia">
+            <a:extLst>
+              <a:ext uri="{FF2B5EF4-FFF2-40B4-BE49-F238E27FC236}">
+                <a16:creationId xmlns:a16="http://schemas.microsoft.com/office/drawing/2014/main" id="{CE5FB5DE-70C6-140B-82A5-7D70BE845BF1}"/>
+              </a:ext>
+            </a:extLst>
+          </p:cNvPr>
+          <p:cNvPicPr>
+            <a:picLocks noChangeAspect="1" noChangeArrowheads="1"/>
+          </p:cNvPicPr>
+          <p:nvPr/>
+        </p:nvPicPr>
+        <p:blipFill>
+          <a:blip r:embed="rId5">
+            <a:extLst>
+              <a:ext uri="{28A0092B-C50C-407E-A947-70E740481C1C}">
+                <a14:useLocalDpi xmlns:a14="http://schemas.microsoft.com/office/drawing/2010/main" val="0"/>
+              </a:ext>
+            </a:extLst>
+          </a:blip>
+          <a:srcRect/>
+          <a:stretch>
+            <a:fillRect/>
+          </a:stretch>
+        </p:blipFill>
+        <p:spPr bwMode="auto">
+          <a:xfrm>
+            <a:off x="3752546" y="2159996"/>
+            <a:ext cx="2023332" cy="1869559"/>
+          </a:xfrm>
+          <a:prstGeom prst="rect">
+            <a:avLst/>
+          </a:prstGeom>
+          <a:noFill/>
+          <a:extLst>
+            <a:ext uri="{909E8E84-426E-40DD-AFC4-6F175D3DCCD1}">
+              <a14:hiddenFill xmlns:a14="http://schemas.microsoft.com/office/drawing/2010/main">
+                <a:solidFill>
+                  <a:srgbClr val="FFFFFF"/>
+                </a:solidFill>
+              </a14:hiddenFill>
+            </a:ext>
+          </a:extLst>
+        </p:spPr>
+      </p:pic>
+      <p:pic>
+        <p:nvPicPr>
+          <p:cNvPr id="1030" name="Picture 6" descr="Vite (software) - Wikipedia">
+            <a:extLst>
+              <a:ext uri="{FF2B5EF4-FFF2-40B4-BE49-F238E27FC236}">
+                <a16:creationId xmlns:a16="http://schemas.microsoft.com/office/drawing/2014/main" id="{5F85C568-32AA-FD0C-D8A8-4F99793A7400}"/>
+              </a:ext>
+            </a:extLst>
+          </p:cNvPr>
+          <p:cNvPicPr>
+            <a:picLocks noChangeAspect="1" noChangeArrowheads="1"/>
+          </p:cNvPicPr>
+          <p:nvPr/>
+        </p:nvPicPr>
+        <p:blipFill>
+          <a:blip r:embed="rId6" cstate="print">
+            <a:extLst>
+              <a:ext uri="{28A0092B-C50C-407E-A947-70E740481C1C}">
+                <a14:useLocalDpi xmlns:a14="http://schemas.microsoft.com/office/drawing/2010/main" val="0"/>
+              </a:ext>
+            </a:extLst>
+          </a:blip>
+          <a:srcRect/>
+          <a:stretch>
+            <a:fillRect/>
+          </a:stretch>
+        </p:blipFill>
+        <p:spPr bwMode="auto">
+          <a:xfrm>
+            <a:off x="6416124" y="1793689"/>
+            <a:ext cx="1773173" cy="1748237"/>
+          </a:xfrm>
+          <a:prstGeom prst="rect">
+            <a:avLst/>
+          </a:prstGeom>
+          <a:noFill/>
+          <a:extLst>
+            <a:ext uri="{909E8E84-426E-40DD-AFC4-6F175D3DCCD1}">
+              <a14:hiddenFill xmlns:a14="http://schemas.microsoft.com/office/drawing/2010/main">
+                <a:solidFill>
+                  <a:srgbClr val="FFFFFF"/>
+                </a:solidFill>
+              </a14:hiddenFill>
+            </a:ext>
+          </a:extLst>
+        </p:spPr>
+      </p:pic>
     </p:spTree>
     <p:extLst>
       <p:ext uri="{BB962C8B-B14F-4D97-AF65-F5344CB8AC3E}">
-        <p14:creationId xmlns:p14="http://schemas.microsoft.com/office/powerpoint/2010/main" val="1080840057"/>
+        <p14:creationId xmlns:p14="http://schemas.microsoft.com/office/powerpoint/2010/main" val="305766750"/>
       </p:ext>
     </p:extLst>
   </p:cSld>
   <p:clrMapOvr>
     <a:masterClrMapping/>
   </p:clrMapOvr>
+  <mc:AlternateContent xmlns:mc="http://schemas.openxmlformats.org/markup-compatibility/2006" xmlns:p159="http://schemas.microsoft.com/office/powerpoint/2015/09/main">
+    <mc:Choice Requires="p159">
+      <p:transition xmlns:p14="http://schemas.microsoft.com/office/powerpoint/2010/main" spd="slow" p14:dur="2000">
+        <p159:morph option="byObject"/>
+      </p:transition>
+    </mc:Choice>
+    <mc:Fallback xmlns="">
+      <p:transition spd="slow">
+        <p:fade/>
+      </p:transition>
+    </mc:Fallback>
+  </mc:AlternateContent>
 </p:sld>
 </file>
 
@@ -6201,7 +7193,7 @@
           <p:cNvPr id="2" name="Titel 1">
             <a:extLst>
               <a:ext uri="{FF2B5EF4-FFF2-40B4-BE49-F238E27FC236}">
-                <a16:creationId xmlns:a16="http://schemas.microsoft.com/office/drawing/2014/main" id="{792DCE68-0D3F-8C2C-0D12-EEB46A71510A}"/>
+                <a16:creationId xmlns:a16="http://schemas.microsoft.com/office/drawing/2014/main" id="{B3BD9464-682A-23C5-CE6C-FA5AB0D0ED64}"/>
               </a:ext>
             </a:extLst>
           </p:cNvPr>
@@ -6219,17 +7211,9 @@
           <a:p>
             <a:r>
               <a:rPr lang="de-DE" dirty="0"/>
-              <a:t>PM </a:t>
-            </a:r>
-            <a:r>
-              <a:rPr lang="de-AT" noProof="0" dirty="0"/>
-              <a:t>–</a:t>
-            </a:r>
-            <a:r>
-              <a:rPr lang="de-DE" dirty="0"/>
-              <a:t> Meilensteine</a:t>
-            </a:r>
-            <a:endParaRPr lang="en-GB" dirty="0"/>
+              <a:t>TBA</a:t>
+            </a:r>
+            <a:endParaRPr lang="de-AT" dirty="0"/>
           </a:p>
         </p:txBody>
       </p:sp>
@@ -6238,7 +7222,7 @@
           <p:cNvPr id="3" name="Inhaltsplatzhalter 2">
             <a:extLst>
               <a:ext uri="{FF2B5EF4-FFF2-40B4-BE49-F238E27FC236}">
-                <a16:creationId xmlns:a16="http://schemas.microsoft.com/office/drawing/2014/main" id="{B837814D-07B7-2CD5-114B-36749EC8AC43}"/>
+                <a16:creationId xmlns:a16="http://schemas.microsoft.com/office/drawing/2014/main" id="{692BE015-232E-5112-AE99-8960271D3530}"/>
               </a:ext>
             </a:extLst>
           </p:cNvPr>
@@ -6251,113 +7235,14 @@
         </p:nvSpPr>
         <p:spPr/>
         <p:txBody>
-          <a:bodyPr>
-            <a:normAutofit lnSpcReduction="10000"/>
-          </a:bodyPr>
-          <a:lstStyle/>
-          <a:p>
-            <a:r>
-              <a:rPr lang="de-DE" sz="3200" dirty="0"/>
-              <a:t>2024-11-30: (</a:t>
-            </a:r>
-            <a:r>
-              <a:rPr lang="de-DE" sz="3200" dirty="0" err="1"/>
-              <a:t>Directed</a:t>
-            </a:r>
-            <a:r>
-              <a:rPr lang="de-DE" sz="3200" dirty="0"/>
-              <a:t> </a:t>
-            </a:r>
-            <a:r>
-              <a:rPr lang="de-DE" sz="3200" dirty="0" err="1"/>
-              <a:t>Draggable</a:t>
-            </a:r>
-            <a:r>
-              <a:rPr lang="de-DE" sz="3200" dirty="0"/>
-              <a:t>) Graph Visualisierung</a:t>
-            </a:r>
-          </a:p>
-          <a:p>
-            <a:pPr lvl="1">
-              <a:buFont typeface="Arial" panose="020B0604020202020204" pitchFamily="34" charset="0"/>
-              <a:buChar char="•"/>
-            </a:pPr>
-            <a:r>
-              <a:rPr lang="de-DE" sz="2800" dirty="0"/>
-              <a:t>Container Entfernungen zu anderen visualisieren</a:t>
-            </a:r>
-          </a:p>
-          <a:p>
-            <a:pPr lvl="1">
-              <a:buFont typeface="Arial" panose="020B0604020202020204" pitchFamily="34" charset="0"/>
-              <a:buChar char="•"/>
-            </a:pPr>
-            <a:r>
-              <a:rPr lang="de-DE" sz="2800" dirty="0"/>
-              <a:t>Bewegbare Knoten</a:t>
-            </a:r>
-          </a:p>
-          <a:p>
-            <a:r>
-              <a:rPr lang="de-DE" sz="3200" dirty="0"/>
-              <a:t>2025-01-31: Webanwendung funktionell</a:t>
-            </a:r>
-          </a:p>
-          <a:p>
-            <a:pPr lvl="1">
-              <a:buFont typeface="Arial" panose="020B0604020202020204" pitchFamily="34" charset="0"/>
-              <a:buChar char="•"/>
-            </a:pPr>
-            <a:r>
-              <a:rPr lang="de-DE" sz="2800" dirty="0"/>
-              <a:t>Datenabfrage möglich</a:t>
-            </a:r>
-          </a:p>
-          <a:p>
-            <a:pPr lvl="1">
-              <a:buFont typeface="Arial" panose="020B0604020202020204" pitchFamily="34" charset="0"/>
-              <a:buChar char="•"/>
-            </a:pPr>
-            <a:r>
-              <a:rPr lang="de-DE" sz="2800" dirty="0"/>
-              <a:t>Ansprechende GUI</a:t>
-            </a:r>
-          </a:p>
-          <a:p>
-            <a:r>
-              <a:rPr lang="de-DE" sz="3200" dirty="0"/>
-              <a:t>2025-03-07: Finale Abgabe der DA</a:t>
-            </a:r>
-          </a:p>
-          <a:p>
-            <a:pPr lvl="1">
-              <a:buFont typeface="Arial" panose="020B0604020202020204" pitchFamily="34" charset="0"/>
-              <a:buChar char="•"/>
-            </a:pPr>
-            <a:r>
-              <a:rPr lang="de-DE" sz="2800" dirty="0"/>
-              <a:t>Korrektur gelesen</a:t>
-            </a:r>
-          </a:p>
-          <a:p>
-            <a:pPr lvl="1">
-              <a:buFont typeface="Arial" panose="020B0604020202020204" pitchFamily="34" charset="0"/>
-              <a:buChar char="•"/>
-            </a:pPr>
-            <a:r>
-              <a:rPr lang="de-DE" sz="2800" dirty="0"/>
-              <a:t>Alle drei Subthemen fertig</a:t>
-            </a:r>
-          </a:p>
-          <a:p>
-            <a:pPr lvl="1">
-              <a:buFont typeface="Arial" panose="020B0604020202020204" pitchFamily="34" charset="0"/>
-              <a:buChar char="•"/>
-            </a:pPr>
-            <a:r>
-              <a:rPr lang="de-DE" sz="2800" dirty="0"/>
-              <a:t>DA eingereicht</a:t>
-            </a:r>
+          <a:bodyPr/>
+          <a:lstStyle/>
+          <a:p>
+            <a:r>
+              <a:rPr lang="de-DE"/>
+              <a:t>TBA</a:t>
+            </a:r>
+            <a:endParaRPr lang="de-AT" dirty="0"/>
           </a:p>
         </p:txBody>
       </p:sp>
@@ -6366,7 +7251,7 @@
           <p:cNvPr id="4" name="Fußzeilenplatzhalter 3">
             <a:extLst>
               <a:ext uri="{FF2B5EF4-FFF2-40B4-BE49-F238E27FC236}">
-                <a16:creationId xmlns:a16="http://schemas.microsoft.com/office/drawing/2014/main" id="{99A8227C-DF98-8867-4DC3-48318CD78C6E}"/>
+                <a16:creationId xmlns:a16="http://schemas.microsoft.com/office/drawing/2014/main" id="{833309DA-D1CF-FE60-7DD9-C5CF74C1480D}"/>
               </a:ext>
             </a:extLst>
           </p:cNvPr>
@@ -6383,10 +7268,9 @@
           <a:lstStyle/>
           <a:p>
             <a:r>
-              <a:rPr lang="de-AT"/>
-              <a:t>CONTRUDE Schrempf</a:t>
-            </a:r>
-            <a:endParaRPr lang="de-AT" dirty="0"/>
+              <a:rPr lang="de-AT" dirty="0"/>
+              <a:t>CONTRUDE Gekle</a:t>
+            </a:r>
           </a:p>
         </p:txBody>
       </p:sp>
@@ -6395,7 +7279,7 @@
           <p:cNvPr id="5" name="Foliennummernplatzhalter 4">
             <a:extLst>
               <a:ext uri="{FF2B5EF4-FFF2-40B4-BE49-F238E27FC236}">
-                <a16:creationId xmlns:a16="http://schemas.microsoft.com/office/drawing/2014/main" id="{B275833A-3DE0-18E2-4BDF-A4E7798E9AB6}"/>
+                <a16:creationId xmlns:a16="http://schemas.microsoft.com/office/drawing/2014/main" id="{2D0FD304-589F-8B5A-A859-ACE6314B7F6B}"/>
               </a:ext>
             </a:extLst>
           </p:cNvPr>
@@ -6423,7 +7307,7 @@
     </p:spTree>
     <p:extLst>
       <p:ext uri="{BB962C8B-B14F-4D97-AF65-F5344CB8AC3E}">
-        <p14:creationId xmlns:p14="http://schemas.microsoft.com/office/powerpoint/2010/main" val="2908451006"/>
+        <p14:creationId xmlns:p14="http://schemas.microsoft.com/office/powerpoint/2010/main" val="3215889483"/>
       </p:ext>
     </p:extLst>
   </p:cSld>
@@ -6590,18 +7474,18 @@
       </p:grpSpPr>
       <p:sp>
         <p:nvSpPr>
-          <p:cNvPr id="2" name="Titel 1">
-            <a:extLst>
-              <a:ext uri="{FF2B5EF4-FFF2-40B4-BE49-F238E27FC236}">
-                <a16:creationId xmlns:a16="http://schemas.microsoft.com/office/drawing/2014/main" id="{0352F495-BAD0-3200-6FE9-D6D86085AC9B}"/>
-              </a:ext>
-            </a:extLst>
-          </p:cNvPr>
-          <p:cNvSpPr>
-            <a:spLocks noGrp="1"/>
-          </p:cNvSpPr>
-          <p:nvPr>
-            <p:ph type="title"/>
+          <p:cNvPr id="4" name="Fußzeilenplatzhalter 3">
+            <a:extLst>
+              <a:ext uri="{FF2B5EF4-FFF2-40B4-BE49-F238E27FC236}">
+                <a16:creationId xmlns:a16="http://schemas.microsoft.com/office/drawing/2014/main" id="{B3CE102D-CC78-4BE1-BDB4-67D0F8D57C56}"/>
+              </a:ext>
+            </a:extLst>
+          </p:cNvPr>
+          <p:cNvSpPr>
+            <a:spLocks noGrp="1"/>
+          </p:cNvSpPr>
+          <p:nvPr>
+            <p:ph type="ftr" sz="quarter" idx="11"/>
           </p:nvPr>
         </p:nvSpPr>
         <p:spPr/>
@@ -6610,107 +7494,9 @@
           <a:lstStyle/>
           <a:p>
             <a:r>
-              <a:rPr lang="de-DE" dirty="0"/>
-              <a:t>Literatur</a:t>
-            </a:r>
-            <a:endParaRPr lang="en-GB" dirty="0"/>
-          </a:p>
-        </p:txBody>
-      </p:sp>
-      <p:sp>
-        <p:nvSpPr>
-          <p:cNvPr id="3" name="Inhaltsplatzhalter 2">
-            <a:extLst>
-              <a:ext uri="{FF2B5EF4-FFF2-40B4-BE49-F238E27FC236}">
-                <a16:creationId xmlns:a16="http://schemas.microsoft.com/office/drawing/2014/main" id="{2ECCEE14-815E-B183-E17D-8CF5C1206112}"/>
-              </a:ext>
-            </a:extLst>
-          </p:cNvPr>
-          <p:cNvSpPr>
-            <a:spLocks noGrp="1"/>
-          </p:cNvSpPr>
-          <p:nvPr>
-            <p:ph idx="1"/>
-          </p:nvPr>
-        </p:nvSpPr>
-        <p:spPr/>
-        <p:txBody>
-          <a:bodyPr/>
-          <a:lstStyle/>
-          <a:p>
-            <a:r>
-              <a:rPr lang="en-GB" b="0" i="0" dirty="0">
-                <a:effectLst/>
-                <a:latin typeface="Whitney"/>
-              </a:rPr>
-              <a:t>O’Reilly Media – </a:t>
-            </a:r>
-            <a:r>
-              <a:rPr lang="de-DE" b="0" i="0" dirty="0">
-                <a:effectLst/>
-                <a:latin typeface="Whitney"/>
-              </a:rPr>
-              <a:t>R</a:t>
-            </a:r>
-            <a:r>
-              <a:rPr lang="de-DE" dirty="0"/>
-              <a:t>EST API Design </a:t>
-            </a:r>
-            <a:r>
-              <a:rPr lang="de-DE" dirty="0" err="1"/>
-              <a:t>Rulebook</a:t>
-            </a:r>
-            <a:endParaRPr lang="de-DE" dirty="0"/>
-          </a:p>
-          <a:p>
-            <a:r>
-              <a:rPr lang="de-DE" dirty="0">
-                <a:solidFill>
-                  <a:srgbClr val="002021"/>
-                </a:solidFill>
-                <a:highlight>
-                  <a:srgbClr val="FFFFFF"/>
-                </a:highlight>
-                <a:latin typeface="Google Sans"/>
-              </a:rPr>
-              <a:t>ChatGPT-Abfragen</a:t>
-            </a:r>
-            <a:endParaRPr lang="en-GB" b="0" i="0" dirty="0">
-              <a:effectLst/>
-              <a:latin typeface="Whitney"/>
-            </a:endParaRPr>
-          </a:p>
-          <a:p>
-            <a:endParaRPr lang="en-GB" dirty="0"/>
-          </a:p>
-        </p:txBody>
-      </p:sp>
-      <p:sp>
-        <p:nvSpPr>
-          <p:cNvPr id="4" name="Fußzeilenplatzhalter 3">
-            <a:extLst>
-              <a:ext uri="{FF2B5EF4-FFF2-40B4-BE49-F238E27FC236}">
-                <a16:creationId xmlns:a16="http://schemas.microsoft.com/office/drawing/2014/main" id="{81E70FB5-6AEA-CB48-FBE9-FA154C08D666}"/>
-              </a:ext>
-            </a:extLst>
-          </p:cNvPr>
-          <p:cNvSpPr>
-            <a:spLocks noGrp="1"/>
-          </p:cNvSpPr>
-          <p:nvPr>
-            <p:ph type="ftr" sz="quarter" idx="11"/>
-          </p:nvPr>
-        </p:nvSpPr>
-        <p:spPr/>
-        <p:txBody>
-          <a:bodyPr/>
-          <a:lstStyle/>
-          <a:p>
-            <a:r>
-              <a:rPr lang="de-AT"/>
+              <a:rPr lang="de-AT" dirty="0"/>
               <a:t>CONTRUDE Schrempf</a:t>
             </a:r>
-            <a:endParaRPr lang="de-AT" dirty="0"/>
           </a:p>
         </p:txBody>
       </p:sp>
@@ -6719,7 +7505,7 @@
           <p:cNvPr id="5" name="Foliennummernplatzhalter 4">
             <a:extLst>
               <a:ext uri="{FF2B5EF4-FFF2-40B4-BE49-F238E27FC236}">
-                <a16:creationId xmlns:a16="http://schemas.microsoft.com/office/drawing/2014/main" id="{FF5BC961-EB07-901E-E92D-797D766158DE}"/>
+                <a16:creationId xmlns:a16="http://schemas.microsoft.com/office/drawing/2014/main" id="{F8884CDD-B6BF-5A0E-36BE-3463B7C68BE9}"/>
               </a:ext>
             </a:extLst>
           </p:cNvPr>
@@ -6744,10 +7530,54 @@
           </a:p>
         </p:txBody>
       </p:sp>
+      <p:sp>
+        <p:nvSpPr>
+          <p:cNvPr id="6" name="Textfeld 5">
+            <a:extLst>
+              <a:ext uri="{FF2B5EF4-FFF2-40B4-BE49-F238E27FC236}">
+                <a16:creationId xmlns:a16="http://schemas.microsoft.com/office/drawing/2014/main" id="{44B73665-3D46-BD7A-F384-EC7A37F3E3EA}"/>
+              </a:ext>
+            </a:extLst>
+          </p:cNvPr>
+          <p:cNvSpPr txBox="1"/>
+          <p:nvPr/>
+        </p:nvSpPr>
+        <p:spPr>
+          <a:xfrm>
+            <a:off x="800434" y="2882623"/>
+            <a:ext cx="6075907" cy="1200329"/>
+          </a:xfrm>
+          <a:prstGeom prst="rect">
+            <a:avLst/>
+          </a:prstGeom>
+          <a:noFill/>
+        </p:spPr>
+        <p:txBody>
+          <a:bodyPr wrap="square" rtlCol="0">
+            <a:spAutoFit/>
+          </a:bodyPr>
+          <a:lstStyle/>
+          <a:p>
+            <a:r>
+              <a:rPr lang="de-DE" sz="7200" dirty="0">
+                <a:solidFill>
+                  <a:srgbClr val="9BBB59"/>
+                </a:solidFill>
+              </a:rPr>
+              <a:t>Zusatz</a:t>
+            </a:r>
+            <a:endParaRPr lang="en-US" sz="6600" dirty="0">
+              <a:solidFill>
+                <a:srgbClr val="9BBB59"/>
+              </a:solidFill>
+            </a:endParaRPr>
+          </a:p>
+        </p:txBody>
+      </p:sp>
     </p:spTree>
     <p:extLst>
       <p:ext uri="{BB962C8B-B14F-4D97-AF65-F5344CB8AC3E}">
-        <p14:creationId xmlns:p14="http://schemas.microsoft.com/office/powerpoint/2010/main" val="2260846747"/>
+        <p14:creationId xmlns:p14="http://schemas.microsoft.com/office/powerpoint/2010/main" val="1846633128"/>
       </p:ext>
     </p:extLst>
   </p:cSld>
@@ -6776,10 +7606,138 @@
       </p:grpSpPr>
       <p:sp>
         <p:nvSpPr>
+          <p:cNvPr id="2" name="Titel 1">
+            <a:extLst>
+              <a:ext uri="{FF2B5EF4-FFF2-40B4-BE49-F238E27FC236}">
+                <a16:creationId xmlns:a16="http://schemas.microsoft.com/office/drawing/2014/main" id="{C07E26C7-4C51-12BD-B6ED-59ED0456DB3A}"/>
+              </a:ext>
+            </a:extLst>
+          </p:cNvPr>
+          <p:cNvSpPr>
+            <a:spLocks noGrp="1"/>
+          </p:cNvSpPr>
+          <p:nvPr>
+            <p:ph type="title"/>
+          </p:nvPr>
+        </p:nvSpPr>
+        <p:spPr/>
+        <p:txBody>
+          <a:bodyPr/>
+          <a:lstStyle/>
+          <a:p>
+            <a:r>
+              <a:rPr lang="de-DE" dirty="0"/>
+              <a:t>PM </a:t>
+            </a:r>
+            <a:r>
+              <a:rPr lang="de-AT" noProof="0" dirty="0"/>
+              <a:t>–</a:t>
+            </a:r>
+            <a:r>
+              <a:rPr lang="de-DE" dirty="0"/>
+              <a:t> Meilensteine</a:t>
+            </a:r>
+            <a:endParaRPr lang="en-GB" dirty="0"/>
+          </a:p>
+        </p:txBody>
+      </p:sp>
+      <p:sp>
+        <p:nvSpPr>
+          <p:cNvPr id="3" name="Inhaltsplatzhalter 2">
+            <a:extLst>
+              <a:ext uri="{FF2B5EF4-FFF2-40B4-BE49-F238E27FC236}">
+                <a16:creationId xmlns:a16="http://schemas.microsoft.com/office/drawing/2014/main" id="{2298BAD1-D334-3EB5-39F2-5148AD4E9548}"/>
+              </a:ext>
+            </a:extLst>
+          </p:cNvPr>
+          <p:cNvSpPr>
+            <a:spLocks noGrp="1"/>
+          </p:cNvSpPr>
+          <p:nvPr>
+            <p:ph idx="1"/>
+          </p:nvPr>
+        </p:nvSpPr>
+        <p:spPr/>
+        <p:txBody>
+          <a:bodyPr>
+            <a:normAutofit lnSpcReduction="10000"/>
+          </a:bodyPr>
+          <a:lstStyle/>
+          <a:p>
+            <a:r>
+              <a:rPr lang="de-DE" sz="3200" dirty="0"/>
+              <a:t>2024-02-23: Genehmigung der DA</a:t>
+            </a:r>
+          </a:p>
+          <a:p>
+            <a:pPr lvl="1"/>
+            <a:r>
+              <a:rPr lang="de-DE" sz="2800" dirty="0"/>
+              <a:t>Einreichen des Antrags durch die Schüler</a:t>
+            </a:r>
+          </a:p>
+          <a:p>
+            <a:pPr lvl="1"/>
+            <a:r>
+              <a:rPr lang="de-DE" sz="2800" dirty="0"/>
+              <a:t>DA Dokumentation wurde ausgefüllt und unterschrieben</a:t>
+            </a:r>
+          </a:p>
+          <a:p>
+            <a:r>
+              <a:rPr lang="de-DE" sz="3200" dirty="0"/>
+              <a:t>2024-05-09: Projektplan Grobentwurf fertig</a:t>
+            </a:r>
+          </a:p>
+          <a:p>
+            <a:pPr lvl="1"/>
+            <a:r>
+              <a:rPr lang="de-DE" sz="2800" dirty="0"/>
+              <a:t>Zielsetzung ausgefüllt</a:t>
+            </a:r>
+          </a:p>
+          <a:p>
+            <a:pPr lvl="1"/>
+            <a:r>
+              <a:rPr lang="de-DE" sz="2800" dirty="0"/>
+              <a:t>Projektplan ausgefüllt</a:t>
+            </a:r>
+          </a:p>
+          <a:p>
+            <a:r>
+              <a:rPr lang="de-DE" sz="3200" dirty="0"/>
+              <a:t>2024-06-01: Hardware Komponenten Recherche fertig</a:t>
+            </a:r>
+          </a:p>
+          <a:p>
+            <a:pPr lvl="1"/>
+            <a:r>
+              <a:rPr lang="de-DE" sz="2800" dirty="0"/>
+              <a:t>Bestimmung der Komponenten</a:t>
+            </a:r>
+          </a:p>
+          <a:p>
+            <a:pPr lvl="1"/>
+            <a:r>
+              <a:rPr lang="de-DE" sz="2800" dirty="0"/>
+              <a:t>Preisrechnung</a:t>
+            </a:r>
+          </a:p>
+          <a:p>
+            <a:pPr lvl="1"/>
+            <a:r>
+              <a:rPr lang="de-DE" sz="2800" dirty="0"/>
+              <a:t>Terminrechnung</a:t>
+            </a:r>
+          </a:p>
+        </p:txBody>
+      </p:sp>
+      <p:sp>
+        <p:nvSpPr>
           <p:cNvPr id="4" name="Fußzeilenplatzhalter 3">
             <a:extLst>
               <a:ext uri="{FF2B5EF4-FFF2-40B4-BE49-F238E27FC236}">
-                <a16:creationId xmlns:a16="http://schemas.microsoft.com/office/drawing/2014/main" id="{52323336-2F30-F983-6641-76E2DC2B1605}"/>
+                <a16:creationId xmlns:a16="http://schemas.microsoft.com/office/drawing/2014/main" id="{DA87C74A-4E8C-97BD-B263-9ECDD3FA2390}"/>
               </a:ext>
             </a:extLst>
           </p:cNvPr>
@@ -6796,10 +7754,9 @@
           <a:lstStyle/>
           <a:p>
             <a:r>
-              <a:rPr lang="de-AT"/>
+              <a:rPr lang="de-AT" dirty="0"/>
               <a:t>CONTRUDE Schrempf</a:t>
             </a:r>
-            <a:endParaRPr lang="de-AT" dirty="0"/>
           </a:p>
         </p:txBody>
       </p:sp>
@@ -6808,7 +7765,7 @@
           <p:cNvPr id="5" name="Foliennummernplatzhalter 4">
             <a:extLst>
               <a:ext uri="{FF2B5EF4-FFF2-40B4-BE49-F238E27FC236}">
-                <a16:creationId xmlns:a16="http://schemas.microsoft.com/office/drawing/2014/main" id="{FA793A73-DEA9-6129-2C09-B10028401715}"/>
+                <a16:creationId xmlns:a16="http://schemas.microsoft.com/office/drawing/2014/main" id="{4A1C692A-074F-9345-4CEE-48C0116BFCA0}"/>
               </a:ext>
             </a:extLst>
           </p:cNvPr>
@@ -6833,54 +7790,10 @@
           </a:p>
         </p:txBody>
       </p:sp>
-      <p:sp>
-        <p:nvSpPr>
-          <p:cNvPr id="6" name="Textfeld 5">
-            <a:extLst>
-              <a:ext uri="{FF2B5EF4-FFF2-40B4-BE49-F238E27FC236}">
-                <a16:creationId xmlns:a16="http://schemas.microsoft.com/office/drawing/2014/main" id="{34D7153C-DF57-5578-2AF4-03F4140B1A50}"/>
-              </a:ext>
-            </a:extLst>
-          </p:cNvPr>
-          <p:cNvSpPr txBox="1"/>
-          <p:nvPr/>
-        </p:nvSpPr>
-        <p:spPr>
-          <a:xfrm>
-            <a:off x="800434" y="2882623"/>
-            <a:ext cx="6075907" cy="1200329"/>
-          </a:xfrm>
-          <a:prstGeom prst="rect">
-            <a:avLst/>
-          </a:prstGeom>
-          <a:noFill/>
-        </p:spPr>
-        <p:txBody>
-          <a:bodyPr wrap="square" rtlCol="0">
-            <a:spAutoFit/>
-          </a:bodyPr>
-          <a:lstStyle/>
-          <a:p>
-            <a:r>
-              <a:rPr lang="de-DE" sz="7200" dirty="0">
-                <a:solidFill>
-                  <a:srgbClr val="9BBB59"/>
-                </a:solidFill>
-              </a:rPr>
-              <a:t>Bildquellen</a:t>
-            </a:r>
-            <a:endParaRPr lang="en-US" sz="6600" dirty="0">
-              <a:solidFill>
-                <a:srgbClr val="9BBB59"/>
-              </a:solidFill>
-            </a:endParaRPr>
-          </a:p>
-        </p:txBody>
-      </p:sp>
     </p:spTree>
     <p:extLst>
       <p:ext uri="{BB962C8B-B14F-4D97-AF65-F5344CB8AC3E}">
-        <p14:creationId xmlns:p14="http://schemas.microsoft.com/office/powerpoint/2010/main" val="3986702212"/>
+        <p14:creationId xmlns:p14="http://schemas.microsoft.com/office/powerpoint/2010/main" val="1145892815"/>
       </p:ext>
     </p:extLst>
   </p:cSld>
@@ -6912,7 +7825,7 @@
           <p:cNvPr id="2" name="Titel 1">
             <a:extLst>
               <a:ext uri="{FF2B5EF4-FFF2-40B4-BE49-F238E27FC236}">
-                <a16:creationId xmlns:a16="http://schemas.microsoft.com/office/drawing/2014/main" id="{E9067B21-04AA-B863-1BC5-21EBEE4249A6}"/>
+                <a16:creationId xmlns:a16="http://schemas.microsoft.com/office/drawing/2014/main" id="{2E604182-9A1C-D7E8-6042-EDDB2477F9DA}"/>
               </a:ext>
             </a:extLst>
           </p:cNvPr>
@@ -6929,63 +7842,200 @@
           <a:lstStyle/>
           <a:p>
             <a:r>
+              <a:rPr lang="de-DE" dirty="0"/>
+              <a:t>PM </a:t>
+            </a:r>
+            <a:r>
+              <a:rPr lang="de-AT" noProof="0" dirty="0"/>
+              <a:t>–</a:t>
+            </a:r>
+            <a:r>
+              <a:rPr lang="de-DE" dirty="0"/>
+              <a:t> Meilensteine</a:t>
+            </a:r>
+            <a:endParaRPr lang="en-GB" dirty="0"/>
+          </a:p>
+        </p:txBody>
+      </p:sp>
+      <p:sp>
+        <p:nvSpPr>
+          <p:cNvPr id="3" name="Inhaltsplatzhalter 2">
+            <a:extLst>
+              <a:ext uri="{FF2B5EF4-FFF2-40B4-BE49-F238E27FC236}">
+                <a16:creationId xmlns:a16="http://schemas.microsoft.com/office/drawing/2014/main" id="{46FFA03D-AD87-DE6E-5C59-97B054813CE7}"/>
+              </a:ext>
+            </a:extLst>
+          </p:cNvPr>
+          <p:cNvSpPr>
+            <a:spLocks noGrp="1"/>
+          </p:cNvSpPr>
+          <p:nvPr>
+            <p:ph idx="1"/>
+          </p:nvPr>
+        </p:nvSpPr>
+        <p:spPr/>
+        <p:txBody>
+          <a:bodyPr>
+            <a:normAutofit lnSpcReduction="10000"/>
+          </a:bodyPr>
+          <a:lstStyle/>
+          <a:p>
+            <a:pPr>
+              <a:spcBef>
+                <a:spcPts val="624"/>
+              </a:spcBef>
+              <a:buSzPts val="2600"/>
+            </a:pPr>
+            <a:r>
+              <a:rPr lang="de-DE" sz="3200" dirty="0">
+                <a:solidFill>
+                  <a:srgbClr val="000000"/>
+                </a:solidFill>
+                <a:latin typeface="Calibri" panose="020F0502020204030204" pitchFamily="34" charset="0"/>
+              </a:rPr>
+              <a:t>2024-06-17: Datenbanken fertig</a:t>
+            </a:r>
+            <a:endParaRPr lang="en-GB" sz="3200" dirty="0">
+              <a:solidFill>
+                <a:srgbClr val="000000"/>
+              </a:solidFill>
+              <a:latin typeface="Calibri" panose="020F0502020204030204" pitchFamily="34" charset="0"/>
+            </a:endParaRPr>
+          </a:p>
+          <a:p>
+            <a:pPr lvl="1">
+              <a:spcBef>
+                <a:spcPts val="624"/>
+              </a:spcBef>
+              <a:buSzPts val="2600"/>
+            </a:pPr>
+            <a:r>
+              <a:rPr lang="de-DE" sz="2800" kern="1200" dirty="0">
+                <a:solidFill>
+                  <a:srgbClr val="000000"/>
+                </a:solidFill>
+                <a:effectLst/>
+                <a:latin typeface="Calibri" panose="020F0502020204030204" pitchFamily="34" charset="0"/>
+                <a:ea typeface="+mn-ea"/>
+                <a:cs typeface="+mn-cs"/>
+              </a:rPr>
+              <a:t>Allgemeine Container Informationen</a:t>
+            </a:r>
+            <a:endParaRPr lang="en-GB" sz="2800" dirty="0">
+              <a:effectLst/>
+            </a:endParaRPr>
+          </a:p>
+          <a:p>
+            <a:pPr lvl="1"/>
+            <a:r>
+              <a:rPr lang="de-DE" sz="2800" kern="1200" dirty="0">
+                <a:solidFill>
+                  <a:srgbClr val="000000"/>
+                </a:solidFill>
+                <a:effectLst/>
+                <a:latin typeface="Calibri" panose="020F0502020204030204" pitchFamily="34" charset="0"/>
+                <a:ea typeface="+mn-ea"/>
+                <a:cs typeface="+mn-cs"/>
+              </a:rPr>
+              <a:t>Sensor Daten</a:t>
+            </a:r>
+          </a:p>
+          <a:p>
+            <a:pPr>
+              <a:spcBef>
+                <a:spcPts val="624"/>
+              </a:spcBef>
+              <a:buSzPts val="2600"/>
+            </a:pPr>
+            <a:r>
+              <a:rPr lang="de-DE" sz="3200" dirty="0">
+                <a:solidFill>
+                  <a:srgbClr val="000000"/>
+                </a:solidFill>
+                <a:latin typeface="Calibri" panose="020F0502020204030204" pitchFamily="34" charset="0"/>
+              </a:rPr>
+              <a:t>2024-06-24: Erstpräsentation der DA</a:t>
+            </a:r>
+          </a:p>
+          <a:p>
+            <a:pPr lvl="1"/>
+            <a:r>
+              <a:rPr lang="de-DE" sz="2800" dirty="0"/>
+              <a:t>Fortschritt zusammenfassen</a:t>
+            </a:r>
+          </a:p>
+          <a:p>
+            <a:pPr lvl="1"/>
+            <a:r>
+              <a:rPr lang="de-DE" sz="2800" dirty="0"/>
+              <a:t>Gantt-Diagramm erstellen</a:t>
+            </a:r>
+          </a:p>
+          <a:p>
+            <a:pPr>
+              <a:spcBef>
+                <a:spcPts val="624"/>
+              </a:spcBef>
+              <a:buSzPts val="2600"/>
+            </a:pPr>
+            <a:r>
+              <a:rPr lang="de-DE" sz="3200" dirty="0">
+                <a:solidFill>
+                  <a:srgbClr val="000000"/>
+                </a:solidFill>
+                <a:latin typeface="Calibri" panose="020F0502020204030204" pitchFamily="34" charset="0"/>
+              </a:rPr>
+              <a:t>2024-07-04: Server Architektur fertig</a:t>
+            </a:r>
+          </a:p>
+          <a:p>
+            <a:pPr lvl="1"/>
+            <a:r>
+              <a:rPr lang="de-DE" sz="2800" dirty="0"/>
+              <a:t>Server ist einsatzfähig</a:t>
+            </a:r>
+          </a:p>
+          <a:p>
+            <a:pPr lvl="1"/>
+            <a:r>
+              <a:rPr lang="de-DE" sz="2800" dirty="0"/>
+              <a:t>REST-Schnittstelle</a:t>
+            </a:r>
+          </a:p>
+          <a:p>
+            <a:pPr lvl="1"/>
+            <a:r>
+              <a:rPr lang="de-DE" sz="2800" dirty="0"/>
+              <a:t>Zugriff kann von überall gestattet werden</a:t>
+            </a:r>
+          </a:p>
+        </p:txBody>
+      </p:sp>
+      <p:sp>
+        <p:nvSpPr>
+          <p:cNvPr id="4" name="Fußzeilenplatzhalter 3">
+            <a:extLst>
+              <a:ext uri="{FF2B5EF4-FFF2-40B4-BE49-F238E27FC236}">
+                <a16:creationId xmlns:a16="http://schemas.microsoft.com/office/drawing/2014/main" id="{094214A7-8620-D9B8-3FED-82856E7D3EA2}"/>
+              </a:ext>
+            </a:extLst>
+          </p:cNvPr>
+          <p:cNvSpPr>
+            <a:spLocks noGrp="1"/>
+          </p:cNvSpPr>
+          <p:nvPr>
+            <p:ph type="ftr" sz="quarter" idx="11"/>
+          </p:nvPr>
+        </p:nvSpPr>
+        <p:spPr/>
+        <p:txBody>
+          <a:bodyPr/>
+          <a:lstStyle/>
+          <a:p>
+            <a:r>
               <a:rPr lang="de-AT" dirty="0"/>
-              <a:t>Bildquellen – Kampl</a:t>
-            </a:r>
-          </a:p>
-        </p:txBody>
-      </p:sp>
-      <p:sp>
-        <p:nvSpPr>
-          <p:cNvPr id="3" name="Inhaltsplatzhalter 2">
-            <a:extLst>
-              <a:ext uri="{FF2B5EF4-FFF2-40B4-BE49-F238E27FC236}">
-                <a16:creationId xmlns:a16="http://schemas.microsoft.com/office/drawing/2014/main" id="{CDF320DB-58E5-EDF5-0697-843A43B8D27E}"/>
-              </a:ext>
-            </a:extLst>
-          </p:cNvPr>
-          <p:cNvSpPr>
-            <a:spLocks noGrp="1"/>
-          </p:cNvSpPr>
-          <p:nvPr>
-            <p:ph idx="1"/>
-          </p:nvPr>
-        </p:nvSpPr>
-        <p:spPr/>
-        <p:txBody>
-          <a:bodyPr/>
-          <a:lstStyle/>
-          <a:p>
-            <a:endParaRPr lang="de-AT"/>
-          </a:p>
-        </p:txBody>
-      </p:sp>
-      <p:sp>
-        <p:nvSpPr>
-          <p:cNvPr id="4" name="Fußzeilenplatzhalter 3">
-            <a:extLst>
-              <a:ext uri="{FF2B5EF4-FFF2-40B4-BE49-F238E27FC236}">
-                <a16:creationId xmlns:a16="http://schemas.microsoft.com/office/drawing/2014/main" id="{A3DB105E-8365-A55C-B819-3BC49335B886}"/>
-              </a:ext>
-            </a:extLst>
-          </p:cNvPr>
-          <p:cNvSpPr>
-            <a:spLocks noGrp="1"/>
-          </p:cNvSpPr>
-          <p:nvPr>
-            <p:ph type="ftr" sz="quarter" idx="11"/>
-          </p:nvPr>
-        </p:nvSpPr>
-        <p:spPr/>
-        <p:txBody>
-          <a:bodyPr/>
-          <a:lstStyle/>
-          <a:p>
-            <a:r>
-              <a:rPr lang="de-AT"/>
               <a:t>CONTRUDE Schrempf</a:t>
             </a:r>
-            <a:endParaRPr lang="de-AT" dirty="0"/>
           </a:p>
         </p:txBody>
       </p:sp>
@@ -6994,7 +8044,7 @@
           <p:cNvPr id="5" name="Foliennummernplatzhalter 4">
             <a:extLst>
               <a:ext uri="{FF2B5EF4-FFF2-40B4-BE49-F238E27FC236}">
-                <a16:creationId xmlns:a16="http://schemas.microsoft.com/office/drawing/2014/main" id="{99CB3D7D-C8D2-F222-6263-523FEE1ED3A2}"/>
+                <a16:creationId xmlns:a16="http://schemas.microsoft.com/office/drawing/2014/main" id="{BA839904-ECA7-79B3-C0EF-868137B9341E}"/>
               </a:ext>
             </a:extLst>
           </p:cNvPr>
@@ -7022,7 +8072,7 @@
     </p:spTree>
     <p:extLst>
       <p:ext uri="{BB962C8B-B14F-4D97-AF65-F5344CB8AC3E}">
-        <p14:creationId xmlns:p14="http://schemas.microsoft.com/office/powerpoint/2010/main" val="871335908"/>
+        <p14:creationId xmlns:p14="http://schemas.microsoft.com/office/powerpoint/2010/main" val="4010256110"/>
       </p:ext>
     </p:extLst>
   </p:cSld>
@@ -7054,7 +8104,7 @@
           <p:cNvPr id="2" name="Titel 1">
             <a:extLst>
               <a:ext uri="{FF2B5EF4-FFF2-40B4-BE49-F238E27FC236}">
-                <a16:creationId xmlns:a16="http://schemas.microsoft.com/office/drawing/2014/main" id="{366B6435-9459-7B22-BE3B-A911C6327046}"/>
+                <a16:creationId xmlns:a16="http://schemas.microsoft.com/office/drawing/2014/main" id="{DA508D63-14D9-FB7A-7F5E-DBD26DA9D211}"/>
               </a:ext>
             </a:extLst>
           </p:cNvPr>
@@ -7071,158 +8121,128 @@
           <a:lstStyle/>
           <a:p>
             <a:r>
+              <a:rPr lang="de-DE" dirty="0"/>
+              <a:t>PM </a:t>
+            </a:r>
+            <a:r>
+              <a:rPr lang="de-AT" noProof="0" dirty="0"/>
+              <a:t>–</a:t>
+            </a:r>
+            <a:r>
+              <a:rPr lang="de-DE" dirty="0"/>
+              <a:t> Meilensteine</a:t>
+            </a:r>
+            <a:endParaRPr lang="en-GB" dirty="0"/>
+          </a:p>
+        </p:txBody>
+      </p:sp>
+      <p:sp>
+        <p:nvSpPr>
+          <p:cNvPr id="3" name="Inhaltsplatzhalter 2">
+            <a:extLst>
+              <a:ext uri="{FF2B5EF4-FFF2-40B4-BE49-F238E27FC236}">
+                <a16:creationId xmlns:a16="http://schemas.microsoft.com/office/drawing/2014/main" id="{96C92B48-A3B2-FA7C-965F-05D4644F25AC}"/>
+              </a:ext>
+            </a:extLst>
+          </p:cNvPr>
+          <p:cNvSpPr>
+            <a:spLocks noGrp="1"/>
+          </p:cNvSpPr>
+          <p:nvPr>
+            <p:ph idx="1"/>
+          </p:nvPr>
+        </p:nvSpPr>
+        <p:spPr/>
+        <p:txBody>
+          <a:bodyPr/>
+          <a:lstStyle/>
+          <a:p>
+            <a:r>
+              <a:rPr lang="de-DE" sz="3200" dirty="0"/>
+              <a:t>2024-09-04: Prototyp funktionell</a:t>
+            </a:r>
+          </a:p>
+          <a:p>
+            <a:pPr lvl="1"/>
+            <a:r>
+              <a:rPr lang="de-DE" sz="2800" dirty="0"/>
+              <a:t>Hardware Komponenten gekauft und geliefert</a:t>
+            </a:r>
+          </a:p>
+          <a:p>
+            <a:pPr lvl="1"/>
+            <a:r>
+              <a:rPr lang="de-DE" sz="2800" dirty="0"/>
+              <a:t>Löten der Komponenten</a:t>
+            </a:r>
+          </a:p>
+          <a:p>
+            <a:pPr lvl="1"/>
+            <a:r>
+              <a:rPr lang="de-DE" sz="2800" dirty="0"/>
+              <a:t>Datenübertragung mittels MQTT</a:t>
+            </a:r>
+          </a:p>
+          <a:p>
+            <a:r>
+              <a:rPr lang="de-DE" sz="3200" dirty="0"/>
+              <a:t>2024-10-23: Zweitpräsentation der DA</a:t>
+            </a:r>
+          </a:p>
+          <a:p>
+            <a:pPr lvl="1"/>
+            <a:r>
+              <a:rPr lang="de-DE" sz="2800" dirty="0"/>
+              <a:t>Fortschritt zusammenfassen</a:t>
+            </a:r>
+          </a:p>
+          <a:p>
+            <a:r>
+              <a:rPr lang="de-DE" sz="3200" dirty="0"/>
+              <a:t>2024-11-03: Positionsalgorithmus funktionell</a:t>
+            </a:r>
+          </a:p>
+          <a:p>
+            <a:pPr lvl="1"/>
+            <a:r>
+              <a:rPr lang="de-DE" sz="2800" dirty="0"/>
+              <a:t>Ungefähre Position des Containers</a:t>
+            </a:r>
+          </a:p>
+          <a:p>
+            <a:pPr lvl="1"/>
+            <a:r>
+              <a:rPr lang="de-DE" sz="2800" dirty="0"/>
+              <a:t>Entfernung zu benachbarten Containern ermitteln</a:t>
+            </a:r>
+          </a:p>
+        </p:txBody>
+      </p:sp>
+      <p:sp>
+        <p:nvSpPr>
+          <p:cNvPr id="4" name="Fußzeilenplatzhalter 3">
+            <a:extLst>
+              <a:ext uri="{FF2B5EF4-FFF2-40B4-BE49-F238E27FC236}">
+                <a16:creationId xmlns:a16="http://schemas.microsoft.com/office/drawing/2014/main" id="{D2F6F857-2994-C8CD-13E0-FC23FA81066F}"/>
+              </a:ext>
+            </a:extLst>
+          </p:cNvPr>
+          <p:cNvSpPr>
+            <a:spLocks noGrp="1"/>
+          </p:cNvSpPr>
+          <p:nvPr>
+            <p:ph type="ftr" sz="quarter" idx="11"/>
+          </p:nvPr>
+        </p:nvSpPr>
+        <p:spPr/>
+        <p:txBody>
+          <a:bodyPr/>
+          <a:lstStyle/>
+          <a:p>
+            <a:r>
               <a:rPr lang="de-AT" dirty="0"/>
-              <a:t>Bildquellen – Schrempf</a:t>
-            </a:r>
-          </a:p>
-        </p:txBody>
-      </p:sp>
-      <p:sp>
-        <p:nvSpPr>
-          <p:cNvPr id="3" name="Inhaltsplatzhalter 2">
-            <a:extLst>
-              <a:ext uri="{FF2B5EF4-FFF2-40B4-BE49-F238E27FC236}">
-                <a16:creationId xmlns:a16="http://schemas.microsoft.com/office/drawing/2014/main" id="{E9600844-670E-9E47-9B44-DF36393CB30C}"/>
-              </a:ext>
-            </a:extLst>
-          </p:cNvPr>
-          <p:cNvSpPr>
-            <a:spLocks noGrp="1"/>
-          </p:cNvSpPr>
-          <p:nvPr>
-            <p:ph idx="1"/>
-          </p:nvPr>
-        </p:nvSpPr>
-        <p:spPr/>
-        <p:txBody>
-          <a:bodyPr>
-            <a:normAutofit/>
-          </a:bodyPr>
-          <a:lstStyle/>
-          <a:p>
-            <a:r>
-              <a:rPr lang="de-AT" dirty="0">
-                <a:hlinkClick r:id="rId2"/>
-              </a:rPr>
-              <a:t>https://de.cleanpng.com/png-fsa3fn</a:t>
-            </a:r>
-            <a:r>
-              <a:rPr lang="de-AT" dirty="0"/>
-              <a:t> [18.04.2025]</a:t>
-            </a:r>
-          </a:p>
-          <a:p>
-            <a:r>
-              <a:rPr lang="de-AT" dirty="0">
-                <a:hlinkClick r:id="rId3"/>
-              </a:rPr>
-              <a:t>https://www.sdgwatch.at</a:t>
-            </a:r>
-            <a:r>
-              <a:rPr lang="de-AT" dirty="0"/>
-              <a:t> [18.04.2025]</a:t>
-            </a:r>
-          </a:p>
-          <a:p>
-            <a:r>
-              <a:rPr lang="de-AT" dirty="0">
-                <a:hlinkClick r:id="rId4"/>
-              </a:rPr>
-              <a:t>https://thenounproject.com/icon/database-7670737</a:t>
-            </a:r>
-            <a:r>
-              <a:rPr lang="de-AT" dirty="0"/>
-              <a:t> [18.04.2025]</a:t>
-            </a:r>
-          </a:p>
-          <a:p>
-            <a:r>
-              <a:rPr lang="de-AT" dirty="0">
-                <a:hlinkClick r:id="rId5"/>
-              </a:rPr>
-              <a:t>https://www.svgrepo.com/svg/353829/grafana</a:t>
-            </a:r>
-            <a:r>
-              <a:rPr lang="de-AT" dirty="0"/>
-              <a:t> [18.04.2025]</a:t>
-            </a:r>
-          </a:p>
-          <a:p>
-            <a:r>
-              <a:rPr lang="de-AT" dirty="0">
-                <a:hlinkClick r:id="rId6"/>
-              </a:rPr>
-              <a:t>https://techicons.dev/icons/docker</a:t>
-            </a:r>
-            <a:r>
-              <a:rPr lang="de-AT" dirty="0"/>
-              <a:t> [18.04.2025]</a:t>
-            </a:r>
-          </a:p>
-          <a:p>
-            <a:r>
-              <a:rPr lang="de-AT" dirty="0">
-                <a:hlinkClick r:id="rId7"/>
-              </a:rPr>
-              <a:t>https://de.wikipedia.org/wiki/Datei:Octicons-mark-github.svg</a:t>
-            </a:r>
-            <a:r>
-              <a:rPr lang="de-AT" dirty="0"/>
-              <a:t> [18.04.2025]</a:t>
-            </a:r>
-          </a:p>
-          <a:p>
-            <a:r>
-              <a:rPr lang="de-AT" dirty="0">
-                <a:hlinkClick r:id="rId8"/>
-              </a:rPr>
-              <a:t>https://seeklogo.com/vector-logo/273749/node-js</a:t>
-            </a:r>
-            <a:r>
-              <a:rPr lang="de-AT" dirty="0"/>
-              <a:t> [18.04.2025]</a:t>
-            </a:r>
-          </a:p>
-          <a:p>
-            <a:r>
-              <a:rPr lang="de-AT" dirty="0">
-                <a:hlinkClick r:id="rId9"/>
-              </a:rPr>
-              <a:t>https://techicons.dev/icons/traefikproxy</a:t>
-            </a:r>
-            <a:r>
-              <a:rPr lang="de-AT" dirty="0"/>
-              <a:t> [18.04.2025]</a:t>
-            </a:r>
-          </a:p>
-        </p:txBody>
-      </p:sp>
-      <p:sp>
-        <p:nvSpPr>
-          <p:cNvPr id="4" name="Fußzeilenplatzhalter 3">
-            <a:extLst>
-              <a:ext uri="{FF2B5EF4-FFF2-40B4-BE49-F238E27FC236}">
-                <a16:creationId xmlns:a16="http://schemas.microsoft.com/office/drawing/2014/main" id="{B4711875-828F-B56B-63D6-725C06E6E537}"/>
-              </a:ext>
-            </a:extLst>
-          </p:cNvPr>
-          <p:cNvSpPr>
-            <a:spLocks noGrp="1"/>
-          </p:cNvSpPr>
-          <p:nvPr>
-            <p:ph type="ftr" sz="quarter" idx="11"/>
-          </p:nvPr>
-        </p:nvSpPr>
-        <p:spPr/>
-        <p:txBody>
-          <a:bodyPr/>
-          <a:lstStyle/>
-          <a:p>
-            <a:r>
-              <a:rPr lang="de-AT"/>
               <a:t>CONTRUDE Schrempf</a:t>
             </a:r>
-            <a:endParaRPr lang="de-AT" dirty="0"/>
           </a:p>
         </p:txBody>
       </p:sp>
@@ -7231,7 +8251,7 @@
           <p:cNvPr id="5" name="Foliennummernplatzhalter 4">
             <a:extLst>
               <a:ext uri="{FF2B5EF4-FFF2-40B4-BE49-F238E27FC236}">
-                <a16:creationId xmlns:a16="http://schemas.microsoft.com/office/drawing/2014/main" id="{75D391DE-B06F-7794-3334-D47E7860060B}"/>
+                <a16:creationId xmlns:a16="http://schemas.microsoft.com/office/drawing/2014/main" id="{33BFEAC2-79B3-54F2-A284-E5D35994050E}"/>
               </a:ext>
             </a:extLst>
           </p:cNvPr>
@@ -7259,7 +8279,7 @@
     </p:spTree>
     <p:extLst>
       <p:ext uri="{BB962C8B-B14F-4D97-AF65-F5344CB8AC3E}">
-        <p14:creationId xmlns:p14="http://schemas.microsoft.com/office/powerpoint/2010/main" val="1641466425"/>
+        <p14:creationId xmlns:p14="http://schemas.microsoft.com/office/powerpoint/2010/main" val="1080840057"/>
       </p:ext>
     </p:extLst>
   </p:cSld>
@@ -7291,7 +8311,7 @@
           <p:cNvPr id="2" name="Titel 1">
             <a:extLst>
               <a:ext uri="{FF2B5EF4-FFF2-40B4-BE49-F238E27FC236}">
-                <a16:creationId xmlns:a16="http://schemas.microsoft.com/office/drawing/2014/main" id="{6843AA73-C052-59B9-1B4F-A641524F86B5}"/>
+                <a16:creationId xmlns:a16="http://schemas.microsoft.com/office/drawing/2014/main" id="{792DCE68-0D3F-8C2C-0D12-EEB46A71510A}"/>
               </a:ext>
             </a:extLst>
           </p:cNvPr>
@@ -7308,9 +8328,18 @@
           <a:lstStyle/>
           <a:p>
             <a:r>
-              <a:rPr lang="de-AT" dirty="0"/>
-              <a:t>Gekle</a:t>
-            </a:r>
+              <a:rPr lang="de-DE" dirty="0"/>
+              <a:t>PM </a:t>
+            </a:r>
+            <a:r>
+              <a:rPr lang="de-AT" noProof="0" dirty="0"/>
+              <a:t>–</a:t>
+            </a:r>
+            <a:r>
+              <a:rPr lang="de-DE" dirty="0"/>
+              <a:t> Meilensteine</a:t>
+            </a:r>
+            <a:endParaRPr lang="en-GB" dirty="0"/>
           </a:p>
         </p:txBody>
       </p:sp>
@@ -7319,7 +8348,7 @@
           <p:cNvPr id="3" name="Inhaltsplatzhalter 2">
             <a:extLst>
               <a:ext uri="{FF2B5EF4-FFF2-40B4-BE49-F238E27FC236}">
-                <a16:creationId xmlns:a16="http://schemas.microsoft.com/office/drawing/2014/main" id="{D9249581-8698-82EA-9B49-664D015569FF}"/>
+                <a16:creationId xmlns:a16="http://schemas.microsoft.com/office/drawing/2014/main" id="{B837814D-07B7-2CD5-114B-36749EC8AC43}"/>
               </a:ext>
             </a:extLst>
           </p:cNvPr>
@@ -7332,10 +8361,113 @@
         </p:nvSpPr>
         <p:spPr/>
         <p:txBody>
-          <a:bodyPr/>
-          <a:lstStyle/>
-          <a:p>
-            <a:endParaRPr lang="de-AT"/>
+          <a:bodyPr>
+            <a:normAutofit lnSpcReduction="10000"/>
+          </a:bodyPr>
+          <a:lstStyle/>
+          <a:p>
+            <a:r>
+              <a:rPr lang="de-DE" sz="3200" dirty="0"/>
+              <a:t>2024-11-30: (</a:t>
+            </a:r>
+            <a:r>
+              <a:rPr lang="de-DE" sz="3200" dirty="0" err="1"/>
+              <a:t>Directed</a:t>
+            </a:r>
+            <a:r>
+              <a:rPr lang="de-DE" sz="3200" dirty="0"/>
+              <a:t> </a:t>
+            </a:r>
+            <a:r>
+              <a:rPr lang="de-DE" sz="3200" dirty="0" err="1"/>
+              <a:t>Draggable</a:t>
+            </a:r>
+            <a:r>
+              <a:rPr lang="de-DE" sz="3200" dirty="0"/>
+              <a:t>) Graph Visualisierung</a:t>
+            </a:r>
+          </a:p>
+          <a:p>
+            <a:pPr lvl="1">
+              <a:buFont typeface="Arial" panose="020B0604020202020204" pitchFamily="34" charset="0"/>
+              <a:buChar char="•"/>
+            </a:pPr>
+            <a:r>
+              <a:rPr lang="de-DE" sz="2800" dirty="0"/>
+              <a:t>Container Entfernungen zu anderen visualisieren</a:t>
+            </a:r>
+          </a:p>
+          <a:p>
+            <a:pPr lvl="1">
+              <a:buFont typeface="Arial" panose="020B0604020202020204" pitchFamily="34" charset="0"/>
+              <a:buChar char="•"/>
+            </a:pPr>
+            <a:r>
+              <a:rPr lang="de-DE" sz="2800" dirty="0"/>
+              <a:t>Bewegbare Knoten</a:t>
+            </a:r>
+          </a:p>
+          <a:p>
+            <a:r>
+              <a:rPr lang="de-DE" sz="3200" dirty="0"/>
+              <a:t>2025-01-31: Webanwendung funktionell</a:t>
+            </a:r>
+          </a:p>
+          <a:p>
+            <a:pPr lvl="1">
+              <a:buFont typeface="Arial" panose="020B0604020202020204" pitchFamily="34" charset="0"/>
+              <a:buChar char="•"/>
+            </a:pPr>
+            <a:r>
+              <a:rPr lang="de-DE" sz="2800" dirty="0"/>
+              <a:t>Datenabfrage möglich</a:t>
+            </a:r>
+          </a:p>
+          <a:p>
+            <a:pPr lvl="1">
+              <a:buFont typeface="Arial" panose="020B0604020202020204" pitchFamily="34" charset="0"/>
+              <a:buChar char="•"/>
+            </a:pPr>
+            <a:r>
+              <a:rPr lang="de-DE" sz="2800" dirty="0"/>
+              <a:t>Ansprechende GUI</a:t>
+            </a:r>
+          </a:p>
+          <a:p>
+            <a:r>
+              <a:rPr lang="de-DE" sz="3200" dirty="0"/>
+              <a:t>2025-03-07: Finale Abgabe der DA</a:t>
+            </a:r>
+          </a:p>
+          <a:p>
+            <a:pPr lvl="1">
+              <a:buFont typeface="Arial" panose="020B0604020202020204" pitchFamily="34" charset="0"/>
+              <a:buChar char="•"/>
+            </a:pPr>
+            <a:r>
+              <a:rPr lang="de-DE" sz="2800" dirty="0"/>
+              <a:t>Korrektur gelesen</a:t>
+            </a:r>
+          </a:p>
+          <a:p>
+            <a:pPr lvl="1">
+              <a:buFont typeface="Arial" panose="020B0604020202020204" pitchFamily="34" charset="0"/>
+              <a:buChar char="•"/>
+            </a:pPr>
+            <a:r>
+              <a:rPr lang="de-DE" sz="2800" dirty="0"/>
+              <a:t>Alle drei Subthemen fertig</a:t>
+            </a:r>
+          </a:p>
+          <a:p>
+            <a:pPr lvl="1">
+              <a:buFont typeface="Arial" panose="020B0604020202020204" pitchFamily="34" charset="0"/>
+              <a:buChar char="•"/>
+            </a:pPr>
+            <a:r>
+              <a:rPr lang="de-DE" sz="2800" dirty="0"/>
+              <a:t>DA eingereicht</a:t>
+            </a:r>
           </a:p>
         </p:txBody>
       </p:sp>
@@ -7344,7 +8476,7 @@
           <p:cNvPr id="4" name="Fußzeilenplatzhalter 3">
             <a:extLst>
               <a:ext uri="{FF2B5EF4-FFF2-40B4-BE49-F238E27FC236}">
-                <a16:creationId xmlns:a16="http://schemas.microsoft.com/office/drawing/2014/main" id="{51C5C890-B07D-8FE6-DF7D-DD73167FE310}"/>
+                <a16:creationId xmlns:a16="http://schemas.microsoft.com/office/drawing/2014/main" id="{99A8227C-DF98-8867-4DC3-48318CD78C6E}"/>
               </a:ext>
             </a:extLst>
           </p:cNvPr>
@@ -7373,7 +8505,7 @@
           <p:cNvPr id="5" name="Foliennummernplatzhalter 4">
             <a:extLst>
               <a:ext uri="{FF2B5EF4-FFF2-40B4-BE49-F238E27FC236}">
-                <a16:creationId xmlns:a16="http://schemas.microsoft.com/office/drawing/2014/main" id="{2DF4B31A-7C85-6AED-BB12-8F0C05262B33}"/>
+                <a16:creationId xmlns:a16="http://schemas.microsoft.com/office/drawing/2014/main" id="{B275833A-3DE0-18E2-4BDF-A4E7798E9AB6}"/>
               </a:ext>
             </a:extLst>
           </p:cNvPr>
@@ -7393,6 +8525,909 @@
               <a:rPr lang="de-AT" smtClean="0"/>
               <a:pPr/>
               <a:t>24</a:t>
+            </a:fld>
+            <a:endParaRPr lang="de-AT"/>
+          </a:p>
+        </p:txBody>
+      </p:sp>
+    </p:spTree>
+    <p:extLst>
+      <p:ext uri="{BB962C8B-B14F-4D97-AF65-F5344CB8AC3E}">
+        <p14:creationId xmlns:p14="http://schemas.microsoft.com/office/powerpoint/2010/main" val="2908451006"/>
+      </p:ext>
+    </p:extLst>
+  </p:cSld>
+  <p:clrMapOvr>
+    <a:masterClrMapping/>
+  </p:clrMapOvr>
+</p:sld>
+</file>
+
+<file path=ppt/slides/slide25.xml><?xml version="1.0" encoding="utf-8"?>
+<p:sld xmlns:a="http://schemas.openxmlformats.org/drawingml/2006/main" xmlns:r="http://schemas.openxmlformats.org/officeDocument/2006/relationships" xmlns:p="http://schemas.openxmlformats.org/presentationml/2006/main">
+  <p:cSld>
+    <p:spTree>
+      <p:nvGrpSpPr>
+        <p:cNvPr id="1" name=""/>
+        <p:cNvGrpSpPr/>
+        <p:nvPr/>
+      </p:nvGrpSpPr>
+      <p:grpSpPr>
+        <a:xfrm>
+          <a:off x="0" y="0"/>
+          <a:ext cx="0" cy="0"/>
+          <a:chOff x="0" y="0"/>
+          <a:chExt cx="0" cy="0"/>
+        </a:xfrm>
+      </p:grpSpPr>
+      <p:sp>
+        <p:nvSpPr>
+          <p:cNvPr id="2" name="Titel 1">
+            <a:extLst>
+              <a:ext uri="{FF2B5EF4-FFF2-40B4-BE49-F238E27FC236}">
+                <a16:creationId xmlns:a16="http://schemas.microsoft.com/office/drawing/2014/main" id="{0352F495-BAD0-3200-6FE9-D6D86085AC9B}"/>
+              </a:ext>
+            </a:extLst>
+          </p:cNvPr>
+          <p:cNvSpPr>
+            <a:spLocks noGrp="1"/>
+          </p:cNvSpPr>
+          <p:nvPr>
+            <p:ph type="title"/>
+          </p:nvPr>
+        </p:nvSpPr>
+        <p:spPr/>
+        <p:txBody>
+          <a:bodyPr/>
+          <a:lstStyle/>
+          <a:p>
+            <a:r>
+              <a:rPr lang="de-DE" dirty="0"/>
+              <a:t>Literatur</a:t>
+            </a:r>
+            <a:endParaRPr lang="en-GB" dirty="0"/>
+          </a:p>
+        </p:txBody>
+      </p:sp>
+      <p:sp>
+        <p:nvSpPr>
+          <p:cNvPr id="3" name="Inhaltsplatzhalter 2">
+            <a:extLst>
+              <a:ext uri="{FF2B5EF4-FFF2-40B4-BE49-F238E27FC236}">
+                <a16:creationId xmlns:a16="http://schemas.microsoft.com/office/drawing/2014/main" id="{2ECCEE14-815E-B183-E17D-8CF5C1206112}"/>
+              </a:ext>
+            </a:extLst>
+          </p:cNvPr>
+          <p:cNvSpPr>
+            <a:spLocks noGrp="1"/>
+          </p:cNvSpPr>
+          <p:nvPr>
+            <p:ph idx="1"/>
+          </p:nvPr>
+        </p:nvSpPr>
+        <p:spPr/>
+        <p:txBody>
+          <a:bodyPr/>
+          <a:lstStyle/>
+          <a:p>
+            <a:r>
+              <a:rPr lang="en-GB" b="0" i="0" dirty="0">
+                <a:effectLst/>
+                <a:latin typeface="Whitney"/>
+              </a:rPr>
+              <a:t>O’Reilly Media – </a:t>
+            </a:r>
+            <a:r>
+              <a:rPr lang="de-DE" b="0" i="0" dirty="0">
+                <a:effectLst/>
+                <a:latin typeface="Whitney"/>
+              </a:rPr>
+              <a:t>R</a:t>
+            </a:r>
+            <a:r>
+              <a:rPr lang="de-DE" dirty="0"/>
+              <a:t>EST API Design </a:t>
+            </a:r>
+            <a:r>
+              <a:rPr lang="de-DE" dirty="0" err="1"/>
+              <a:t>Rulebook</a:t>
+            </a:r>
+            <a:endParaRPr lang="de-DE" dirty="0"/>
+          </a:p>
+          <a:p>
+            <a:r>
+              <a:rPr lang="de-DE" dirty="0">
+                <a:solidFill>
+                  <a:srgbClr val="002021"/>
+                </a:solidFill>
+                <a:highlight>
+                  <a:srgbClr val="FFFFFF"/>
+                </a:highlight>
+                <a:latin typeface="Google Sans"/>
+              </a:rPr>
+              <a:t>ChatGPT-Abfragen</a:t>
+            </a:r>
+            <a:endParaRPr lang="en-GB" b="0" i="0" dirty="0">
+              <a:effectLst/>
+              <a:latin typeface="Whitney"/>
+            </a:endParaRPr>
+          </a:p>
+          <a:p>
+            <a:endParaRPr lang="en-GB" dirty="0"/>
+          </a:p>
+        </p:txBody>
+      </p:sp>
+      <p:sp>
+        <p:nvSpPr>
+          <p:cNvPr id="4" name="Fußzeilenplatzhalter 3">
+            <a:extLst>
+              <a:ext uri="{FF2B5EF4-FFF2-40B4-BE49-F238E27FC236}">
+                <a16:creationId xmlns:a16="http://schemas.microsoft.com/office/drawing/2014/main" id="{81E70FB5-6AEA-CB48-FBE9-FA154C08D666}"/>
+              </a:ext>
+            </a:extLst>
+          </p:cNvPr>
+          <p:cNvSpPr>
+            <a:spLocks noGrp="1"/>
+          </p:cNvSpPr>
+          <p:nvPr>
+            <p:ph type="ftr" sz="quarter" idx="11"/>
+          </p:nvPr>
+        </p:nvSpPr>
+        <p:spPr/>
+        <p:txBody>
+          <a:bodyPr/>
+          <a:lstStyle/>
+          <a:p>
+            <a:r>
+              <a:rPr lang="de-AT"/>
+              <a:t>CONTRUDE Schrempf</a:t>
+            </a:r>
+            <a:endParaRPr lang="de-AT" dirty="0"/>
+          </a:p>
+        </p:txBody>
+      </p:sp>
+      <p:sp>
+        <p:nvSpPr>
+          <p:cNvPr id="5" name="Foliennummernplatzhalter 4">
+            <a:extLst>
+              <a:ext uri="{FF2B5EF4-FFF2-40B4-BE49-F238E27FC236}">
+                <a16:creationId xmlns:a16="http://schemas.microsoft.com/office/drawing/2014/main" id="{FF5BC961-EB07-901E-E92D-797D766158DE}"/>
+              </a:ext>
+            </a:extLst>
+          </p:cNvPr>
+          <p:cNvSpPr>
+            <a:spLocks noGrp="1"/>
+          </p:cNvSpPr>
+          <p:nvPr>
+            <p:ph type="sldNum" sz="quarter" idx="12"/>
+          </p:nvPr>
+        </p:nvSpPr>
+        <p:spPr/>
+        <p:txBody>
+          <a:bodyPr/>
+          <a:lstStyle/>
+          <a:p>
+            <a:fld id="{7DCD6803-3BAA-44F6-A698-23D950C9713B}" type="slidenum">
+              <a:rPr lang="de-AT" smtClean="0"/>
+              <a:pPr/>
+              <a:t>25</a:t>
+            </a:fld>
+            <a:endParaRPr lang="de-AT"/>
+          </a:p>
+        </p:txBody>
+      </p:sp>
+    </p:spTree>
+    <p:extLst>
+      <p:ext uri="{BB962C8B-B14F-4D97-AF65-F5344CB8AC3E}">
+        <p14:creationId xmlns:p14="http://schemas.microsoft.com/office/powerpoint/2010/main" val="2260846747"/>
+      </p:ext>
+    </p:extLst>
+  </p:cSld>
+  <p:clrMapOvr>
+    <a:masterClrMapping/>
+  </p:clrMapOvr>
+</p:sld>
+</file>
+
+<file path=ppt/slides/slide26.xml><?xml version="1.0" encoding="utf-8"?>
+<p:sld xmlns:a="http://schemas.openxmlformats.org/drawingml/2006/main" xmlns:r="http://schemas.openxmlformats.org/officeDocument/2006/relationships" xmlns:p="http://schemas.openxmlformats.org/presentationml/2006/main">
+  <p:cSld>
+    <p:spTree>
+      <p:nvGrpSpPr>
+        <p:cNvPr id="1" name=""/>
+        <p:cNvGrpSpPr/>
+        <p:nvPr/>
+      </p:nvGrpSpPr>
+      <p:grpSpPr>
+        <a:xfrm>
+          <a:off x="0" y="0"/>
+          <a:ext cx="0" cy="0"/>
+          <a:chOff x="0" y="0"/>
+          <a:chExt cx="0" cy="0"/>
+        </a:xfrm>
+      </p:grpSpPr>
+      <p:sp>
+        <p:nvSpPr>
+          <p:cNvPr id="4" name="Fußzeilenplatzhalter 3">
+            <a:extLst>
+              <a:ext uri="{FF2B5EF4-FFF2-40B4-BE49-F238E27FC236}">
+                <a16:creationId xmlns:a16="http://schemas.microsoft.com/office/drawing/2014/main" id="{52323336-2F30-F983-6641-76E2DC2B1605}"/>
+              </a:ext>
+            </a:extLst>
+          </p:cNvPr>
+          <p:cNvSpPr>
+            <a:spLocks noGrp="1"/>
+          </p:cNvSpPr>
+          <p:nvPr>
+            <p:ph type="ftr" sz="quarter" idx="11"/>
+          </p:nvPr>
+        </p:nvSpPr>
+        <p:spPr/>
+        <p:txBody>
+          <a:bodyPr/>
+          <a:lstStyle/>
+          <a:p>
+            <a:r>
+              <a:rPr lang="de-AT"/>
+              <a:t>CONTRUDE Schrempf</a:t>
+            </a:r>
+            <a:endParaRPr lang="de-AT" dirty="0"/>
+          </a:p>
+        </p:txBody>
+      </p:sp>
+      <p:sp>
+        <p:nvSpPr>
+          <p:cNvPr id="5" name="Foliennummernplatzhalter 4">
+            <a:extLst>
+              <a:ext uri="{FF2B5EF4-FFF2-40B4-BE49-F238E27FC236}">
+                <a16:creationId xmlns:a16="http://schemas.microsoft.com/office/drawing/2014/main" id="{FA793A73-DEA9-6129-2C09-B10028401715}"/>
+              </a:ext>
+            </a:extLst>
+          </p:cNvPr>
+          <p:cNvSpPr>
+            <a:spLocks noGrp="1"/>
+          </p:cNvSpPr>
+          <p:nvPr>
+            <p:ph type="sldNum" sz="quarter" idx="12"/>
+          </p:nvPr>
+        </p:nvSpPr>
+        <p:spPr/>
+        <p:txBody>
+          <a:bodyPr/>
+          <a:lstStyle/>
+          <a:p>
+            <a:fld id="{7DCD6803-3BAA-44F6-A698-23D950C9713B}" type="slidenum">
+              <a:rPr lang="de-AT" smtClean="0"/>
+              <a:pPr/>
+              <a:t>26</a:t>
+            </a:fld>
+            <a:endParaRPr lang="de-AT"/>
+          </a:p>
+        </p:txBody>
+      </p:sp>
+      <p:sp>
+        <p:nvSpPr>
+          <p:cNvPr id="6" name="Textfeld 5">
+            <a:extLst>
+              <a:ext uri="{FF2B5EF4-FFF2-40B4-BE49-F238E27FC236}">
+                <a16:creationId xmlns:a16="http://schemas.microsoft.com/office/drawing/2014/main" id="{34D7153C-DF57-5578-2AF4-03F4140B1A50}"/>
+              </a:ext>
+            </a:extLst>
+          </p:cNvPr>
+          <p:cNvSpPr txBox="1"/>
+          <p:nvPr/>
+        </p:nvSpPr>
+        <p:spPr>
+          <a:xfrm>
+            <a:off x="800434" y="2882623"/>
+            <a:ext cx="6075907" cy="1200329"/>
+          </a:xfrm>
+          <a:prstGeom prst="rect">
+            <a:avLst/>
+          </a:prstGeom>
+          <a:noFill/>
+        </p:spPr>
+        <p:txBody>
+          <a:bodyPr wrap="square" rtlCol="0">
+            <a:spAutoFit/>
+          </a:bodyPr>
+          <a:lstStyle/>
+          <a:p>
+            <a:r>
+              <a:rPr lang="de-DE" sz="7200" dirty="0">
+                <a:solidFill>
+                  <a:srgbClr val="9BBB59"/>
+                </a:solidFill>
+              </a:rPr>
+              <a:t>Bildquellen</a:t>
+            </a:r>
+            <a:endParaRPr lang="en-US" sz="6600" dirty="0">
+              <a:solidFill>
+                <a:srgbClr val="9BBB59"/>
+              </a:solidFill>
+            </a:endParaRPr>
+          </a:p>
+        </p:txBody>
+      </p:sp>
+    </p:spTree>
+    <p:extLst>
+      <p:ext uri="{BB962C8B-B14F-4D97-AF65-F5344CB8AC3E}">
+        <p14:creationId xmlns:p14="http://schemas.microsoft.com/office/powerpoint/2010/main" val="3986702212"/>
+      </p:ext>
+    </p:extLst>
+  </p:cSld>
+  <p:clrMapOvr>
+    <a:masterClrMapping/>
+  </p:clrMapOvr>
+</p:sld>
+</file>
+
+<file path=ppt/slides/slide27.xml><?xml version="1.0" encoding="utf-8"?>
+<p:sld xmlns:a="http://schemas.openxmlformats.org/drawingml/2006/main" xmlns:r="http://schemas.openxmlformats.org/officeDocument/2006/relationships" xmlns:p="http://schemas.openxmlformats.org/presentationml/2006/main">
+  <p:cSld>
+    <p:spTree>
+      <p:nvGrpSpPr>
+        <p:cNvPr id="1" name=""/>
+        <p:cNvGrpSpPr/>
+        <p:nvPr/>
+      </p:nvGrpSpPr>
+      <p:grpSpPr>
+        <a:xfrm>
+          <a:off x="0" y="0"/>
+          <a:ext cx="0" cy="0"/>
+          <a:chOff x="0" y="0"/>
+          <a:chExt cx="0" cy="0"/>
+        </a:xfrm>
+      </p:grpSpPr>
+      <p:sp>
+        <p:nvSpPr>
+          <p:cNvPr id="2" name="Titel 1">
+            <a:extLst>
+              <a:ext uri="{FF2B5EF4-FFF2-40B4-BE49-F238E27FC236}">
+                <a16:creationId xmlns:a16="http://schemas.microsoft.com/office/drawing/2014/main" id="{E9067B21-04AA-B863-1BC5-21EBEE4249A6}"/>
+              </a:ext>
+            </a:extLst>
+          </p:cNvPr>
+          <p:cNvSpPr>
+            <a:spLocks noGrp="1"/>
+          </p:cNvSpPr>
+          <p:nvPr>
+            <p:ph type="title"/>
+          </p:nvPr>
+        </p:nvSpPr>
+        <p:spPr/>
+        <p:txBody>
+          <a:bodyPr/>
+          <a:lstStyle/>
+          <a:p>
+            <a:r>
+              <a:rPr lang="de-AT" dirty="0"/>
+              <a:t>Bildquellen – Kampl</a:t>
+            </a:r>
+          </a:p>
+        </p:txBody>
+      </p:sp>
+      <p:sp>
+        <p:nvSpPr>
+          <p:cNvPr id="3" name="Inhaltsplatzhalter 2">
+            <a:extLst>
+              <a:ext uri="{FF2B5EF4-FFF2-40B4-BE49-F238E27FC236}">
+                <a16:creationId xmlns:a16="http://schemas.microsoft.com/office/drawing/2014/main" id="{CDF320DB-58E5-EDF5-0697-843A43B8D27E}"/>
+              </a:ext>
+            </a:extLst>
+          </p:cNvPr>
+          <p:cNvSpPr>
+            <a:spLocks noGrp="1"/>
+          </p:cNvSpPr>
+          <p:nvPr>
+            <p:ph idx="1"/>
+          </p:nvPr>
+        </p:nvSpPr>
+        <p:spPr/>
+        <p:txBody>
+          <a:bodyPr/>
+          <a:lstStyle/>
+          <a:p>
+            <a:endParaRPr lang="de-AT"/>
+          </a:p>
+        </p:txBody>
+      </p:sp>
+      <p:sp>
+        <p:nvSpPr>
+          <p:cNvPr id="4" name="Fußzeilenplatzhalter 3">
+            <a:extLst>
+              <a:ext uri="{FF2B5EF4-FFF2-40B4-BE49-F238E27FC236}">
+                <a16:creationId xmlns:a16="http://schemas.microsoft.com/office/drawing/2014/main" id="{A3DB105E-8365-A55C-B819-3BC49335B886}"/>
+              </a:ext>
+            </a:extLst>
+          </p:cNvPr>
+          <p:cNvSpPr>
+            <a:spLocks noGrp="1"/>
+          </p:cNvSpPr>
+          <p:nvPr>
+            <p:ph type="ftr" sz="quarter" idx="11"/>
+          </p:nvPr>
+        </p:nvSpPr>
+        <p:spPr/>
+        <p:txBody>
+          <a:bodyPr/>
+          <a:lstStyle/>
+          <a:p>
+            <a:r>
+              <a:rPr lang="de-AT"/>
+              <a:t>CONTRUDE Schrempf</a:t>
+            </a:r>
+            <a:endParaRPr lang="de-AT" dirty="0"/>
+          </a:p>
+        </p:txBody>
+      </p:sp>
+      <p:sp>
+        <p:nvSpPr>
+          <p:cNvPr id="5" name="Foliennummernplatzhalter 4">
+            <a:extLst>
+              <a:ext uri="{FF2B5EF4-FFF2-40B4-BE49-F238E27FC236}">
+                <a16:creationId xmlns:a16="http://schemas.microsoft.com/office/drawing/2014/main" id="{99CB3D7D-C8D2-F222-6263-523FEE1ED3A2}"/>
+              </a:ext>
+            </a:extLst>
+          </p:cNvPr>
+          <p:cNvSpPr>
+            <a:spLocks noGrp="1"/>
+          </p:cNvSpPr>
+          <p:nvPr>
+            <p:ph type="sldNum" sz="quarter" idx="12"/>
+          </p:nvPr>
+        </p:nvSpPr>
+        <p:spPr/>
+        <p:txBody>
+          <a:bodyPr/>
+          <a:lstStyle/>
+          <a:p>
+            <a:fld id="{7DCD6803-3BAA-44F6-A698-23D950C9713B}" type="slidenum">
+              <a:rPr lang="de-AT" smtClean="0"/>
+              <a:pPr/>
+              <a:t>27</a:t>
+            </a:fld>
+            <a:endParaRPr lang="de-AT"/>
+          </a:p>
+        </p:txBody>
+      </p:sp>
+    </p:spTree>
+    <p:extLst>
+      <p:ext uri="{BB962C8B-B14F-4D97-AF65-F5344CB8AC3E}">
+        <p14:creationId xmlns:p14="http://schemas.microsoft.com/office/powerpoint/2010/main" val="871335908"/>
+      </p:ext>
+    </p:extLst>
+  </p:cSld>
+  <p:clrMapOvr>
+    <a:masterClrMapping/>
+  </p:clrMapOvr>
+</p:sld>
+</file>
+
+<file path=ppt/slides/slide28.xml><?xml version="1.0" encoding="utf-8"?>
+<p:sld xmlns:a="http://schemas.openxmlformats.org/drawingml/2006/main" xmlns:r="http://schemas.openxmlformats.org/officeDocument/2006/relationships" xmlns:p="http://schemas.openxmlformats.org/presentationml/2006/main">
+  <p:cSld>
+    <p:spTree>
+      <p:nvGrpSpPr>
+        <p:cNvPr id="1" name=""/>
+        <p:cNvGrpSpPr/>
+        <p:nvPr/>
+      </p:nvGrpSpPr>
+      <p:grpSpPr>
+        <a:xfrm>
+          <a:off x="0" y="0"/>
+          <a:ext cx="0" cy="0"/>
+          <a:chOff x="0" y="0"/>
+          <a:chExt cx="0" cy="0"/>
+        </a:xfrm>
+      </p:grpSpPr>
+      <p:sp>
+        <p:nvSpPr>
+          <p:cNvPr id="2" name="Titel 1">
+            <a:extLst>
+              <a:ext uri="{FF2B5EF4-FFF2-40B4-BE49-F238E27FC236}">
+                <a16:creationId xmlns:a16="http://schemas.microsoft.com/office/drawing/2014/main" id="{366B6435-9459-7B22-BE3B-A911C6327046}"/>
+              </a:ext>
+            </a:extLst>
+          </p:cNvPr>
+          <p:cNvSpPr>
+            <a:spLocks noGrp="1"/>
+          </p:cNvSpPr>
+          <p:nvPr>
+            <p:ph type="title"/>
+          </p:nvPr>
+        </p:nvSpPr>
+        <p:spPr/>
+        <p:txBody>
+          <a:bodyPr/>
+          <a:lstStyle/>
+          <a:p>
+            <a:r>
+              <a:rPr lang="de-AT" dirty="0"/>
+              <a:t>Bildquellen – Schrempf</a:t>
+            </a:r>
+          </a:p>
+        </p:txBody>
+      </p:sp>
+      <p:sp>
+        <p:nvSpPr>
+          <p:cNvPr id="3" name="Inhaltsplatzhalter 2">
+            <a:extLst>
+              <a:ext uri="{FF2B5EF4-FFF2-40B4-BE49-F238E27FC236}">
+                <a16:creationId xmlns:a16="http://schemas.microsoft.com/office/drawing/2014/main" id="{E9600844-670E-9E47-9B44-DF36393CB30C}"/>
+              </a:ext>
+            </a:extLst>
+          </p:cNvPr>
+          <p:cNvSpPr>
+            <a:spLocks noGrp="1"/>
+          </p:cNvSpPr>
+          <p:nvPr>
+            <p:ph idx="1"/>
+          </p:nvPr>
+        </p:nvSpPr>
+        <p:spPr/>
+        <p:txBody>
+          <a:bodyPr>
+            <a:normAutofit/>
+          </a:bodyPr>
+          <a:lstStyle/>
+          <a:p>
+            <a:r>
+              <a:rPr lang="de-AT" dirty="0">
+                <a:hlinkClick r:id="rId2"/>
+              </a:rPr>
+              <a:t>https://de.cleanpng.com/png-fsa3fn</a:t>
+            </a:r>
+            <a:r>
+              <a:rPr lang="de-AT" dirty="0"/>
+              <a:t> [18.04.2025]</a:t>
+            </a:r>
+          </a:p>
+          <a:p>
+            <a:r>
+              <a:rPr lang="de-AT" dirty="0">
+                <a:hlinkClick r:id="rId3"/>
+              </a:rPr>
+              <a:t>https://www.sdgwatch.at</a:t>
+            </a:r>
+            <a:r>
+              <a:rPr lang="de-AT" dirty="0"/>
+              <a:t> [18.04.2025]</a:t>
+            </a:r>
+          </a:p>
+          <a:p>
+            <a:r>
+              <a:rPr lang="de-AT" dirty="0">
+                <a:hlinkClick r:id="rId4"/>
+              </a:rPr>
+              <a:t>https://thenounproject.com/icon/database-7670737</a:t>
+            </a:r>
+            <a:r>
+              <a:rPr lang="de-AT" dirty="0"/>
+              <a:t> [18.04.2025]</a:t>
+            </a:r>
+          </a:p>
+          <a:p>
+            <a:r>
+              <a:rPr lang="de-AT" dirty="0">
+                <a:hlinkClick r:id="rId5"/>
+              </a:rPr>
+              <a:t>https://www.svgrepo.com/svg/353829/grafana</a:t>
+            </a:r>
+            <a:r>
+              <a:rPr lang="de-AT" dirty="0"/>
+              <a:t> [18.04.2025]</a:t>
+            </a:r>
+          </a:p>
+          <a:p>
+            <a:r>
+              <a:rPr lang="de-AT" dirty="0">
+                <a:hlinkClick r:id="rId6"/>
+              </a:rPr>
+              <a:t>https://techicons.dev/icons/docker</a:t>
+            </a:r>
+            <a:r>
+              <a:rPr lang="de-AT" dirty="0"/>
+              <a:t> [18.04.2025]</a:t>
+            </a:r>
+          </a:p>
+          <a:p>
+            <a:r>
+              <a:rPr lang="de-AT" dirty="0">
+                <a:hlinkClick r:id="rId7"/>
+              </a:rPr>
+              <a:t>https://de.wikipedia.org/wiki/Datei:Octicons-mark-github.svg</a:t>
+            </a:r>
+            <a:r>
+              <a:rPr lang="de-AT" dirty="0"/>
+              <a:t> [18.04.2025]</a:t>
+            </a:r>
+          </a:p>
+          <a:p>
+            <a:r>
+              <a:rPr lang="de-AT" dirty="0">
+                <a:hlinkClick r:id="rId8"/>
+              </a:rPr>
+              <a:t>https://seeklogo.com/vector-logo/273749/node-js</a:t>
+            </a:r>
+            <a:r>
+              <a:rPr lang="de-AT" dirty="0"/>
+              <a:t> [18.04.2025]</a:t>
+            </a:r>
+          </a:p>
+          <a:p>
+            <a:r>
+              <a:rPr lang="de-AT" dirty="0">
+                <a:hlinkClick r:id="rId9"/>
+              </a:rPr>
+              <a:t>https://techicons.dev/icons/traefikproxy</a:t>
+            </a:r>
+            <a:r>
+              <a:rPr lang="de-AT" dirty="0"/>
+              <a:t> [18.04.2025]</a:t>
+            </a:r>
+          </a:p>
+        </p:txBody>
+      </p:sp>
+      <p:sp>
+        <p:nvSpPr>
+          <p:cNvPr id="4" name="Fußzeilenplatzhalter 3">
+            <a:extLst>
+              <a:ext uri="{FF2B5EF4-FFF2-40B4-BE49-F238E27FC236}">
+                <a16:creationId xmlns:a16="http://schemas.microsoft.com/office/drawing/2014/main" id="{B4711875-828F-B56B-63D6-725C06E6E537}"/>
+              </a:ext>
+            </a:extLst>
+          </p:cNvPr>
+          <p:cNvSpPr>
+            <a:spLocks noGrp="1"/>
+          </p:cNvSpPr>
+          <p:nvPr>
+            <p:ph type="ftr" sz="quarter" idx="11"/>
+          </p:nvPr>
+        </p:nvSpPr>
+        <p:spPr/>
+        <p:txBody>
+          <a:bodyPr/>
+          <a:lstStyle/>
+          <a:p>
+            <a:r>
+              <a:rPr lang="de-AT"/>
+              <a:t>CONTRUDE Schrempf</a:t>
+            </a:r>
+            <a:endParaRPr lang="de-AT" dirty="0"/>
+          </a:p>
+        </p:txBody>
+      </p:sp>
+      <p:sp>
+        <p:nvSpPr>
+          <p:cNvPr id="5" name="Foliennummernplatzhalter 4">
+            <a:extLst>
+              <a:ext uri="{FF2B5EF4-FFF2-40B4-BE49-F238E27FC236}">
+                <a16:creationId xmlns:a16="http://schemas.microsoft.com/office/drawing/2014/main" id="{75D391DE-B06F-7794-3334-D47E7860060B}"/>
+              </a:ext>
+            </a:extLst>
+          </p:cNvPr>
+          <p:cNvSpPr>
+            <a:spLocks noGrp="1"/>
+          </p:cNvSpPr>
+          <p:nvPr>
+            <p:ph type="sldNum" sz="quarter" idx="12"/>
+          </p:nvPr>
+        </p:nvSpPr>
+        <p:spPr/>
+        <p:txBody>
+          <a:bodyPr/>
+          <a:lstStyle/>
+          <a:p>
+            <a:fld id="{7DCD6803-3BAA-44F6-A698-23D950C9713B}" type="slidenum">
+              <a:rPr lang="de-AT" smtClean="0"/>
+              <a:pPr/>
+              <a:t>28</a:t>
+            </a:fld>
+            <a:endParaRPr lang="de-AT"/>
+          </a:p>
+        </p:txBody>
+      </p:sp>
+    </p:spTree>
+    <p:extLst>
+      <p:ext uri="{BB962C8B-B14F-4D97-AF65-F5344CB8AC3E}">
+        <p14:creationId xmlns:p14="http://schemas.microsoft.com/office/powerpoint/2010/main" val="1641466425"/>
+      </p:ext>
+    </p:extLst>
+  </p:cSld>
+  <p:clrMapOvr>
+    <a:masterClrMapping/>
+  </p:clrMapOvr>
+</p:sld>
+</file>
+
+<file path=ppt/slides/slide29.xml><?xml version="1.0" encoding="utf-8"?>
+<p:sld xmlns:a="http://schemas.openxmlformats.org/drawingml/2006/main" xmlns:r="http://schemas.openxmlformats.org/officeDocument/2006/relationships" xmlns:p="http://schemas.openxmlformats.org/presentationml/2006/main">
+  <p:cSld>
+    <p:spTree>
+      <p:nvGrpSpPr>
+        <p:cNvPr id="1" name=""/>
+        <p:cNvGrpSpPr/>
+        <p:nvPr/>
+      </p:nvGrpSpPr>
+      <p:grpSpPr>
+        <a:xfrm>
+          <a:off x="0" y="0"/>
+          <a:ext cx="0" cy="0"/>
+          <a:chOff x="0" y="0"/>
+          <a:chExt cx="0" cy="0"/>
+        </a:xfrm>
+      </p:grpSpPr>
+      <p:sp>
+        <p:nvSpPr>
+          <p:cNvPr id="2" name="Titel 1">
+            <a:extLst>
+              <a:ext uri="{FF2B5EF4-FFF2-40B4-BE49-F238E27FC236}">
+                <a16:creationId xmlns:a16="http://schemas.microsoft.com/office/drawing/2014/main" id="{6843AA73-C052-59B9-1B4F-A641524F86B5}"/>
+              </a:ext>
+            </a:extLst>
+          </p:cNvPr>
+          <p:cNvSpPr>
+            <a:spLocks noGrp="1"/>
+          </p:cNvSpPr>
+          <p:nvPr>
+            <p:ph type="title"/>
+          </p:nvPr>
+        </p:nvSpPr>
+        <p:spPr/>
+        <p:txBody>
+          <a:bodyPr/>
+          <a:lstStyle/>
+          <a:p>
+            <a:r>
+              <a:rPr lang="de-AT" dirty="0"/>
+              <a:t>Gekle</a:t>
+            </a:r>
+          </a:p>
+        </p:txBody>
+      </p:sp>
+      <p:sp>
+        <p:nvSpPr>
+          <p:cNvPr id="3" name="Inhaltsplatzhalter 2">
+            <a:extLst>
+              <a:ext uri="{FF2B5EF4-FFF2-40B4-BE49-F238E27FC236}">
+                <a16:creationId xmlns:a16="http://schemas.microsoft.com/office/drawing/2014/main" id="{D9249581-8698-82EA-9B49-664D015569FF}"/>
+              </a:ext>
+            </a:extLst>
+          </p:cNvPr>
+          <p:cNvSpPr>
+            <a:spLocks noGrp="1"/>
+          </p:cNvSpPr>
+          <p:nvPr>
+            <p:ph idx="1"/>
+          </p:nvPr>
+        </p:nvSpPr>
+        <p:spPr/>
+        <p:txBody>
+          <a:bodyPr/>
+          <a:lstStyle/>
+          <a:p>
+            <a:r>
+              <a:rPr lang="de-AT" dirty="0">
+                <a:hlinkClick r:id="rId2"/>
+              </a:rPr>
+              <a:t>https://www.cleanpng.com/png-java-computer-software-logo-1412676/download-png.html</a:t>
+            </a:r>
+            <a:r>
+              <a:rPr lang="de-AT" dirty="0"/>
+              <a:t> [18.04.2025]</a:t>
+            </a:r>
+          </a:p>
+          <a:p>
+            <a:r>
+              <a:rPr lang="de-AT" dirty="0">
+                <a:hlinkClick r:id="rId3"/>
+              </a:rPr>
+              <a:t>https://de.cleanpng.com/png-f3i6la/download-png.html</a:t>
+            </a:r>
+            <a:r>
+              <a:rPr lang="de-AT" dirty="0"/>
+              <a:t> [18.04.2025]</a:t>
+            </a:r>
+          </a:p>
+          <a:p>
+            <a:r>
+              <a:rPr lang="de-AT" dirty="0">
+                <a:hlinkClick r:id="rId4"/>
+              </a:rPr>
+              <a:t>https://www.pngwing.com/tr/free-png-noezv/download</a:t>
+            </a:r>
+            <a:r>
+              <a:rPr lang="de-AT" dirty="0"/>
+              <a:t> [18.04.2025]</a:t>
+            </a:r>
+          </a:p>
+          <a:p>
+            <a:r>
+              <a:rPr lang="de-AT" dirty="0">
+                <a:hlinkClick r:id="rId5"/>
+              </a:rPr>
+              <a:t>https://en.wikipedia.org/wiki/React_(software)</a:t>
+            </a:r>
+            <a:r>
+              <a:rPr lang="de-AT" dirty="0"/>
+              <a:t> [18.04.2025]</a:t>
+            </a:r>
+          </a:p>
+          <a:p>
+            <a:r>
+              <a:rPr lang="de-AT" dirty="0">
+                <a:hlinkClick r:id="rId6"/>
+              </a:rPr>
+              <a:t>https://en.wikipedia.org/wiki/Vite_%28software%29</a:t>
+            </a:r>
+            <a:r>
+              <a:rPr lang="de-AT" dirty="0"/>
+              <a:t> [18.04.2025]</a:t>
+            </a:r>
+          </a:p>
+          <a:p>
+            <a:endParaRPr lang="de-AT" dirty="0"/>
+          </a:p>
+          <a:p>
+            <a:endParaRPr lang="de-AT" dirty="0"/>
+          </a:p>
+        </p:txBody>
+      </p:sp>
+      <p:sp>
+        <p:nvSpPr>
+          <p:cNvPr id="4" name="Fußzeilenplatzhalter 3">
+            <a:extLst>
+              <a:ext uri="{FF2B5EF4-FFF2-40B4-BE49-F238E27FC236}">
+                <a16:creationId xmlns:a16="http://schemas.microsoft.com/office/drawing/2014/main" id="{51C5C890-B07D-8FE6-DF7D-DD73167FE310}"/>
+              </a:ext>
+            </a:extLst>
+          </p:cNvPr>
+          <p:cNvSpPr>
+            <a:spLocks noGrp="1"/>
+          </p:cNvSpPr>
+          <p:nvPr>
+            <p:ph type="ftr" sz="quarter" idx="11"/>
+          </p:nvPr>
+        </p:nvSpPr>
+        <p:spPr/>
+        <p:txBody>
+          <a:bodyPr/>
+          <a:lstStyle/>
+          <a:p>
+            <a:r>
+              <a:rPr lang="de-AT"/>
+              <a:t>CONTRUDE Schrempf</a:t>
+            </a:r>
+            <a:endParaRPr lang="de-AT" dirty="0"/>
+          </a:p>
+        </p:txBody>
+      </p:sp>
+      <p:sp>
+        <p:nvSpPr>
+          <p:cNvPr id="5" name="Foliennummernplatzhalter 4">
+            <a:extLst>
+              <a:ext uri="{FF2B5EF4-FFF2-40B4-BE49-F238E27FC236}">
+                <a16:creationId xmlns:a16="http://schemas.microsoft.com/office/drawing/2014/main" id="{2DF4B31A-7C85-6AED-BB12-8F0C05262B33}"/>
+              </a:ext>
+            </a:extLst>
+          </p:cNvPr>
+          <p:cNvSpPr>
+            <a:spLocks noGrp="1"/>
+          </p:cNvSpPr>
+          <p:nvPr>
+            <p:ph type="sldNum" sz="quarter" idx="12"/>
+          </p:nvPr>
+        </p:nvSpPr>
+        <p:spPr/>
+        <p:txBody>
+          <a:bodyPr/>
+          <a:lstStyle/>
+          <a:p>
+            <a:fld id="{7DCD6803-3BAA-44F6-A698-23D950C9713B}" type="slidenum">
+              <a:rPr lang="de-AT" smtClean="0"/>
+              <a:pPr/>
+              <a:t>29</a:t>
             </a:fld>
             <a:endParaRPr lang="de-AT"/>
           </a:p>
@@ -9695,18 +11730,18 @@
 </file>
 
 <file path=customXml/item1.xml><?xml version="1.0" encoding="utf-8"?>
-<p:properties xmlns:p="http://schemas.microsoft.com/office/2006/metadata/properties" xmlns:xsi="http://www.w3.org/2001/XMLSchema-instance" xmlns:pc="http://schemas.microsoft.com/office/infopath/2007/PartnerControls">
-  <documentManagement/>
-</p:properties>
-</file>
-
-<file path=customXml/item2.xml><?xml version="1.0" encoding="utf-8"?>
 <?mso-contentType ?>
 <FormTemplates xmlns="http://schemas.microsoft.com/sharepoint/v3/contenttype/forms">
   <Display>DocumentLibraryForm</Display>
   <Edit>DocumentLibraryForm</Edit>
   <New>DocumentLibraryForm</New>
 </FormTemplates>
+</file>
+
+<file path=customXml/item2.xml><?xml version="1.0" encoding="utf-8"?>
+<p:properties xmlns:p="http://schemas.microsoft.com/office/2006/metadata/properties" xmlns:xsi="http://www.w3.org/2001/XMLSchema-instance" xmlns:pc="http://schemas.microsoft.com/office/infopath/2007/PartnerControls">
+  <documentManagement/>
+</p:properties>
 </file>
 
 <file path=customXml/item3.xml><?xml version="1.0" encoding="utf-8"?>
@@ -9824,6 +11859,14 @@
 </file>
 
 <file path=customXml/itemProps1.xml><?xml version="1.0" encoding="utf-8"?>
+<ds:datastoreItem xmlns:ds="http://schemas.openxmlformats.org/officeDocument/2006/customXml" ds:itemID="{A62B322D-2084-418A-8960-B074ADC5B6DB}">
+  <ds:schemaRefs>
+    <ds:schemaRef ds:uri="http://schemas.microsoft.com/sharepoint/v3/contenttype/forms"/>
+  </ds:schemaRefs>
+</ds:datastoreItem>
+</file>
+
+<file path=customXml/itemProps2.xml><?xml version="1.0" encoding="utf-8"?>
 <ds:datastoreItem xmlns:ds="http://schemas.openxmlformats.org/officeDocument/2006/customXml" ds:itemID="{91B09AE3-FA1D-40C8-A6CE-A2D9F55131C8}">
   <ds:schemaRefs>
     <ds:schemaRef ds:uri="http://purl.org/dc/terms/"/>
@@ -9834,14 +11877,6 @@
     <ds:schemaRef ds:uri="http://www.w3.org/XML/1998/namespace"/>
     <ds:schemaRef ds:uri="http://purl.org/dc/elements/1.1/"/>
     <ds:schemaRef ds:uri="http://purl.org/dc/dcmitype/"/>
-  </ds:schemaRefs>
-</ds:datastoreItem>
-</file>
-
-<file path=customXml/itemProps2.xml><?xml version="1.0" encoding="utf-8"?>
-<ds:datastoreItem xmlns:ds="http://schemas.openxmlformats.org/officeDocument/2006/customXml" ds:itemID="{A62B322D-2084-418A-8960-B074ADC5B6DB}">
-  <ds:schemaRefs>
-    <ds:schemaRef ds:uri="http://schemas.microsoft.com/sharepoint/v3/contenttype/forms"/>
   </ds:schemaRefs>
 </ds:datastoreItem>
 </file>

</xml_diff>